<commit_message>
reduced font size added tips, config and merge conflict resolving
</commit_message>
<xml_diff>
--- a/gitcheatsheet.pptx
+++ b/gitcheatsheet.pptx
@@ -144,7 +144,7 @@
         </p:nvSpPr>
         <p:spPr>
           <a:xfrm>
-            <a:off x="1" y="0"/>
+            <a:off x="2" y="1"/>
             <a:ext cx="2880137" cy="488249"/>
           </a:xfrm>
           <a:prstGeom prst="rect">
@@ -175,7 +175,7 @@
         </p:nvSpPr>
         <p:spPr>
           <a:xfrm>
-            <a:off x="3763586" y="0"/>
+            <a:off x="3763587" y="1"/>
             <a:ext cx="2880137" cy="488249"/>
           </a:xfrm>
           <a:prstGeom prst="rect">
@@ -303,7 +303,7 @@
         </p:nvSpPr>
         <p:spPr>
           <a:xfrm>
-            <a:off x="1" y="9287610"/>
+            <a:off x="2" y="9287611"/>
             <a:ext cx="2880137" cy="488249"/>
           </a:xfrm>
           <a:prstGeom prst="rect">
@@ -334,7 +334,7 @@
         </p:nvSpPr>
         <p:spPr>
           <a:xfrm>
-            <a:off x="3763586" y="9287610"/>
+            <a:off x="3763587" y="9287611"/>
             <a:ext cx="2880137" cy="488249"/>
           </a:xfrm>
           <a:prstGeom prst="rect">
@@ -3540,7 +3540,7 @@
         </p:nvCxnSpPr>
         <p:spPr>
           <a:xfrm>
-            <a:off x="5551713" y="4797152"/>
+            <a:off x="5539235" y="4076184"/>
             <a:ext cx="3154823" cy="0"/>
           </a:xfrm>
           <a:prstGeom prst="line">
@@ -3575,7 +3575,7 @@
         </p:nvCxnSpPr>
         <p:spPr>
           <a:xfrm>
-            <a:off x="8410381" y="1068611"/>
+            <a:off x="8419907" y="1095603"/>
             <a:ext cx="275600" cy="0"/>
           </a:xfrm>
           <a:prstGeom prst="line">
@@ -3610,7 +3610,7 @@
         </p:nvCxnSpPr>
         <p:spPr>
           <a:xfrm>
-            <a:off x="1845112" y="1738749"/>
+            <a:off x="1996480" y="1484784"/>
             <a:ext cx="0" cy="506847"/>
           </a:xfrm>
           <a:prstGeom prst="line">
@@ -3648,7 +3648,7 @@
         </p:nvCxnSpPr>
         <p:spPr>
           <a:xfrm>
-            <a:off x="3112904" y="674288"/>
+            <a:off x="3112904" y="620688"/>
             <a:ext cx="1099056" cy="0"/>
           </a:xfrm>
           <a:prstGeom prst="line">
@@ -3686,7 +3686,7 @@
         </p:nvCxnSpPr>
         <p:spPr>
           <a:xfrm>
-            <a:off x="4442658" y="935230"/>
+            <a:off x="4442658" y="764704"/>
             <a:ext cx="8089" cy="755358"/>
           </a:xfrm>
           <a:prstGeom prst="line">
@@ -3748,7 +3748,7 @@
         </p:nvCxnSpPr>
         <p:spPr>
           <a:xfrm>
-            <a:off x="7207601" y="1942395"/>
+            <a:off x="7207601" y="1700808"/>
             <a:ext cx="0" cy="543885"/>
           </a:xfrm>
           <a:prstGeom prst="line">
@@ -3783,7 +3783,7 @@
         </p:nvCxnSpPr>
         <p:spPr>
           <a:xfrm flipH="1">
-            <a:off x="4433447" y="3151353"/>
+            <a:off x="4433447" y="2791313"/>
             <a:ext cx="2" cy="1440160"/>
           </a:xfrm>
           <a:prstGeom prst="line">
@@ -3818,7 +3818,7 @@
         </p:nvCxnSpPr>
         <p:spPr>
           <a:xfrm>
-            <a:off x="7208069" y="2996952"/>
+            <a:off x="7208069" y="2492896"/>
             <a:ext cx="3860" cy="568047"/>
           </a:xfrm>
           <a:prstGeom prst="line">
@@ -3885,7 +3885,7 @@
         <p:spPr>
           <a:xfrm>
             <a:off x="5752700" y="762408"/>
-            <a:ext cx="0" cy="1721525"/>
+            <a:ext cx="321" cy="1442456"/>
           </a:xfrm>
           <a:prstGeom prst="line">
             <a:avLst/>
@@ -3915,7 +3915,7 @@
         </p:nvCxnSpPr>
         <p:spPr>
           <a:xfrm>
-            <a:off x="5753021" y="2464696"/>
+            <a:off x="5734984" y="2204864"/>
             <a:ext cx="254748" cy="0"/>
           </a:xfrm>
           <a:prstGeom prst="line">
@@ -3946,7 +3946,7 @@
         </p:nvCxnSpPr>
         <p:spPr>
           <a:xfrm>
-            <a:off x="5580114" y="2648137"/>
+            <a:off x="5580114" y="2334028"/>
             <a:ext cx="576433" cy="0"/>
           </a:xfrm>
           <a:prstGeom prst="line">
@@ -3981,8 +3981,8 @@
         </p:nvSpPr>
         <p:spPr>
           <a:xfrm>
-            <a:off x="577320" y="358219"/>
-            <a:ext cx="2535584" cy="1371787"/>
+            <a:off x="851640" y="358219"/>
+            <a:ext cx="2266488" cy="1198573"/>
           </a:xfrm>
           <a:prstGeom prst="rect">
             <a:avLst/>
@@ -4018,29 +4018,29 @@
             <a:prstTxWarp prst="textNoShape">
               <a:avLst/>
             </a:prstTxWarp>
-            <a:spAutoFit/>
+            <a:noAutofit/>
           </a:bodyPr>
           <a:lstStyle/>
           <a:p>
             <a:pPr algn="ctr"/>
             <a:r>
-              <a:rPr lang="de-DE" sz="900" b="1" dirty="0" smtClean="0"/>
+              <a:rPr lang="de-DE" sz="800" b="1" dirty="0" smtClean="0"/>
               <a:t>Create</a:t>
             </a:r>
           </a:p>
           <a:p>
             <a:pPr algn="ctr"/>
-            <a:endParaRPr lang="de-DE" sz="1000" b="1" dirty="0" smtClean="0"/>
-          </a:p>
-          <a:p>
-            <a:r>
-              <a:rPr lang="de-DE" sz="800" b="1" dirty="0" smtClean="0"/>
+            <a:endParaRPr lang="de-DE" sz="800" b="1" dirty="0" smtClean="0"/>
+          </a:p>
+          <a:p>
+            <a:r>
+              <a:rPr lang="de-DE" sz="700" b="1" dirty="0" smtClean="0"/>
               <a:t>From existing data</a:t>
             </a:r>
           </a:p>
           <a:p>
             <a:r>
-              <a:rPr lang="de-DE" sz="800" dirty="0" smtClean="0">
+              <a:rPr lang="de-DE" sz="700" dirty="0" smtClean="0">
                 <a:latin typeface="Courier New" pitchFamily="49" charset="0"/>
                 <a:cs typeface="Courier New" pitchFamily="49" charset="0"/>
               </a:rPr>
@@ -4049,7 +4049,7 @@
           </a:p>
           <a:p>
             <a:r>
-              <a:rPr lang="de-DE" sz="800" dirty="0" smtClean="0">
+              <a:rPr lang="de-DE" sz="700" dirty="0" smtClean="0">
                 <a:latin typeface="Courier New" pitchFamily="49" charset="0"/>
                 <a:cs typeface="Courier New" pitchFamily="49" charset="0"/>
               </a:rPr>
@@ -4058,7 +4058,7 @@
           </a:p>
           <a:p>
             <a:r>
-              <a:rPr lang="de-DE" sz="800" dirty="0" smtClean="0">
+              <a:rPr lang="de-DE" sz="700" dirty="0" smtClean="0">
                 <a:latin typeface="Courier New" pitchFamily="49" charset="0"/>
                 <a:cs typeface="Courier New" pitchFamily="49" charset="0"/>
               </a:rPr>
@@ -4067,28 +4067,28 @@
           </a:p>
           <a:p>
             <a:r>
-              <a:rPr lang="en-US" sz="800" b="1" dirty="0" smtClean="0"/>
+              <a:rPr lang="en-US" sz="700" b="1" dirty="0" smtClean="0"/>
               <a:t>From </a:t>
             </a:r>
             <a:r>
-              <a:rPr lang="en-US" sz="800" b="1" dirty="0"/>
+              <a:rPr lang="en-US" sz="700" b="1" dirty="0"/>
               <a:t>existing</a:t>
             </a:r>
             <a:r>
-              <a:rPr lang="en-US" sz="800" b="1" dirty="0" smtClean="0"/>
+              <a:rPr lang="en-US" sz="700" b="1" dirty="0" smtClean="0"/>
               <a:t> repo</a:t>
             </a:r>
           </a:p>
           <a:p>
             <a:r>
-              <a:rPr lang="en-US" sz="800" dirty="0" err="1" smtClean="0">
+              <a:rPr lang="en-US" sz="700" dirty="0" err="1" smtClean="0">
                 <a:latin typeface="Courier New" pitchFamily="49" charset="0"/>
                 <a:cs typeface="Courier New" pitchFamily="49" charset="0"/>
               </a:rPr>
               <a:t>git</a:t>
             </a:r>
             <a:r>
-              <a:rPr lang="en-US" sz="800" dirty="0" smtClean="0">
+              <a:rPr lang="en-US" sz="700" dirty="0" smtClean="0">
                 <a:latin typeface="Courier New" pitchFamily="49" charset="0"/>
                 <a:cs typeface="Courier New" pitchFamily="49" charset="0"/>
               </a:rPr>
@@ -4097,41 +4097,41 @@
           </a:p>
           <a:p>
             <a:r>
-              <a:rPr lang="en-US" sz="800" dirty="0" err="1" smtClean="0">
+              <a:rPr lang="en-US" sz="700" dirty="0" err="1" smtClean="0">
                 <a:latin typeface="Courier New" pitchFamily="49" charset="0"/>
                 <a:cs typeface="Courier New" pitchFamily="49" charset="0"/>
               </a:rPr>
               <a:t>git</a:t>
             </a:r>
             <a:r>
-              <a:rPr lang="en-US" sz="800" dirty="0" smtClean="0">
+              <a:rPr lang="en-US" sz="700" dirty="0" smtClean="0">
                 <a:latin typeface="Courier New" pitchFamily="49" charset="0"/>
                 <a:cs typeface="Courier New" pitchFamily="49" charset="0"/>
               </a:rPr>
               <a:t> clone </a:t>
             </a:r>
             <a:r>
-              <a:rPr lang="en-US" sz="800" dirty="0" err="1" smtClean="0">
+              <a:rPr lang="en-US" sz="700" dirty="0" err="1" smtClean="0">
                 <a:latin typeface="Courier New" pitchFamily="49" charset="0"/>
                 <a:cs typeface="Courier New" pitchFamily="49" charset="0"/>
               </a:rPr>
               <a:t>you@host.org:dir</a:t>
             </a:r>
             <a:r>
-              <a:rPr lang="en-US" sz="800" dirty="0" smtClean="0">
+              <a:rPr lang="en-US" sz="700" dirty="0" smtClean="0">
                 <a:latin typeface="Courier New" pitchFamily="49" charset="0"/>
                 <a:cs typeface="Courier New" pitchFamily="49" charset="0"/>
               </a:rPr>
               <a:t>/</a:t>
             </a:r>
             <a:r>
-              <a:rPr lang="en-US" sz="800" dirty="0" err="1" smtClean="0">
+              <a:rPr lang="en-US" sz="700" dirty="0" err="1" smtClean="0">
                 <a:latin typeface="Courier New" pitchFamily="49" charset="0"/>
                 <a:cs typeface="Courier New" pitchFamily="49" charset="0"/>
               </a:rPr>
               <a:t>project.git</a:t>
             </a:r>
-            <a:endParaRPr lang="en-US" sz="800" dirty="0" smtClean="0">
+            <a:endParaRPr lang="en-US" sz="700" dirty="0" smtClean="0">
               <a:latin typeface="Courier New" pitchFamily="49" charset="0"/>
               <a:cs typeface="Courier New" pitchFamily="49" charset="0"/>
             </a:endParaRPr>
@@ -4139,39 +4139,43 @@
           <a:p>
             <a:pPr algn="r"/>
             <a:r>
-              <a:rPr lang="en-US" sz="800" b="1" dirty="0" smtClean="0">
+              <a:rPr lang="en-US" sz="700" b="1" dirty="0" smtClean="0">
                 <a:solidFill>
-                  <a:schemeClr val="bg1">
-                    <a:lumMod val="75000"/>
+                  <a:schemeClr val="tx1">
+                    <a:lumMod val="50000"/>
+                    <a:lumOff val="50000"/>
                   </a:schemeClr>
                 </a:solidFill>
               </a:rPr>
               <a:t>default</a:t>
             </a:r>
             <a:r>
-              <a:rPr lang="en-US" sz="800" dirty="0" smtClean="0">
+              <a:rPr lang="en-US" sz="700" dirty="0" smtClean="0">
                 <a:solidFill>
-                  <a:schemeClr val="bg1">
-                    <a:lumMod val="75000"/>
+                  <a:schemeClr val="tx1">
+                    <a:lumMod val="50000"/>
+                    <a:lumOff val="50000"/>
                   </a:schemeClr>
                 </a:solidFill>
               </a:rPr>
               <a:t> protocol is </a:t>
             </a:r>
             <a:r>
-              <a:rPr lang="en-US" sz="800" b="1" dirty="0" err="1" smtClean="0">
+              <a:rPr lang="en-US" sz="700" b="1" dirty="0" err="1" smtClean="0">
                 <a:solidFill>
-                  <a:schemeClr val="bg1">
-                    <a:lumMod val="75000"/>
+                  <a:schemeClr val="tx1">
+                    <a:lumMod val="50000"/>
+                    <a:lumOff val="50000"/>
                   </a:schemeClr>
                 </a:solidFill>
               </a:rPr>
               <a:t>ssh</a:t>
             </a:r>
-            <a:endParaRPr lang="de-DE" sz="800" b="1" dirty="0" smtClean="0">
+            <a:endParaRPr lang="de-DE" sz="700" b="1" dirty="0" smtClean="0">
               <a:solidFill>
-                <a:schemeClr val="bg1">
-                  <a:lumMod val="75000"/>
+                <a:schemeClr val="tx1">
+                  <a:lumMod val="50000"/>
+                  <a:lumOff val="50000"/>
                 </a:schemeClr>
               </a:solidFill>
             </a:endParaRPr>
@@ -4186,8 +4190,8 @@
         </p:nvSpPr>
         <p:spPr>
           <a:xfrm>
-            <a:off x="573520" y="1973472"/>
-            <a:ext cx="2539384" cy="2338865"/>
+            <a:off x="847840" y="1741445"/>
+            <a:ext cx="2270288" cy="2031592"/>
           </a:xfrm>
           <a:prstGeom prst="rect">
             <a:avLst/>
@@ -4224,13 +4228,13 @@
             <a:prstTxWarp prst="textNoShape">
               <a:avLst/>
             </a:prstTxWarp>
-            <a:spAutoFit/>
+            <a:noAutofit/>
           </a:bodyPr>
           <a:lstStyle/>
           <a:p>
             <a:pPr algn="ctr"/>
             <a:r>
-              <a:rPr lang="en-US" sz="900" b="1" dirty="0" smtClean="0"/>
+              <a:rPr lang="en-US" sz="800" b="1" dirty="0" smtClean="0"/>
               <a:t>Browse</a:t>
             </a:r>
           </a:p>
@@ -4240,20 +4244,20 @@
           </a:p>
           <a:p>
             <a:r>
-              <a:rPr lang="en-US" sz="800" b="1" dirty="0" smtClean="0"/>
+              <a:rPr lang="en-US" sz="700" b="1" dirty="0" smtClean="0"/>
               <a:t>Files changed in working directory</a:t>
             </a:r>
           </a:p>
           <a:p>
             <a:r>
-              <a:rPr lang="en-US" sz="800" dirty="0" err="1" smtClean="0">
+              <a:rPr lang="en-US" sz="700" dirty="0" err="1" smtClean="0">
                 <a:latin typeface="Courier New" pitchFamily="49" charset="0"/>
                 <a:cs typeface="Courier New" pitchFamily="49" charset="0"/>
               </a:rPr>
               <a:t>git</a:t>
             </a:r>
             <a:r>
-              <a:rPr lang="en-US" sz="800" dirty="0" smtClean="0">
+              <a:rPr lang="en-US" sz="700" dirty="0" smtClean="0">
                 <a:latin typeface="Courier New" pitchFamily="49" charset="0"/>
                 <a:cs typeface="Courier New" pitchFamily="49" charset="0"/>
               </a:rPr>
@@ -4262,20 +4266,20 @@
           </a:p>
           <a:p>
             <a:r>
-              <a:rPr lang="en-US" sz="800" b="1" dirty="0" smtClean="0"/>
+              <a:rPr lang="en-US" sz="700" b="1" dirty="0" smtClean="0"/>
               <a:t>Changes to tracked files</a:t>
             </a:r>
           </a:p>
           <a:p>
             <a:r>
-              <a:rPr lang="en-US" sz="800" dirty="0" err="1" smtClean="0">
+              <a:rPr lang="en-US" sz="700" dirty="0" err="1" smtClean="0">
                 <a:latin typeface="Courier New" pitchFamily="49" charset="0"/>
                 <a:cs typeface="Courier New" pitchFamily="49" charset="0"/>
               </a:rPr>
               <a:t>git</a:t>
             </a:r>
             <a:r>
-              <a:rPr lang="en-US" sz="800" dirty="0" smtClean="0">
+              <a:rPr lang="en-US" sz="700" dirty="0" smtClean="0">
                 <a:latin typeface="Courier New" pitchFamily="49" charset="0"/>
                 <a:cs typeface="Courier New" pitchFamily="49" charset="0"/>
               </a:rPr>
@@ -4284,20 +4288,20 @@
           </a:p>
           <a:p>
             <a:r>
-              <a:rPr lang="en-US" sz="800" b="1" dirty="0" smtClean="0"/>
+              <a:rPr lang="en-US" sz="700" b="1" dirty="0" smtClean="0"/>
               <a:t>Changes between ID1 and ID2</a:t>
             </a:r>
           </a:p>
           <a:p>
             <a:r>
-              <a:rPr lang="en-US" sz="800" dirty="0" err="1" smtClean="0">
+              <a:rPr lang="en-US" sz="700" dirty="0" err="1" smtClean="0">
                 <a:latin typeface="Courier New" pitchFamily="49" charset="0"/>
                 <a:cs typeface="Courier New" pitchFamily="49" charset="0"/>
               </a:rPr>
               <a:t>git</a:t>
             </a:r>
             <a:r>
-              <a:rPr lang="en-US" sz="800" dirty="0" smtClean="0">
+              <a:rPr lang="en-US" sz="700" dirty="0" smtClean="0">
                 <a:latin typeface="Courier New" pitchFamily="49" charset="0"/>
                 <a:cs typeface="Courier New" pitchFamily="49" charset="0"/>
               </a:rPr>
@@ -4306,20 +4310,20 @@
           </a:p>
           <a:p>
             <a:r>
-              <a:rPr lang="en-US" sz="800" b="1" dirty="0" smtClean="0"/>
+              <a:rPr lang="en-US" sz="700" b="1" dirty="0" smtClean="0"/>
               <a:t>History of changes</a:t>
             </a:r>
           </a:p>
           <a:p>
             <a:r>
-              <a:rPr lang="en-US" sz="800" dirty="0" err="1" smtClean="0">
+              <a:rPr lang="en-US" sz="700" dirty="0" err="1" smtClean="0">
                 <a:latin typeface="Courier New" pitchFamily="49" charset="0"/>
                 <a:cs typeface="Courier New" pitchFamily="49" charset="0"/>
               </a:rPr>
               <a:t>git</a:t>
             </a:r>
             <a:r>
-              <a:rPr lang="en-US" sz="800" dirty="0" smtClean="0">
+              <a:rPr lang="en-US" sz="700" dirty="0" smtClean="0">
                 <a:latin typeface="Courier New" pitchFamily="49" charset="0"/>
                 <a:cs typeface="Courier New" pitchFamily="49" charset="0"/>
               </a:rPr>
@@ -4328,20 +4332,20 @@
           </a:p>
           <a:p>
             <a:r>
-              <a:rPr lang="en-US" sz="800" b="1" dirty="0" smtClean="0"/>
+              <a:rPr lang="en-US" sz="700" b="1" dirty="0" smtClean="0"/>
               <a:t>Who changed what and when in a file</a:t>
             </a:r>
           </a:p>
           <a:p>
             <a:r>
-              <a:rPr lang="en-US" sz="800" dirty="0" err="1" smtClean="0">
+              <a:rPr lang="en-US" sz="700" dirty="0" err="1" smtClean="0">
                 <a:latin typeface="Courier New" pitchFamily="49" charset="0"/>
                 <a:cs typeface="Courier New" pitchFamily="49" charset="0"/>
               </a:rPr>
               <a:t>git</a:t>
             </a:r>
             <a:r>
-              <a:rPr lang="en-US" sz="800" dirty="0" smtClean="0">
+              <a:rPr lang="en-US" sz="700" dirty="0" smtClean="0">
                 <a:latin typeface="Courier New" pitchFamily="49" charset="0"/>
                 <a:cs typeface="Courier New" pitchFamily="49" charset="0"/>
               </a:rPr>
@@ -4350,20 +4354,20 @@
           </a:p>
           <a:p>
             <a:r>
-              <a:rPr lang="en-US" sz="800" b="1" dirty="0" smtClean="0"/>
+              <a:rPr lang="en-US" sz="700" b="1" dirty="0" smtClean="0"/>
               <a:t>A commit identified by ID</a:t>
             </a:r>
           </a:p>
           <a:p>
             <a:r>
-              <a:rPr lang="en-US" sz="800" dirty="0" err="1" smtClean="0">
+              <a:rPr lang="en-US" sz="700" dirty="0" err="1" smtClean="0">
                 <a:latin typeface="Courier New" pitchFamily="49" charset="0"/>
                 <a:cs typeface="Courier New" pitchFamily="49" charset="0"/>
               </a:rPr>
               <a:t>git</a:t>
             </a:r>
             <a:r>
-              <a:rPr lang="en-US" sz="800" dirty="0" smtClean="0">
+              <a:rPr lang="en-US" sz="700" dirty="0" smtClean="0">
                 <a:latin typeface="Courier New" pitchFamily="49" charset="0"/>
                 <a:cs typeface="Courier New" pitchFamily="49" charset="0"/>
               </a:rPr>
@@ -4372,20 +4376,20 @@
           </a:p>
           <a:p>
             <a:r>
-              <a:rPr lang="en-US" sz="800" b="1" dirty="0" smtClean="0"/>
+              <a:rPr lang="en-US" sz="700" b="1" dirty="0" smtClean="0"/>
               <a:t>A specific file from a specific ID</a:t>
             </a:r>
           </a:p>
           <a:p>
             <a:r>
-              <a:rPr lang="en-US" sz="800" dirty="0" err="1" smtClean="0">
+              <a:rPr lang="en-US" sz="700" dirty="0" err="1" smtClean="0">
                 <a:latin typeface="Courier New" pitchFamily="49" charset="0"/>
                 <a:cs typeface="Courier New" pitchFamily="49" charset="0"/>
               </a:rPr>
               <a:t>git</a:t>
             </a:r>
             <a:r>
-              <a:rPr lang="en-US" sz="800" dirty="0" smtClean="0">
+              <a:rPr lang="en-US" sz="700" dirty="0" smtClean="0">
                 <a:latin typeface="Courier New" pitchFamily="49" charset="0"/>
                 <a:cs typeface="Courier New" pitchFamily="49" charset="0"/>
               </a:rPr>
@@ -4394,40 +4398,40 @@
           </a:p>
           <a:p>
             <a:r>
-              <a:rPr lang="en-US" sz="800" b="1" dirty="0" smtClean="0"/>
+              <a:rPr lang="en-US" sz="700" b="1" dirty="0" smtClean="0"/>
               <a:t>Search for patterns</a:t>
             </a:r>
           </a:p>
           <a:p>
             <a:r>
-              <a:rPr lang="en-US" sz="800" dirty="0" err="1" smtClean="0">
+              <a:rPr lang="en-US" sz="700" dirty="0" err="1" smtClean="0">
                 <a:latin typeface="Courier New" pitchFamily="49" charset="0"/>
                 <a:cs typeface="Courier New" pitchFamily="49" charset="0"/>
               </a:rPr>
               <a:t>git</a:t>
             </a:r>
             <a:r>
-              <a:rPr lang="en-US" sz="800" dirty="0" smtClean="0">
+              <a:rPr lang="en-US" sz="700" dirty="0" smtClean="0">
                 <a:latin typeface="Courier New" pitchFamily="49" charset="0"/>
                 <a:cs typeface="Courier New" pitchFamily="49" charset="0"/>
               </a:rPr>
               <a:t> </a:t>
             </a:r>
             <a:r>
-              <a:rPr lang="en-US" sz="800" dirty="0" err="1" smtClean="0">
+              <a:rPr lang="en-US" sz="700" dirty="0" err="1" smtClean="0">
                 <a:latin typeface="Courier New" pitchFamily="49" charset="0"/>
                 <a:cs typeface="Courier New" pitchFamily="49" charset="0"/>
               </a:rPr>
               <a:t>grep</a:t>
             </a:r>
             <a:r>
-              <a:rPr lang="en-US" sz="800" dirty="0" smtClean="0">
+              <a:rPr lang="en-US" sz="700" dirty="0" smtClean="0">
                 <a:latin typeface="Courier New" pitchFamily="49" charset="0"/>
                 <a:cs typeface="Courier New" pitchFamily="49" charset="0"/>
               </a:rPr>
               <a:t> &lt;pattern&gt; [path]</a:t>
             </a:r>
-            <a:endParaRPr lang="de-DE" sz="800" dirty="0">
+            <a:endParaRPr lang="de-DE" sz="700" dirty="0">
               <a:latin typeface="Courier New" pitchFamily="49" charset="0"/>
               <a:cs typeface="Courier New" pitchFamily="49" charset="0"/>
             </a:endParaRPr>
@@ -4442,8 +4446,8 @@
         </p:nvSpPr>
         <p:spPr>
           <a:xfrm>
-            <a:off x="3337456" y="358298"/>
-            <a:ext cx="2252838" cy="599459"/>
+            <a:off x="3337456" y="358299"/>
+            <a:ext cx="2252838" cy="478413"/>
           </a:xfrm>
           <a:prstGeom prst="rect">
             <a:avLst/>
@@ -4479,21 +4483,21 @@
           <a:p>
             <a:pPr algn="ctr"/>
             <a:r>
-              <a:rPr lang="de-DE" sz="900" b="1" dirty="0" smtClean="0"/>
+              <a:rPr lang="de-DE" sz="800" b="1" dirty="0" smtClean="0"/>
               <a:t>Change</a:t>
             </a:r>
           </a:p>
           <a:p>
             <a:pPr algn="ctr"/>
-            <a:endParaRPr lang="de-DE" sz="900" dirty="0" smtClean="0"/>
+            <a:endParaRPr lang="de-DE" sz="800" dirty="0" smtClean="0"/>
           </a:p>
           <a:p>
             <a:pPr algn="ctr"/>
             <a:r>
-              <a:rPr lang="de-DE" sz="800" dirty="0" smtClean="0"/>
+              <a:rPr lang="de-DE" sz="700" dirty="0" smtClean="0"/>
               <a:t>Using your favorite editor / IDE</a:t>
             </a:r>
-            <a:endParaRPr lang="de-DE" sz="800" dirty="0"/>
+            <a:endParaRPr lang="de-DE" sz="700" dirty="0"/>
           </a:p>
         </p:txBody>
       </p:sp>
@@ -4505,8 +4509,8 @@
         </p:nvSpPr>
         <p:spPr>
           <a:xfrm>
-            <a:off x="3337456" y="1124744"/>
-            <a:ext cx="2252838" cy="2078582"/>
+            <a:off x="3337456" y="1052736"/>
+            <a:ext cx="2252838" cy="1810447"/>
           </a:xfrm>
           <a:prstGeom prst="rect">
             <a:avLst/>
@@ -4536,13 +4540,13 @@
             <a:prstTxWarp prst="textNoShape">
               <a:avLst/>
             </a:prstTxWarp>
-            <a:spAutoFit/>
+            <a:noAutofit/>
           </a:bodyPr>
           <a:lstStyle/>
           <a:p>
             <a:pPr algn="ctr"/>
             <a:r>
-              <a:rPr lang="en-US" sz="900" b="1" dirty="0" smtClean="0"/>
+              <a:rPr lang="en-US" sz="800" b="1" dirty="0" smtClean="0"/>
               <a:t>Revert</a:t>
             </a:r>
           </a:p>
@@ -4552,34 +4556,34 @@
           </a:p>
           <a:p>
             <a:r>
-              <a:rPr lang="en-US" sz="800" b="1" dirty="0" smtClean="0"/>
+              <a:rPr lang="en-US" sz="700" b="1" dirty="0" smtClean="0"/>
               <a:t>Return to the last committed state</a:t>
             </a:r>
           </a:p>
           <a:p>
             <a:r>
-              <a:rPr lang="en-US" sz="800" dirty="0" err="1" smtClean="0">
+              <a:rPr lang="en-US" sz="700" dirty="0" err="1" smtClean="0">
                 <a:latin typeface="Courier New" pitchFamily="49" charset="0"/>
                 <a:cs typeface="Courier New" pitchFamily="49" charset="0"/>
               </a:rPr>
               <a:t>git</a:t>
             </a:r>
             <a:r>
-              <a:rPr lang="en-US" sz="800" dirty="0" smtClean="0">
+              <a:rPr lang="en-US" sz="700" dirty="0" smtClean="0">
                 <a:latin typeface="Courier New" pitchFamily="49" charset="0"/>
                 <a:cs typeface="Courier New" pitchFamily="49" charset="0"/>
               </a:rPr>
               <a:t> checkout -f | </a:t>
             </a:r>
             <a:r>
-              <a:rPr lang="en-US" sz="800" dirty="0" err="1" smtClean="0">
+              <a:rPr lang="en-US" sz="700" dirty="0" err="1" smtClean="0">
                 <a:latin typeface="Courier New" pitchFamily="49" charset="0"/>
                 <a:cs typeface="Courier New" pitchFamily="49" charset="0"/>
               </a:rPr>
               <a:t>git</a:t>
             </a:r>
             <a:r>
-              <a:rPr lang="en-US" sz="800" dirty="0" smtClean="0">
+              <a:rPr lang="en-US" sz="700" dirty="0" smtClean="0">
                 <a:latin typeface="Courier New" pitchFamily="49" charset="0"/>
                 <a:cs typeface="Courier New" pitchFamily="49" charset="0"/>
               </a:rPr>
@@ -4589,10 +4593,11 @@
           <a:p>
             <a:pPr algn="r"/>
             <a:r>
-              <a:rPr lang="en-US" sz="800" dirty="0" smtClean="0">
+              <a:rPr lang="en-US" sz="700" dirty="0" smtClean="0">
                 <a:solidFill>
-                  <a:schemeClr val="bg1">
-                    <a:lumMod val="75000"/>
+                  <a:schemeClr val="tx1">
+                    <a:lumMod val="50000"/>
+                    <a:lumOff val="50000"/>
                   </a:schemeClr>
                 </a:solidFill>
               </a:rPr>
@@ -4601,20 +4606,20 @@
           </a:p>
           <a:p>
             <a:r>
-              <a:rPr lang="en-US" sz="800" b="1" dirty="0" smtClean="0"/>
+              <a:rPr lang="en-US" sz="700" b="1" dirty="0" smtClean="0"/>
               <a:t>Revert the last commit</a:t>
             </a:r>
           </a:p>
           <a:p>
             <a:r>
-              <a:rPr lang="en-US" sz="800" dirty="0" err="1" smtClean="0">
+              <a:rPr lang="en-US" sz="700" dirty="0" err="1" smtClean="0">
                 <a:latin typeface="Courier New" pitchFamily="49" charset="0"/>
                 <a:cs typeface="Courier New" pitchFamily="49" charset="0"/>
               </a:rPr>
               <a:t>git</a:t>
             </a:r>
             <a:r>
-              <a:rPr lang="en-US" sz="800" dirty="0" smtClean="0">
+              <a:rPr lang="en-US" sz="700" dirty="0" smtClean="0">
                 <a:latin typeface="Courier New" pitchFamily="49" charset="0"/>
                 <a:cs typeface="Courier New" pitchFamily="49" charset="0"/>
               </a:rPr>
@@ -4624,10 +4629,11 @@
           <a:p>
             <a:pPr algn="r"/>
             <a:r>
-              <a:rPr lang="en-US" sz="800" dirty="0" smtClean="0">
+              <a:rPr lang="en-US" sz="700" dirty="0" smtClean="0">
                 <a:solidFill>
-                  <a:schemeClr val="bg1">
-                    <a:lumMod val="75000"/>
+                  <a:schemeClr val="tx1">
+                    <a:lumMod val="50000"/>
+                    <a:lumOff val="50000"/>
                   </a:schemeClr>
                 </a:solidFill>
               </a:rPr>
@@ -4636,20 +4642,20 @@
           </a:p>
           <a:p>
             <a:r>
-              <a:rPr lang="en-US" sz="800" b="1" dirty="0" smtClean="0"/>
+              <a:rPr lang="en-US" sz="700" b="1" dirty="0" smtClean="0"/>
               <a:t>Revert specific commit</a:t>
             </a:r>
           </a:p>
           <a:p>
             <a:r>
-              <a:rPr lang="en-US" sz="800" dirty="0" err="1" smtClean="0">
+              <a:rPr lang="en-US" sz="700" dirty="0" err="1" smtClean="0">
                 <a:latin typeface="Courier New" pitchFamily="49" charset="0"/>
                 <a:cs typeface="Courier New" pitchFamily="49" charset="0"/>
               </a:rPr>
               <a:t>git</a:t>
             </a:r>
             <a:r>
-              <a:rPr lang="en-US" sz="800" dirty="0" smtClean="0">
+              <a:rPr lang="en-US" sz="700" dirty="0" smtClean="0">
                 <a:latin typeface="Courier New" pitchFamily="49" charset="0"/>
                 <a:cs typeface="Courier New" pitchFamily="49" charset="0"/>
               </a:rPr>
@@ -4659,10 +4665,11 @@
           <a:p>
             <a:pPr algn="r"/>
             <a:r>
-              <a:rPr lang="en-US" sz="800" dirty="0" smtClean="0">
+              <a:rPr lang="en-US" sz="700" dirty="0" smtClean="0">
                 <a:solidFill>
-                  <a:schemeClr val="bg1">
-                    <a:lumMod val="75000"/>
+                  <a:schemeClr val="tx1">
+                    <a:lumMod val="50000"/>
+                    <a:lumOff val="50000"/>
                   </a:schemeClr>
                 </a:solidFill>
               </a:rPr>
@@ -4671,20 +4678,20 @@
           </a:p>
           <a:p>
             <a:r>
-              <a:rPr lang="en-US" sz="800" b="1" dirty="0" smtClean="0"/>
+              <a:rPr lang="en-US" sz="700" b="1" dirty="0" smtClean="0"/>
               <a:t>Fix the last commit</a:t>
             </a:r>
           </a:p>
           <a:p>
             <a:r>
-              <a:rPr lang="en-US" sz="800" dirty="0" err="1" smtClean="0">
+              <a:rPr lang="en-US" sz="700" dirty="0" err="1" smtClean="0">
                 <a:latin typeface="Courier New" pitchFamily="49" charset="0"/>
                 <a:cs typeface="Courier New" pitchFamily="49" charset="0"/>
               </a:rPr>
               <a:t>git</a:t>
             </a:r>
             <a:r>
-              <a:rPr lang="en-US" sz="800" dirty="0" smtClean="0">
+              <a:rPr lang="en-US" sz="700" dirty="0" smtClean="0">
                 <a:latin typeface="Courier New" pitchFamily="49" charset="0"/>
                 <a:cs typeface="Courier New" pitchFamily="49" charset="0"/>
               </a:rPr>
@@ -4694,10 +4701,11 @@
           <a:p>
             <a:pPr algn="r"/>
             <a:r>
-              <a:rPr lang="en-US" sz="800" dirty="0" smtClean="0">
+              <a:rPr lang="en-US" sz="700" dirty="0" smtClean="0">
                 <a:solidFill>
-                  <a:schemeClr val="bg1">
-                    <a:lumMod val="75000"/>
+                  <a:schemeClr val="tx1">
+                    <a:lumMod val="50000"/>
+                    <a:lumOff val="50000"/>
                   </a:schemeClr>
                 </a:solidFill>
               </a:rPr>
@@ -4706,26 +4714,26 @@
           </a:p>
           <a:p>
             <a:r>
-              <a:rPr lang="en-US" sz="800" b="1" dirty="0" smtClean="0"/>
+              <a:rPr lang="en-US" sz="700" b="1" dirty="0" smtClean="0"/>
               <a:t>Checkout the ID version of a file</a:t>
             </a:r>
           </a:p>
           <a:p>
             <a:r>
-              <a:rPr lang="en-US" sz="800" dirty="0" err="1" smtClean="0">
+              <a:rPr lang="en-US" sz="700" dirty="0" err="1" smtClean="0">
                 <a:latin typeface="Courier New" pitchFamily="49" charset="0"/>
                 <a:cs typeface="Courier New" pitchFamily="49" charset="0"/>
               </a:rPr>
               <a:t>git</a:t>
             </a:r>
             <a:r>
-              <a:rPr lang="en-US" sz="800" dirty="0" smtClean="0">
+              <a:rPr lang="en-US" sz="700" dirty="0" smtClean="0">
                 <a:latin typeface="Courier New" pitchFamily="49" charset="0"/>
                 <a:cs typeface="Courier New" pitchFamily="49" charset="0"/>
               </a:rPr>
               <a:t> checkout &lt;ID&gt; &lt;file&gt;</a:t>
             </a:r>
-            <a:endParaRPr lang="de-DE" sz="800" dirty="0">
+            <a:endParaRPr lang="de-DE" sz="700" dirty="0">
               <a:latin typeface="Courier New" pitchFamily="49" charset="0"/>
               <a:cs typeface="Courier New" pitchFamily="49" charset="0"/>
             </a:endParaRPr>
@@ -4741,7 +4749,7 @@
         <p:spPr>
           <a:xfrm>
             <a:off x="5911457" y="358219"/>
-            <a:ext cx="2592288" cy="1584176"/>
+            <a:ext cx="2592288" cy="1448156"/>
           </a:xfrm>
           <a:prstGeom prst="rect">
             <a:avLst/>
@@ -4767,35 +4775,37 @@
           </a:fontRef>
         </p:style>
         <p:txBody>
-          <a:bodyPr lIns="90000" tIns="46800" rIns="90000" bIns="46800" rtlCol="0" anchor="ctr"/>
+          <a:bodyPr lIns="90000" tIns="46800" rIns="90000" bIns="46800" rtlCol="0" anchor="ctr">
+            <a:noAutofit/>
+          </a:bodyPr>
           <a:lstStyle/>
           <a:p>
             <a:pPr algn="ctr"/>
             <a:r>
-              <a:rPr lang="en-US" sz="900" b="1" dirty="0"/>
+              <a:rPr lang="en-US" sz="800" b="1" dirty="0"/>
               <a:t>Update</a:t>
             </a:r>
           </a:p>
           <a:p>
             <a:pPr algn="ctr"/>
-            <a:endParaRPr lang="en-US" sz="900" b="1" dirty="0"/>
-          </a:p>
-          <a:p>
-            <a:r>
-              <a:rPr lang="en-US" sz="800" b="1" dirty="0"/>
+            <a:endParaRPr lang="en-US" sz="800" b="1" dirty="0"/>
+          </a:p>
+          <a:p>
+            <a:r>
+              <a:rPr lang="en-US" sz="700" b="1" dirty="0"/>
               <a:t>Fetch latest changes from origin</a:t>
             </a:r>
           </a:p>
           <a:p>
             <a:r>
-              <a:rPr lang="en-US" sz="800" dirty="0" err="1">
+              <a:rPr lang="en-US" sz="700" dirty="0" err="1">
                 <a:latin typeface="Courier New" pitchFamily="49" charset="0"/>
                 <a:cs typeface="Courier New" pitchFamily="49" charset="0"/>
               </a:rPr>
               <a:t>git</a:t>
             </a:r>
             <a:r>
-              <a:rPr lang="en-US" sz="800" dirty="0">
+              <a:rPr lang="en-US" sz="700" dirty="0">
                 <a:latin typeface="Courier New" pitchFamily="49" charset="0"/>
                 <a:cs typeface="Courier New" pitchFamily="49" charset="0"/>
               </a:rPr>
@@ -4805,10 +4815,11 @@
           <a:p>
             <a:pPr algn="r"/>
             <a:r>
-              <a:rPr lang="en-US" sz="800" dirty="0">
+              <a:rPr lang="en-US" sz="700" dirty="0">
                 <a:solidFill>
-                  <a:schemeClr val="bg1">
-                    <a:lumMod val="75000"/>
+                  <a:schemeClr val="tx1">
+                    <a:lumMod val="50000"/>
+                    <a:lumOff val="50000"/>
                   </a:schemeClr>
                 </a:solidFill>
               </a:rPr>
@@ -4817,20 +4828,20 @@
           </a:p>
           <a:p>
             <a:r>
-              <a:rPr lang="en-US" sz="800" b="1" dirty="0"/>
+              <a:rPr lang="en-US" sz="700" b="1" dirty="0"/>
               <a:t>Pull latest changes from origin</a:t>
             </a:r>
           </a:p>
           <a:p>
             <a:r>
-              <a:rPr lang="en-US" sz="800" dirty="0" err="1">
+              <a:rPr lang="en-US" sz="700" dirty="0" err="1">
                 <a:latin typeface="Courier New" pitchFamily="49" charset="0"/>
                 <a:cs typeface="Courier New" pitchFamily="49" charset="0"/>
               </a:rPr>
               <a:t>git</a:t>
             </a:r>
             <a:r>
-              <a:rPr lang="en-US" sz="800" dirty="0">
+              <a:rPr lang="en-US" sz="700" dirty="0">
                 <a:latin typeface="Courier New" pitchFamily="49" charset="0"/>
                 <a:cs typeface="Courier New" pitchFamily="49" charset="0"/>
               </a:rPr>
@@ -4840,10 +4851,11 @@
           <a:p>
             <a:pPr algn="r"/>
             <a:r>
-              <a:rPr lang="en-US" sz="800" dirty="0">
+              <a:rPr lang="en-US" sz="700" dirty="0">
                 <a:solidFill>
-                  <a:schemeClr val="bg1">
-                    <a:lumMod val="75000"/>
+                  <a:schemeClr val="tx1">
+                    <a:lumMod val="50000"/>
+                    <a:lumOff val="50000"/>
                   </a:schemeClr>
                 </a:solidFill>
               </a:rPr>
@@ -4852,33 +4864,33 @@
           </a:p>
           <a:p>
             <a:r>
-              <a:rPr lang="en-US" sz="800" b="1" dirty="0"/>
+              <a:rPr lang="en-US" sz="700" b="1" dirty="0"/>
               <a:t>Apply a patch that someone sent you</a:t>
             </a:r>
           </a:p>
           <a:p>
             <a:r>
-              <a:rPr lang="en-US" sz="800" dirty="0" err="1">
+              <a:rPr lang="en-US" sz="700" dirty="0" err="1">
                 <a:latin typeface="Courier New" pitchFamily="49" charset="0"/>
                 <a:cs typeface="Courier New" pitchFamily="49" charset="0"/>
               </a:rPr>
               <a:t>git</a:t>
             </a:r>
             <a:r>
-              <a:rPr lang="en-US" sz="800" dirty="0">
+              <a:rPr lang="en-US" sz="700" dirty="0">
                 <a:latin typeface="Courier New" pitchFamily="49" charset="0"/>
                 <a:cs typeface="Courier New" pitchFamily="49" charset="0"/>
               </a:rPr>
               <a:t> am -3 </a:t>
             </a:r>
             <a:r>
-              <a:rPr lang="en-US" sz="800" dirty="0" err="1">
+              <a:rPr lang="en-US" sz="700" dirty="0" err="1">
                 <a:latin typeface="Courier New" pitchFamily="49" charset="0"/>
                 <a:cs typeface="Courier New" pitchFamily="49" charset="0"/>
               </a:rPr>
               <a:t>patch.mbox</a:t>
             </a:r>
-            <a:endParaRPr lang="en-US" sz="800" dirty="0">
+            <a:endParaRPr lang="en-US" sz="700" dirty="0">
               <a:latin typeface="Courier New" pitchFamily="49" charset="0"/>
               <a:cs typeface="Courier New" pitchFamily="49" charset="0"/>
             </a:endParaRPr>
@@ -4886,10 +4898,11 @@
           <a:p>
             <a:pPr algn="r"/>
             <a:r>
-              <a:rPr lang="en-US" sz="800" dirty="0">
+              <a:rPr lang="en-US" sz="700" dirty="0">
                 <a:solidFill>
-                  <a:schemeClr val="bg1">
-                    <a:lumMod val="75000"/>
+                  <a:schemeClr val="tx1">
+                    <a:lumMod val="50000"/>
+                    <a:lumOff val="50000"/>
                   </a:schemeClr>
                 </a:solidFill>
               </a:rPr>
@@ -4898,20 +4911,20 @@
           </a:p>
           <a:p>
             <a:r>
-              <a:rPr lang="en-US" sz="800" dirty="0" err="1">
+              <a:rPr lang="en-US" sz="700" dirty="0" err="1">
                 <a:latin typeface="Courier New" pitchFamily="49" charset="0"/>
                 <a:cs typeface="Courier New" pitchFamily="49" charset="0"/>
               </a:rPr>
               <a:t>git</a:t>
             </a:r>
             <a:r>
-              <a:rPr lang="en-US" sz="800" dirty="0">
+              <a:rPr lang="en-US" sz="700" dirty="0">
                 <a:latin typeface="Courier New" pitchFamily="49" charset="0"/>
                 <a:cs typeface="Courier New" pitchFamily="49" charset="0"/>
               </a:rPr>
               <a:t> am --resolve</a:t>
             </a:r>
-            <a:endParaRPr lang="de-DE" sz="800" dirty="0">
+            <a:endParaRPr lang="de-DE" sz="700" dirty="0">
               <a:latin typeface="Courier New" pitchFamily="49" charset="0"/>
               <a:cs typeface="Courier New" pitchFamily="49" charset="0"/>
             </a:endParaRPr>
@@ -4926,7 +4939,7 @@
         </p:nvCxnSpPr>
         <p:spPr>
           <a:xfrm>
-            <a:off x="5743428" y="2824347"/>
+            <a:off x="5752897" y="2466699"/>
             <a:ext cx="576433" cy="0"/>
           </a:xfrm>
           <a:prstGeom prst="line">
@@ -4961,8 +4974,8 @@
         </p:nvSpPr>
         <p:spPr>
           <a:xfrm>
-            <a:off x="5926255" y="2132856"/>
-            <a:ext cx="2577490" cy="853711"/>
+            <a:off x="5926255" y="2022913"/>
+            <a:ext cx="2577490" cy="613999"/>
           </a:xfrm>
           <a:prstGeom prst="rect">
             <a:avLst/>
@@ -4988,44 +5001,53 @@
           </a:fontRef>
         </p:style>
         <p:txBody>
-          <a:bodyPr lIns="90000" tIns="46800" rIns="90000" bIns="46800" rtlCol="0" anchor="ctr"/>
+          <a:bodyPr lIns="90000" tIns="46800" rIns="90000" bIns="46800" rtlCol="0" anchor="ctr">
+            <a:noAutofit/>
+          </a:bodyPr>
           <a:lstStyle/>
           <a:p>
             <a:pPr algn="ctr"/>
             <a:r>
-              <a:rPr lang="de-DE" sz="900" b="1" dirty="0"/>
+              <a:rPr lang="de-DE" sz="800" b="1" dirty="0"/>
               <a:t>Commit</a:t>
             </a:r>
           </a:p>
           <a:p>
             <a:pPr algn="ctr"/>
-            <a:endParaRPr lang="de-DE" sz="900" b="1" dirty="0"/>
-          </a:p>
-          <a:p>
-            <a:r>
-              <a:rPr lang="en-US" sz="800" b="1" dirty="0"/>
+            <a:endParaRPr lang="de-DE" sz="800" b="1" dirty="0"/>
+          </a:p>
+          <a:p>
+            <a:r>
+              <a:rPr lang="en-US" sz="700" b="1" dirty="0"/>
               <a:t>Commit all local changes</a:t>
             </a:r>
           </a:p>
           <a:p>
             <a:r>
-              <a:rPr lang="en-US" sz="800" dirty="0" err="1">
+              <a:rPr lang="en-US" sz="700" dirty="0" err="1">
                 <a:latin typeface="Courier New" pitchFamily="49" charset="0"/>
                 <a:cs typeface="Courier New" pitchFamily="49" charset="0"/>
               </a:rPr>
               <a:t>git</a:t>
             </a:r>
             <a:r>
-              <a:rPr lang="en-US" sz="800" dirty="0">
-                <a:latin typeface="Courier New" pitchFamily="49" charset="0"/>
-                <a:cs typeface="Courier New" pitchFamily="49" charset="0"/>
-              </a:rPr>
-              <a:t> commit -a</a:t>
-            </a:r>
-          </a:p>
-          <a:p>
-            <a:pPr algn="ctr"/>
-            <a:endParaRPr lang="de-DE" sz="1000" dirty="0"/>
+              <a:rPr lang="en-US" sz="700" dirty="0">
+                <a:latin typeface="Courier New" pitchFamily="49" charset="0"/>
+                <a:cs typeface="Courier New" pitchFamily="49" charset="0"/>
+              </a:rPr>
+              <a:t> commit -</a:t>
+            </a:r>
+            <a:r>
+              <a:rPr lang="en-US" sz="700" dirty="0" smtClean="0">
+                <a:latin typeface="Courier New" pitchFamily="49" charset="0"/>
+                <a:cs typeface="Courier New" pitchFamily="49" charset="0"/>
+              </a:rPr>
+              <a:t>a</a:t>
+            </a:r>
+            <a:endParaRPr lang="en-US" sz="700" dirty="0">
+              <a:latin typeface="Courier New" pitchFamily="49" charset="0"/>
+              <a:cs typeface="Courier New" pitchFamily="49" charset="0"/>
+            </a:endParaRPr>
           </a:p>
         </p:txBody>
       </p:sp>
@@ -5037,8 +5059,8 @@
         </p:nvCxnSpPr>
         <p:spPr>
           <a:xfrm>
-            <a:off x="5752897" y="2805894"/>
-            <a:ext cx="0" cy="1721525"/>
+            <a:off x="5752700" y="2448907"/>
+            <a:ext cx="321" cy="1426192"/>
           </a:xfrm>
           <a:prstGeom prst="line">
             <a:avLst/>
@@ -5072,7 +5094,7 @@
         </p:nvCxnSpPr>
         <p:spPr>
           <a:xfrm>
-            <a:off x="5495157" y="4515632"/>
+            <a:off x="5495157" y="3861048"/>
             <a:ext cx="275600" cy="0"/>
           </a:xfrm>
           <a:prstGeom prst="line">
@@ -5107,8 +5129,8 @@
         </p:nvSpPr>
         <p:spPr>
           <a:xfrm>
-            <a:off x="3337456" y="3429000"/>
-            <a:ext cx="2252838" cy="1872208"/>
+            <a:off x="3337456" y="3068960"/>
+            <a:ext cx="2252838" cy="1728192"/>
           </a:xfrm>
           <a:prstGeom prst="rect">
             <a:avLst/>
@@ -5144,7 +5166,7 @@
           <a:p>
             <a:pPr algn="ctr"/>
             <a:r>
-              <a:rPr lang="de-DE" sz="900" b="1" dirty="0" smtClean="0"/>
+              <a:rPr lang="de-DE" sz="800" b="1" dirty="0" smtClean="0"/>
               <a:t>Branch</a:t>
             </a:r>
           </a:p>
@@ -5154,13 +5176,13 @@
           </a:p>
           <a:p>
             <a:r>
-              <a:rPr lang="de-DE" sz="800" b="1" dirty="0" smtClean="0"/>
+              <a:rPr lang="de-DE" sz="700" b="1" dirty="0" smtClean="0"/>
               <a:t>List all branches</a:t>
             </a:r>
           </a:p>
           <a:p>
             <a:r>
-              <a:rPr lang="de-DE" sz="800" dirty="0" smtClean="0">
+              <a:rPr lang="de-DE" sz="700" dirty="0" smtClean="0">
                 <a:latin typeface="Courier New" pitchFamily="49" charset="0"/>
                 <a:cs typeface="Courier New" pitchFamily="49" charset="0"/>
               </a:rPr>
@@ -5169,13 +5191,13 @@
           </a:p>
           <a:p>
             <a:r>
-              <a:rPr lang="de-DE" sz="800" b="1" dirty="0" smtClean="0"/>
+              <a:rPr lang="de-DE" sz="700" b="1" dirty="0" smtClean="0"/>
               <a:t>Switch to the BRANCH branch</a:t>
             </a:r>
           </a:p>
           <a:p>
             <a:r>
-              <a:rPr lang="de-DE" sz="800" dirty="0" smtClean="0">
+              <a:rPr lang="de-DE" sz="700" dirty="0" smtClean="0">
                 <a:latin typeface="Courier New" pitchFamily="49" charset="0"/>
                 <a:cs typeface="Courier New" pitchFamily="49" charset="0"/>
               </a:rPr>
@@ -5184,13 +5206,13 @@
           </a:p>
           <a:p>
             <a:r>
-              <a:rPr lang="de-DE" sz="800" b="1" dirty="0" smtClean="0"/>
+              <a:rPr lang="de-DE" sz="700" b="1" dirty="0" smtClean="0"/>
               <a:t>Merge branch B1 into branch B2</a:t>
             </a:r>
           </a:p>
           <a:p>
             <a:r>
-              <a:rPr lang="de-DE" sz="800" dirty="0" smtClean="0">
+              <a:rPr lang="de-DE" sz="700" dirty="0" smtClean="0">
                 <a:latin typeface="Courier New" pitchFamily="49" charset="0"/>
                 <a:cs typeface="Courier New" pitchFamily="49" charset="0"/>
               </a:rPr>
@@ -5199,7 +5221,7 @@
           </a:p>
           <a:p>
             <a:r>
-              <a:rPr lang="de-DE" sz="800" dirty="0" smtClean="0">
+              <a:rPr lang="de-DE" sz="700" dirty="0" smtClean="0">
                 <a:latin typeface="Courier New" pitchFamily="49" charset="0"/>
                 <a:cs typeface="Courier New" pitchFamily="49" charset="0"/>
               </a:rPr>
@@ -5208,13 +5230,13 @@
           </a:p>
           <a:p>
             <a:r>
-              <a:rPr lang="de-DE" sz="800" b="1" dirty="0" smtClean="0"/>
+              <a:rPr lang="de-DE" sz="700" b="1" dirty="0" smtClean="0"/>
               <a:t>Create branch based on HEAD</a:t>
             </a:r>
           </a:p>
           <a:p>
             <a:r>
-              <a:rPr lang="de-DE" sz="800" dirty="0" smtClean="0">
+              <a:rPr lang="de-DE" sz="700" dirty="0" smtClean="0">
                 <a:latin typeface="Courier New" pitchFamily="49" charset="0"/>
                 <a:cs typeface="Courier New" pitchFamily="49" charset="0"/>
               </a:rPr>
@@ -5223,13 +5245,13 @@
           </a:p>
           <a:p>
             <a:r>
-              <a:rPr lang="de-DE" sz="800" b="1" dirty="0" smtClean="0"/>
+              <a:rPr lang="de-DE" sz="700" b="1" dirty="0" smtClean="0"/>
               <a:t>Create branch based on another</a:t>
             </a:r>
           </a:p>
           <a:p>
             <a:r>
-              <a:rPr lang="de-DE" sz="800" dirty="0" smtClean="0">
+              <a:rPr lang="de-DE" sz="700" dirty="0" smtClean="0">
                 <a:latin typeface="Courier New" pitchFamily="49" charset="0"/>
                 <a:cs typeface="Courier New" pitchFamily="49" charset="0"/>
               </a:rPr>
@@ -5238,19 +5260,19 @@
           </a:p>
           <a:p>
             <a:r>
-              <a:rPr lang="de-DE" sz="800" b="1" dirty="0" smtClean="0"/>
+              <a:rPr lang="de-DE" sz="700" b="1" dirty="0" smtClean="0"/>
               <a:t>Delete a branch</a:t>
             </a:r>
           </a:p>
           <a:p>
             <a:r>
-              <a:rPr lang="de-DE" sz="800" dirty="0" smtClean="0">
+              <a:rPr lang="de-DE" sz="700" dirty="0" smtClean="0">
                 <a:latin typeface="Courier New" pitchFamily="49" charset="0"/>
                 <a:cs typeface="Courier New" pitchFamily="49" charset="0"/>
               </a:rPr>
               <a:t>git branch -d &lt;branch&gt;</a:t>
             </a:r>
-            <a:endParaRPr lang="de-DE" sz="800" dirty="0">
+            <a:endParaRPr lang="de-DE" sz="700" dirty="0">
               <a:latin typeface="Courier New" pitchFamily="49" charset="0"/>
               <a:cs typeface="Courier New" pitchFamily="49" charset="0"/>
             </a:endParaRPr>
@@ -5265,8 +5287,8 @@
         </p:nvSpPr>
         <p:spPr>
           <a:xfrm>
-            <a:off x="5926255" y="3192549"/>
-            <a:ext cx="2577490" cy="1357767"/>
+            <a:off x="5926255" y="2852936"/>
+            <a:ext cx="2577490" cy="1038923"/>
           </a:xfrm>
           <a:prstGeom prst="rect">
             <a:avLst/>
@@ -5295,35 +5317,37 @@
           </a:fontRef>
         </p:style>
         <p:txBody>
-          <a:bodyPr lIns="90000" tIns="46800" rIns="90000" bIns="46800" rtlCol="0" anchor="ctr"/>
+          <a:bodyPr lIns="90000" tIns="46800" rIns="90000" bIns="46800" rtlCol="0" anchor="ctr">
+            <a:noAutofit/>
+          </a:bodyPr>
           <a:lstStyle/>
           <a:p>
             <a:pPr algn="ctr"/>
             <a:r>
-              <a:rPr lang="en-US" sz="900" b="1" dirty="0"/>
+              <a:rPr lang="en-US" sz="800" b="1" dirty="0"/>
               <a:t>Publish</a:t>
             </a:r>
           </a:p>
           <a:p>
             <a:pPr algn="ctr"/>
-            <a:endParaRPr lang="en-US" sz="900" b="1" dirty="0"/>
-          </a:p>
-          <a:p>
-            <a:r>
-              <a:rPr lang="en-US" sz="800" b="1" dirty="0"/>
+            <a:endParaRPr lang="en-US" sz="800" b="1" dirty="0"/>
+          </a:p>
+          <a:p>
+            <a:r>
+              <a:rPr lang="en-US" sz="700" b="1" dirty="0"/>
               <a:t>Prepare a patch for other developers</a:t>
             </a:r>
           </a:p>
           <a:p>
             <a:r>
-              <a:rPr lang="en-US" sz="800" dirty="0" err="1">
+              <a:rPr lang="en-US" sz="700" dirty="0" err="1">
                 <a:latin typeface="Courier New" pitchFamily="49" charset="0"/>
                 <a:cs typeface="Courier New" pitchFamily="49" charset="0"/>
               </a:rPr>
               <a:t>git</a:t>
             </a:r>
             <a:r>
-              <a:rPr lang="en-US" sz="800" dirty="0">
+              <a:rPr lang="en-US" sz="700" dirty="0">
                 <a:latin typeface="Courier New" pitchFamily="49" charset="0"/>
                 <a:cs typeface="Courier New" pitchFamily="49" charset="0"/>
               </a:rPr>
@@ -5332,20 +5356,20 @@
           </a:p>
           <a:p>
             <a:r>
-              <a:rPr lang="en-US" sz="800" b="1" dirty="0"/>
+              <a:rPr lang="en-US" sz="700" b="1" dirty="0"/>
               <a:t>Push changes to origin</a:t>
             </a:r>
           </a:p>
           <a:p>
             <a:r>
-              <a:rPr lang="en-US" sz="800" dirty="0" err="1">
+              <a:rPr lang="en-US" sz="700" dirty="0" err="1">
                 <a:latin typeface="Courier New" pitchFamily="49" charset="0"/>
                 <a:cs typeface="Courier New" pitchFamily="49" charset="0"/>
               </a:rPr>
               <a:t>git</a:t>
             </a:r>
             <a:r>
-              <a:rPr lang="en-US" sz="800" dirty="0">
+              <a:rPr lang="en-US" sz="700" dirty="0">
                 <a:latin typeface="Courier New" pitchFamily="49" charset="0"/>
                 <a:cs typeface="Courier New" pitchFamily="49" charset="0"/>
               </a:rPr>
@@ -5354,40 +5378,40 @@
           </a:p>
           <a:p>
             <a:r>
-              <a:rPr lang="en-US" sz="800" b="1" dirty="0"/>
+              <a:rPr lang="en-US" sz="700" b="1" dirty="0"/>
               <a:t>Make a version or milestone</a:t>
             </a:r>
           </a:p>
           <a:p>
             <a:r>
-              <a:rPr lang="en-US" sz="800" dirty="0" err="1">
+              <a:rPr lang="en-US" sz="700" dirty="0" err="1">
                 <a:latin typeface="Courier New" pitchFamily="49" charset="0"/>
                 <a:cs typeface="Courier New" pitchFamily="49" charset="0"/>
               </a:rPr>
               <a:t>git</a:t>
             </a:r>
             <a:r>
-              <a:rPr lang="en-US" sz="800" dirty="0">
+              <a:rPr lang="en-US" sz="700" dirty="0">
                 <a:latin typeface="Courier New" pitchFamily="49" charset="0"/>
                 <a:cs typeface="Courier New" pitchFamily="49" charset="0"/>
               </a:rPr>
               <a:t> tag &lt;</a:t>
             </a:r>
             <a:r>
-              <a:rPr lang="en-US" sz="800" dirty="0" err="1">
+              <a:rPr lang="en-US" sz="700" dirty="0" err="1">
                 <a:latin typeface="Courier New" pitchFamily="49" charset="0"/>
                 <a:cs typeface="Courier New" pitchFamily="49" charset="0"/>
               </a:rPr>
               <a:t>version_name</a:t>
             </a:r>
             <a:r>
-              <a:rPr lang="en-US" sz="800" dirty="0">
+              <a:rPr lang="en-US" sz="700" dirty="0">
                 <a:latin typeface="Courier New" pitchFamily="49" charset="0"/>
                 <a:cs typeface="Courier New" pitchFamily="49" charset="0"/>
               </a:rPr>
               <a:t>&gt;</a:t>
             </a:r>
-            <a:endParaRPr lang="de-DE" sz="800" dirty="0">
+            <a:endParaRPr lang="de-DE" sz="700" dirty="0">
               <a:latin typeface="Courier New" pitchFamily="49" charset="0"/>
               <a:cs typeface="Courier New" pitchFamily="49" charset="0"/>
             </a:endParaRPr>
@@ -5401,9 +5425,9 @@
           <p:nvPr/>
         </p:nvCxnSpPr>
         <p:spPr>
-          <a:xfrm>
-            <a:off x="8706536" y="1052022"/>
-            <a:ext cx="0" cy="3766338"/>
+          <a:xfrm flipH="1">
+            <a:off x="8677129" y="1075048"/>
+            <a:ext cx="8183" cy="2995099"/>
           </a:xfrm>
           <a:prstGeom prst="line">
             <a:avLst/>
@@ -5429,6 +5453,1053 @@
           </a:fontRef>
         </p:style>
       </p:cxnSp>
+      <p:grpSp>
+        <p:nvGrpSpPr>
+          <p:cNvPr id="7" name="Group 6"/>
+          <p:cNvGrpSpPr/>
+          <p:nvPr/>
+        </p:nvGrpSpPr>
+        <p:grpSpPr>
+          <a:xfrm>
+            <a:off x="179513" y="295895"/>
+            <a:ext cx="461665" cy="1510480"/>
+            <a:chOff x="179513" y="353045"/>
+            <a:chExt cx="461665" cy="1510480"/>
+          </a:xfrm>
+        </p:grpSpPr>
+        <p:pic>
+          <p:nvPicPr>
+            <p:cNvPr id="1026" name="Picture 2"/>
+            <p:cNvPicPr>
+              <a:picLocks noChangeAspect="1" noChangeArrowheads="1"/>
+            </p:cNvPicPr>
+            <p:nvPr/>
+          </p:nvPicPr>
+          <p:blipFill>
+            <a:blip r:embed="rId3" cstate="print">
+              <a:extLst>
+                <a:ext uri="{28A0092B-C50C-407E-A947-70E740481C1C}">
+                  <a14:useLocalDpi xmlns:a14="http://schemas.microsoft.com/office/drawing/2010/main" val="0"/>
+                </a:ext>
+              </a:extLst>
+            </a:blip>
+            <a:srcRect/>
+            <a:stretch>
+              <a:fillRect/>
+            </a:stretch>
+          </p:blipFill>
+          <p:spPr bwMode="auto">
+            <a:xfrm>
+              <a:off x="327316" y="1556792"/>
+              <a:ext cx="158261" cy="306733"/>
+            </a:xfrm>
+            <a:prstGeom prst="rect">
+              <a:avLst/>
+            </a:prstGeom>
+            <a:noFill/>
+            <a:ln>
+              <a:noFill/>
+            </a:ln>
+            <a:effectLst/>
+            <a:extLst>
+              <a:ext uri="{909E8E84-426E-40DD-AFC4-6F175D3DCCD1}">
+                <a14:hiddenFill xmlns:a14="http://schemas.microsoft.com/office/drawing/2010/main">
+                  <a:solidFill>
+                    <a:schemeClr val="accent1"/>
+                  </a:solidFill>
+                </a14:hiddenFill>
+              </a:ext>
+              <a:ext uri="{91240B29-F687-4F45-9708-019B960494DF}">
+                <a14:hiddenLine xmlns:a14="http://schemas.microsoft.com/office/drawing/2010/main" w="9525">
+                  <a:solidFill>
+                    <a:schemeClr val="tx1"/>
+                  </a:solidFill>
+                  <a:miter lim="800000"/>
+                  <a:headEnd/>
+                  <a:tailEnd/>
+                </a14:hiddenLine>
+              </a:ext>
+              <a:ext uri="{AF507438-7753-43E0-B8FC-AC1667EBCBE1}">
+                <a14:hiddenEffects xmlns:a14="http://schemas.microsoft.com/office/drawing/2010/main">
+                  <a:effectLst>
+                    <a:outerShdw dist="35921" dir="2700000" algn="ctr" rotWithShape="0">
+                      <a:schemeClr val="bg2"/>
+                    </a:outerShdw>
+                  </a:effectLst>
+                </a14:hiddenEffects>
+              </a:ext>
+            </a:extLst>
+          </p:spPr>
+        </p:pic>
+        <p:sp>
+          <p:nvSpPr>
+            <p:cNvPr id="6" name="TextBox 5"/>
+            <p:cNvSpPr txBox="1"/>
+            <p:nvPr/>
+          </p:nvSpPr>
+          <p:spPr>
+            <a:xfrm>
+              <a:off x="179513" y="353045"/>
+              <a:ext cx="461665" cy="1245315"/>
+            </a:xfrm>
+            <a:prstGeom prst="rect">
+              <a:avLst/>
+            </a:prstGeom>
+            <a:noFill/>
+          </p:spPr>
+          <p:txBody>
+            <a:bodyPr vert="vert270" wrap="square" rtlCol="0">
+              <a:spAutoFit/>
+            </a:bodyPr>
+            <a:lstStyle/>
+            <a:p>
+              <a:pPr algn="r"/>
+              <a:r>
+                <a:rPr lang="de-DE" dirty="0" smtClean="0"/>
+                <a:t>Cheat Sheet</a:t>
+              </a:r>
+              <a:endParaRPr lang="de-DE" dirty="0"/>
+            </a:p>
+          </p:txBody>
+        </p:sp>
+      </p:grpSp>
+      <p:sp>
+        <p:nvSpPr>
+          <p:cNvPr id="23" name="TextBox 22"/>
+          <p:cNvSpPr txBox="1"/>
+          <p:nvPr/>
+        </p:nvSpPr>
+        <p:spPr>
+          <a:xfrm>
+            <a:off x="4537328" y="6514296"/>
+            <a:ext cx="4062528" cy="215444"/>
+          </a:xfrm>
+          <a:prstGeom prst="rect">
+            <a:avLst/>
+          </a:prstGeom>
+          <a:noFill/>
+        </p:spPr>
+        <p:txBody>
+          <a:bodyPr wrap="square" rtlCol="0">
+            <a:spAutoFit/>
+          </a:bodyPr>
+          <a:lstStyle/>
+          <a:p>
+            <a:pPr algn="r"/>
+            <a:r>
+              <a:rPr lang="en-US" sz="800" dirty="0">
+                <a:solidFill>
+                  <a:schemeClr val="tx2"/>
+                </a:solidFill>
+                <a:hlinkClick r:id="rId4"/>
+              </a:rPr>
+              <a:t>This work is licensed under a Creative Commons Attribution-Share Alike 3.0 </a:t>
+            </a:r>
+            <a:r>
+              <a:rPr lang="en-US" sz="800" dirty="0" err="1" smtClean="0">
+                <a:solidFill>
+                  <a:schemeClr val="tx2"/>
+                </a:solidFill>
+                <a:hlinkClick r:id="rId4"/>
+              </a:rPr>
+              <a:t>Unported</a:t>
+            </a:r>
+            <a:r>
+              <a:rPr lang="en-US" sz="800" dirty="0" smtClean="0">
+                <a:solidFill>
+                  <a:schemeClr val="tx2"/>
+                </a:solidFill>
+                <a:hlinkClick r:id="rId4"/>
+              </a:rPr>
+              <a:t> License</a:t>
+            </a:r>
+            <a:endParaRPr lang="de-DE" sz="800" dirty="0">
+              <a:solidFill>
+                <a:schemeClr val="tx2"/>
+              </a:solidFill>
+            </a:endParaRPr>
+          </a:p>
+        </p:txBody>
+      </p:sp>
+      <p:sp>
+        <p:nvSpPr>
+          <p:cNvPr id="28" name="Rectangle 27"/>
+          <p:cNvSpPr/>
+          <p:nvPr/>
+        </p:nvSpPr>
+        <p:spPr>
+          <a:xfrm>
+            <a:off x="847841" y="4082319"/>
+            <a:ext cx="2265064" cy="2367589"/>
+          </a:xfrm>
+          <a:prstGeom prst="rect">
+            <a:avLst/>
+          </a:prstGeom>
+          <a:gradFill>
+            <a:gsLst>
+              <a:gs pos="0">
+                <a:schemeClr val="bg1">
+                  <a:lumMod val="85000"/>
+                </a:schemeClr>
+              </a:gs>
+              <a:gs pos="50000">
+                <a:schemeClr val="bg1">
+                  <a:lumMod val="95000"/>
+                </a:schemeClr>
+              </a:gs>
+              <a:gs pos="100000">
+                <a:schemeClr val="dk1">
+                  <a:tint val="15000"/>
+                  <a:satMod val="350000"/>
+                </a:schemeClr>
+              </a:gs>
+            </a:gsLst>
+          </a:gradFill>
+          <a:effectLst/>
+        </p:spPr>
+        <p:style>
+          <a:lnRef idx="1">
+            <a:schemeClr val="dk1"/>
+          </a:lnRef>
+          <a:fillRef idx="2">
+            <a:schemeClr val="dk1"/>
+          </a:fillRef>
+          <a:effectRef idx="1">
+            <a:schemeClr val="dk1"/>
+          </a:effectRef>
+          <a:fontRef idx="minor">
+            <a:schemeClr val="dk1"/>
+          </a:fontRef>
+        </p:style>
+        <p:txBody>
+          <a:bodyPr rtlCol="0" anchor="ctr"/>
+          <a:lstStyle/>
+          <a:p>
+            <a:pPr algn="ctr"/>
+            <a:r>
+              <a:rPr lang="de-DE" sz="700" b="1" dirty="0"/>
+              <a:t>Useful </a:t>
+            </a:r>
+            <a:r>
+              <a:rPr lang="de-DE" sz="700" b="1" dirty="0" smtClean="0"/>
+              <a:t>ti</a:t>
+            </a:r>
+            <a:r>
+              <a:rPr lang="de-DE" sz="800" b="1" dirty="0" smtClean="0"/>
+              <a:t>p</a:t>
+            </a:r>
+            <a:r>
+              <a:rPr lang="de-DE" sz="700" b="1" dirty="0" smtClean="0"/>
+              <a:t>s</a:t>
+            </a:r>
+          </a:p>
+          <a:p>
+            <a:pPr algn="ctr"/>
+            <a:endParaRPr lang="de-DE" sz="700" b="1" dirty="0"/>
+          </a:p>
+          <a:p>
+            <a:r>
+              <a:rPr lang="en-US" sz="700" b="1" dirty="0"/>
+              <a:t>Get </a:t>
+            </a:r>
+            <a:r>
+              <a:rPr lang="en-US" sz="700" b="1" dirty="0" smtClean="0"/>
+              <a:t>help</a:t>
+            </a:r>
+            <a:endParaRPr lang="en-US" sz="700" b="1" dirty="0"/>
+          </a:p>
+          <a:p>
+            <a:r>
+              <a:rPr lang="en-US" sz="700" dirty="0" err="1">
+                <a:latin typeface="Courier New" pitchFamily="49" charset="0"/>
+                <a:cs typeface="Courier New" pitchFamily="49" charset="0"/>
+              </a:rPr>
+              <a:t>git</a:t>
+            </a:r>
+            <a:r>
+              <a:rPr lang="en-US" sz="700" dirty="0">
+                <a:latin typeface="Courier New" pitchFamily="49" charset="0"/>
+                <a:cs typeface="Courier New" pitchFamily="49" charset="0"/>
+              </a:rPr>
+              <a:t> help [command]</a:t>
+            </a:r>
+            <a:endParaRPr lang="de-DE" sz="700" dirty="0" smtClean="0">
+              <a:latin typeface="Courier New" pitchFamily="49" charset="0"/>
+              <a:cs typeface="Courier New" pitchFamily="49" charset="0"/>
+            </a:endParaRPr>
+          </a:p>
+          <a:p>
+            <a:r>
+              <a:rPr lang="de-DE" sz="700" b="1" dirty="0" smtClean="0"/>
+              <a:t>Create </a:t>
+            </a:r>
+            <a:r>
+              <a:rPr lang="de-DE" sz="700" b="1" dirty="0"/>
+              <a:t>empty branch</a:t>
+            </a:r>
+          </a:p>
+          <a:p>
+            <a:r>
+              <a:rPr lang="de-DE" sz="700" dirty="0">
+                <a:latin typeface="Courier New" pitchFamily="49" charset="0"/>
+                <a:cs typeface="Courier New" pitchFamily="49" charset="0"/>
+              </a:rPr>
+              <a:t>git symbolic-ref HEAD refs/heads/newbranch</a:t>
+            </a:r>
+          </a:p>
+          <a:p>
+            <a:r>
+              <a:rPr lang="de-DE" sz="700" dirty="0">
+                <a:latin typeface="Courier New" pitchFamily="49" charset="0"/>
+                <a:cs typeface="Courier New" pitchFamily="49" charset="0"/>
+              </a:rPr>
+              <a:t>rm .git/index</a:t>
+            </a:r>
+          </a:p>
+          <a:p>
+            <a:r>
+              <a:rPr lang="de-DE" sz="700" dirty="0">
+                <a:latin typeface="Courier New" pitchFamily="49" charset="0"/>
+                <a:cs typeface="Courier New" pitchFamily="49" charset="0"/>
+              </a:rPr>
+              <a:t>git clean -fdx</a:t>
+            </a:r>
+          </a:p>
+          <a:p>
+            <a:r>
+              <a:rPr lang="de-DE" sz="700" dirty="0">
+                <a:latin typeface="Courier New" pitchFamily="49" charset="0"/>
+                <a:cs typeface="Courier New" pitchFamily="49" charset="0"/>
+              </a:rPr>
+              <a:t>&lt;do work&gt;</a:t>
+            </a:r>
+          </a:p>
+          <a:p>
+            <a:r>
+              <a:rPr lang="de-DE" sz="700" dirty="0">
+                <a:latin typeface="Courier New" pitchFamily="49" charset="0"/>
+                <a:cs typeface="Courier New" pitchFamily="49" charset="0"/>
+              </a:rPr>
+              <a:t>git add your files</a:t>
+            </a:r>
+          </a:p>
+          <a:p>
+            <a:r>
+              <a:rPr lang="en-US" sz="700" dirty="0" err="1">
+                <a:latin typeface="Courier New" pitchFamily="49" charset="0"/>
+                <a:cs typeface="Courier New" pitchFamily="49" charset="0"/>
+              </a:rPr>
+              <a:t>git</a:t>
+            </a:r>
+            <a:r>
+              <a:rPr lang="en-US" sz="700" dirty="0">
+                <a:latin typeface="Courier New" pitchFamily="49" charset="0"/>
+                <a:cs typeface="Courier New" pitchFamily="49" charset="0"/>
+              </a:rPr>
+              <a:t> commit -m 'Initial commit'</a:t>
+            </a:r>
+          </a:p>
+          <a:p>
+            <a:r>
+              <a:rPr lang="de-DE" sz="700" b="1" dirty="0"/>
+              <a:t>Graphical log</a:t>
+            </a:r>
+          </a:p>
+          <a:p>
+            <a:r>
+              <a:rPr lang="de-DE" sz="700" dirty="0">
+                <a:latin typeface="Courier New" pitchFamily="49" charset="0"/>
+                <a:cs typeface="Courier New" pitchFamily="49" charset="0"/>
+              </a:rPr>
+              <a:t>git log --graph</a:t>
+            </a:r>
+          </a:p>
+          <a:p>
+            <a:r>
+              <a:rPr lang="en-US" sz="700" dirty="0" err="1">
+                <a:latin typeface="Courier New" pitchFamily="49" charset="0"/>
+                <a:cs typeface="Courier New" pitchFamily="49" charset="0"/>
+              </a:rPr>
+              <a:t>git</a:t>
+            </a:r>
+            <a:r>
+              <a:rPr lang="en-US" sz="700" dirty="0">
+                <a:latin typeface="Courier New" pitchFamily="49" charset="0"/>
+                <a:cs typeface="Courier New" pitchFamily="49" charset="0"/>
+              </a:rPr>
+              <a:t> log --graph --pretty=</a:t>
+            </a:r>
+            <a:r>
+              <a:rPr lang="en-US" sz="700" dirty="0" err="1">
+                <a:latin typeface="Courier New" pitchFamily="49" charset="0"/>
+                <a:cs typeface="Courier New" pitchFamily="49" charset="0"/>
+              </a:rPr>
+              <a:t>oneline</a:t>
+            </a:r>
+            <a:r>
+              <a:rPr lang="en-US" sz="700" dirty="0">
+                <a:latin typeface="Courier New" pitchFamily="49" charset="0"/>
+                <a:cs typeface="Courier New" pitchFamily="49" charset="0"/>
+              </a:rPr>
+              <a:t> --abbrev-commit</a:t>
+            </a:r>
+          </a:p>
+          <a:p>
+            <a:r>
+              <a:rPr lang="de-DE" sz="700" b="1" dirty="0"/>
+              <a:t>Push branch to remote</a:t>
+            </a:r>
+          </a:p>
+          <a:p>
+            <a:r>
+              <a:rPr lang="de-DE" sz="700" dirty="0">
+                <a:latin typeface="Courier New" pitchFamily="49" charset="0"/>
+                <a:cs typeface="Courier New" pitchFamily="49" charset="0"/>
+              </a:rPr>
+              <a:t>git push &lt;origin&gt; &lt;branch&gt;</a:t>
+            </a:r>
+          </a:p>
+          <a:p>
+            <a:r>
+              <a:rPr lang="en-US" sz="700" b="1" dirty="0"/>
+              <a:t>Delete remote branch and locally</a:t>
+            </a:r>
+          </a:p>
+          <a:p>
+            <a:r>
+              <a:rPr lang="de-DE" sz="700" dirty="0">
+                <a:latin typeface="Courier New" pitchFamily="49" charset="0"/>
+                <a:cs typeface="Courier New" pitchFamily="49" charset="0"/>
+              </a:rPr>
+              <a:t>git push &lt;origin&gt; :&lt;branch&gt;</a:t>
+            </a:r>
+          </a:p>
+          <a:p>
+            <a:r>
+              <a:rPr lang="de-DE" sz="700" dirty="0">
+                <a:latin typeface="Courier New" pitchFamily="49" charset="0"/>
+                <a:cs typeface="Courier New" pitchFamily="49" charset="0"/>
+              </a:rPr>
+              <a:t>git branch -d &lt;branch&gt;</a:t>
+            </a:r>
+            <a:endParaRPr lang="de-DE" sz="700" dirty="0">
+              <a:latin typeface="Courier New" pitchFamily="49" charset="0"/>
+              <a:cs typeface="Courier New" pitchFamily="49" charset="0"/>
+            </a:endParaRPr>
+          </a:p>
+        </p:txBody>
+      </p:sp>
+      <p:sp>
+        <p:nvSpPr>
+          <p:cNvPr id="47" name="Rectangle 46"/>
+          <p:cNvSpPr/>
+          <p:nvPr/>
+        </p:nvSpPr>
+        <p:spPr>
+          <a:xfrm>
+            <a:off x="3337456" y="4973206"/>
+            <a:ext cx="2252838" cy="1476702"/>
+          </a:xfrm>
+          <a:prstGeom prst="rect">
+            <a:avLst/>
+          </a:prstGeom>
+          <a:gradFill>
+            <a:gsLst>
+              <a:gs pos="0">
+                <a:schemeClr val="bg1">
+                  <a:lumMod val="85000"/>
+                </a:schemeClr>
+              </a:gs>
+              <a:gs pos="50000">
+                <a:schemeClr val="bg1">
+                  <a:lumMod val="95000"/>
+                </a:schemeClr>
+              </a:gs>
+              <a:gs pos="100000">
+                <a:schemeClr val="dk1">
+                  <a:tint val="15000"/>
+                  <a:satMod val="350000"/>
+                </a:schemeClr>
+              </a:gs>
+            </a:gsLst>
+          </a:gradFill>
+          <a:effectLst/>
+        </p:spPr>
+        <p:style>
+          <a:lnRef idx="1">
+            <a:schemeClr val="dk1"/>
+          </a:lnRef>
+          <a:fillRef idx="2">
+            <a:schemeClr val="dk1"/>
+          </a:fillRef>
+          <a:effectRef idx="1">
+            <a:schemeClr val="dk1"/>
+          </a:effectRef>
+          <a:fontRef idx="minor">
+            <a:schemeClr val="dk1"/>
+          </a:fontRef>
+        </p:style>
+        <p:txBody>
+          <a:bodyPr rtlCol="0" anchor="ctr"/>
+          <a:lstStyle/>
+          <a:p>
+            <a:pPr algn="ctr"/>
+            <a:r>
+              <a:rPr lang="en-US" sz="800" b="1" dirty="0" smtClean="0"/>
+              <a:t>Resolve merge conflicts</a:t>
+            </a:r>
+          </a:p>
+          <a:p>
+            <a:endParaRPr lang="en-US" sz="800" b="1" dirty="0"/>
+          </a:p>
+          <a:p>
+            <a:r>
+              <a:rPr lang="en-US" sz="700" b="1" dirty="0"/>
+              <a:t>View merge conflicts</a:t>
+            </a:r>
+          </a:p>
+          <a:p>
+            <a:r>
+              <a:rPr lang="en-US" sz="700" dirty="0" err="1">
+                <a:latin typeface="Courier New" pitchFamily="49" charset="0"/>
+                <a:cs typeface="Courier New" pitchFamily="49" charset="0"/>
+              </a:rPr>
+              <a:t>git</a:t>
+            </a:r>
+            <a:r>
+              <a:rPr lang="en-US" sz="700" dirty="0">
+                <a:latin typeface="Courier New" pitchFamily="49" charset="0"/>
+                <a:cs typeface="Courier New" pitchFamily="49" charset="0"/>
+              </a:rPr>
+              <a:t> diff</a:t>
+            </a:r>
+          </a:p>
+          <a:p>
+            <a:r>
+              <a:rPr lang="en-US" sz="700" b="1" dirty="0"/>
+              <a:t>View merge conflicts against base file</a:t>
+            </a:r>
+          </a:p>
+          <a:p>
+            <a:r>
+              <a:rPr lang="en-US" sz="700" dirty="0" err="1">
+                <a:latin typeface="Courier New" pitchFamily="49" charset="0"/>
+                <a:cs typeface="Courier New" pitchFamily="49" charset="0"/>
+              </a:rPr>
+              <a:t>git</a:t>
+            </a:r>
+            <a:r>
+              <a:rPr lang="en-US" sz="700" dirty="0">
+                <a:latin typeface="Courier New" pitchFamily="49" charset="0"/>
+                <a:cs typeface="Courier New" pitchFamily="49" charset="0"/>
+              </a:rPr>
+              <a:t> diff --base &lt;FILE&gt;</a:t>
+            </a:r>
+          </a:p>
+          <a:p>
+            <a:r>
+              <a:rPr lang="en-US" sz="700" b="1" dirty="0"/>
+              <a:t>View merge conflicts against other changes</a:t>
+            </a:r>
+          </a:p>
+          <a:p>
+            <a:r>
+              <a:rPr lang="en-US" sz="700" dirty="0" err="1">
+                <a:latin typeface="Courier New" pitchFamily="49" charset="0"/>
+                <a:cs typeface="Courier New" pitchFamily="49" charset="0"/>
+              </a:rPr>
+              <a:t>git</a:t>
+            </a:r>
+            <a:r>
+              <a:rPr lang="en-US" sz="700" dirty="0">
+                <a:latin typeface="Courier New" pitchFamily="49" charset="0"/>
+                <a:cs typeface="Courier New" pitchFamily="49" charset="0"/>
+              </a:rPr>
+              <a:t> diff --theirs &lt;FILE&gt;</a:t>
+            </a:r>
+          </a:p>
+          <a:p>
+            <a:r>
+              <a:rPr lang="en-US" sz="700" b="1" dirty="0"/>
+              <a:t>View merge conflicts against your changes</a:t>
+            </a:r>
+          </a:p>
+          <a:p>
+            <a:r>
+              <a:rPr lang="en-US" sz="700" dirty="0" err="1">
+                <a:latin typeface="Courier New" pitchFamily="49" charset="0"/>
+                <a:cs typeface="Courier New" pitchFamily="49" charset="0"/>
+              </a:rPr>
+              <a:t>git</a:t>
+            </a:r>
+            <a:r>
+              <a:rPr lang="en-US" sz="700" dirty="0">
+                <a:latin typeface="Courier New" pitchFamily="49" charset="0"/>
+                <a:cs typeface="Courier New" pitchFamily="49" charset="0"/>
+              </a:rPr>
+              <a:t> diff --ours &lt;FILE&gt;</a:t>
+            </a:r>
+          </a:p>
+          <a:p>
+            <a:r>
+              <a:rPr lang="en-US" sz="700" b="1" dirty="0"/>
+              <a:t>After resolving conflicts, merge with</a:t>
+            </a:r>
+          </a:p>
+          <a:p>
+            <a:r>
+              <a:rPr lang="en-US" sz="700" dirty="0" err="1">
+                <a:latin typeface="Courier New" pitchFamily="49" charset="0"/>
+                <a:cs typeface="Courier New" pitchFamily="49" charset="0"/>
+              </a:rPr>
+              <a:t>git</a:t>
+            </a:r>
+            <a:r>
+              <a:rPr lang="en-US" sz="700" dirty="0">
+                <a:latin typeface="Courier New" pitchFamily="49" charset="0"/>
+                <a:cs typeface="Courier New" pitchFamily="49" charset="0"/>
+              </a:rPr>
+              <a:t> add &lt;CONFLICTING_FILE&gt;</a:t>
+            </a:r>
+          </a:p>
+          <a:p>
+            <a:r>
+              <a:rPr lang="en-US" sz="700" dirty="0" err="1">
+                <a:latin typeface="Courier New" pitchFamily="49" charset="0"/>
+                <a:cs typeface="Courier New" pitchFamily="49" charset="0"/>
+              </a:rPr>
+              <a:t>git</a:t>
+            </a:r>
+            <a:r>
+              <a:rPr lang="en-US" sz="700" dirty="0">
+                <a:latin typeface="Courier New" pitchFamily="49" charset="0"/>
+                <a:cs typeface="Courier New" pitchFamily="49" charset="0"/>
+              </a:rPr>
+              <a:t> rebase --continue</a:t>
+            </a:r>
+            <a:endParaRPr lang="de-DE" sz="700" dirty="0">
+              <a:latin typeface="Courier New" pitchFamily="49" charset="0"/>
+              <a:cs typeface="Courier New" pitchFamily="49" charset="0"/>
+            </a:endParaRPr>
+          </a:p>
+        </p:txBody>
+      </p:sp>
+      <p:sp>
+        <p:nvSpPr>
+          <p:cNvPr id="48" name="Rectangle 47"/>
+          <p:cNvSpPr/>
+          <p:nvPr/>
+        </p:nvSpPr>
+        <p:spPr>
+          <a:xfrm>
+            <a:off x="5911457" y="4360359"/>
+            <a:ext cx="2592288" cy="2089549"/>
+          </a:xfrm>
+          <a:prstGeom prst="rect">
+            <a:avLst/>
+          </a:prstGeom>
+          <a:gradFill>
+            <a:gsLst>
+              <a:gs pos="0">
+                <a:schemeClr val="bg1">
+                  <a:lumMod val="85000"/>
+                </a:schemeClr>
+              </a:gs>
+              <a:gs pos="50000">
+                <a:schemeClr val="bg1">
+                  <a:lumMod val="95000"/>
+                </a:schemeClr>
+              </a:gs>
+              <a:gs pos="100000">
+                <a:schemeClr val="dk1">
+                  <a:tint val="15000"/>
+                  <a:satMod val="350000"/>
+                </a:schemeClr>
+              </a:gs>
+            </a:gsLst>
+          </a:gradFill>
+          <a:effectLst/>
+        </p:spPr>
+        <p:style>
+          <a:lnRef idx="1">
+            <a:schemeClr val="dk1"/>
+          </a:lnRef>
+          <a:fillRef idx="2">
+            <a:schemeClr val="dk1"/>
+          </a:fillRef>
+          <a:effectRef idx="1">
+            <a:schemeClr val="dk1"/>
+          </a:effectRef>
+          <a:fontRef idx="minor">
+            <a:schemeClr val="dk1"/>
+          </a:fontRef>
+        </p:style>
+        <p:txBody>
+          <a:bodyPr rtlCol="0" anchor="ctr"/>
+          <a:lstStyle/>
+          <a:p>
+            <a:pPr algn="ctr"/>
+            <a:r>
+              <a:rPr lang="en-US" sz="800" b="1" dirty="0" smtClean="0"/>
+              <a:t>Configuration</a:t>
+            </a:r>
+          </a:p>
+          <a:p>
+            <a:endParaRPr lang="en-US" sz="800" b="1" dirty="0"/>
+          </a:p>
+          <a:p>
+            <a:r>
+              <a:rPr lang="en-US" sz="700" dirty="0" err="1">
+                <a:latin typeface="Courier New" pitchFamily="49" charset="0"/>
+                <a:cs typeface="Courier New" pitchFamily="49" charset="0"/>
+              </a:rPr>
+              <a:t>git</a:t>
+            </a:r>
+            <a:r>
+              <a:rPr lang="en-US" sz="700" dirty="0">
+                <a:latin typeface="Courier New" pitchFamily="49" charset="0"/>
+                <a:cs typeface="Courier New" pitchFamily="49" charset="0"/>
+              </a:rPr>
+              <a:t> </a:t>
+            </a:r>
+            <a:r>
+              <a:rPr lang="en-US" sz="700" dirty="0" err="1">
+                <a:latin typeface="Courier New" pitchFamily="49" charset="0"/>
+                <a:cs typeface="Courier New" pitchFamily="49" charset="0"/>
+              </a:rPr>
+              <a:t>config</a:t>
+            </a:r>
+            <a:r>
+              <a:rPr lang="en-US" sz="700" dirty="0">
+                <a:latin typeface="Courier New" pitchFamily="49" charset="0"/>
+                <a:cs typeface="Courier New" pitchFamily="49" charset="0"/>
+              </a:rPr>
+              <a:t> [--global]</a:t>
+            </a:r>
+          </a:p>
+          <a:p>
+            <a:pPr algn="r"/>
+            <a:r>
+              <a:rPr lang="en-US" sz="700" b="1" dirty="0"/>
+              <a:t>global is stored in ~/.</a:t>
+            </a:r>
+            <a:r>
+              <a:rPr lang="en-US" sz="700" b="1" dirty="0" err="1"/>
+              <a:t>gitconfig</a:t>
+            </a:r>
+            <a:endParaRPr lang="en-US" sz="700" b="1" dirty="0"/>
+          </a:p>
+          <a:p>
+            <a:r>
+              <a:rPr lang="en-US" sz="700" b="1" dirty="0" smtClean="0">
+                <a:latin typeface="+mj-lt"/>
+                <a:cs typeface="Courier New" pitchFamily="49" charset="0"/>
+              </a:rPr>
+              <a:t>user</a:t>
+            </a:r>
+          </a:p>
+          <a:p>
+            <a:r>
+              <a:rPr lang="en-US" sz="700" dirty="0" smtClean="0">
+                <a:latin typeface="Courier New" pitchFamily="49" charset="0"/>
+                <a:cs typeface="Courier New" pitchFamily="49" charset="0"/>
+              </a:rPr>
+              <a:t>user </a:t>
+            </a:r>
+            <a:r>
+              <a:rPr lang="en-US" sz="700" dirty="0">
+                <a:latin typeface="Courier New" pitchFamily="49" charset="0"/>
+                <a:cs typeface="Courier New" pitchFamily="49" charset="0"/>
+              </a:rPr>
+              <a:t>user.name $name</a:t>
+            </a:r>
+          </a:p>
+          <a:p>
+            <a:r>
+              <a:rPr lang="en-US" sz="700" dirty="0" err="1">
+                <a:latin typeface="Courier New" pitchFamily="49" charset="0"/>
+                <a:cs typeface="Courier New" pitchFamily="49" charset="0"/>
+              </a:rPr>
+              <a:t>user.email</a:t>
+            </a:r>
+            <a:r>
+              <a:rPr lang="en-US" sz="700" dirty="0">
+                <a:latin typeface="Courier New" pitchFamily="49" charset="0"/>
+                <a:cs typeface="Courier New" pitchFamily="49" charset="0"/>
+              </a:rPr>
+              <a:t> $</a:t>
+            </a:r>
+            <a:r>
+              <a:rPr lang="en-US" sz="700" dirty="0" smtClean="0">
+                <a:latin typeface="Courier New" pitchFamily="49" charset="0"/>
+                <a:cs typeface="Courier New" pitchFamily="49" charset="0"/>
+              </a:rPr>
+              <a:t>email</a:t>
+            </a:r>
+          </a:p>
+          <a:p>
+            <a:r>
+              <a:rPr lang="en-US" sz="700" b="1" dirty="0" smtClean="0">
+                <a:latin typeface="+mj-lt"/>
+                <a:cs typeface="Courier New" pitchFamily="49" charset="0"/>
+              </a:rPr>
+              <a:t>color</a:t>
+            </a:r>
+            <a:endParaRPr lang="en-US" sz="700" b="1" dirty="0">
+              <a:latin typeface="+mj-lt"/>
+              <a:cs typeface="Courier New" pitchFamily="49" charset="0"/>
+            </a:endParaRPr>
+          </a:p>
+          <a:p>
+            <a:r>
+              <a:rPr lang="en-US" sz="700" dirty="0">
+                <a:latin typeface="Courier New" pitchFamily="49" charset="0"/>
+                <a:cs typeface="Courier New" pitchFamily="49" charset="0"/>
+              </a:rPr>
+              <a:t>color </a:t>
+            </a:r>
+            <a:r>
+              <a:rPr lang="en-US" sz="700" dirty="0" err="1">
+                <a:latin typeface="Courier New" pitchFamily="49" charset="0"/>
+                <a:cs typeface="Courier New" pitchFamily="49" charset="0"/>
+              </a:rPr>
+              <a:t>color.ui</a:t>
+            </a:r>
+            <a:r>
+              <a:rPr lang="en-US" sz="700" dirty="0">
+                <a:latin typeface="Courier New" pitchFamily="49" charset="0"/>
+                <a:cs typeface="Courier New" pitchFamily="49" charset="0"/>
+              </a:rPr>
+              <a:t> </a:t>
+            </a:r>
+            <a:r>
+              <a:rPr lang="en-US" sz="700" dirty="0" smtClean="0">
+                <a:latin typeface="Courier New" pitchFamily="49" charset="0"/>
+                <a:cs typeface="Courier New" pitchFamily="49" charset="0"/>
+              </a:rPr>
+              <a:t>auto</a:t>
+            </a:r>
+          </a:p>
+          <a:p>
+            <a:r>
+              <a:rPr lang="en-US" sz="700" b="1" dirty="0" err="1" smtClean="0">
+                <a:latin typeface="+mj-lt"/>
+                <a:cs typeface="Courier New" pitchFamily="49" charset="0"/>
+              </a:rPr>
+              <a:t>github</a:t>
+            </a:r>
+            <a:endParaRPr lang="en-US" sz="700" b="1" dirty="0">
+              <a:latin typeface="+mj-lt"/>
+              <a:cs typeface="Courier New" pitchFamily="49" charset="0"/>
+            </a:endParaRPr>
+          </a:p>
+          <a:p>
+            <a:r>
+              <a:rPr lang="en-US" sz="700" dirty="0" err="1" smtClean="0">
+                <a:latin typeface="Courier New" pitchFamily="49" charset="0"/>
+                <a:cs typeface="Courier New" pitchFamily="49" charset="0"/>
+              </a:rPr>
+              <a:t>github</a:t>
+            </a:r>
+            <a:r>
+              <a:rPr lang="en-US" sz="700" dirty="0" smtClean="0">
+                <a:latin typeface="Courier New" pitchFamily="49" charset="0"/>
+                <a:cs typeface="Courier New" pitchFamily="49" charset="0"/>
+              </a:rPr>
+              <a:t> </a:t>
+            </a:r>
+            <a:r>
+              <a:rPr lang="en-US" sz="700" dirty="0" err="1">
+                <a:latin typeface="Courier New" pitchFamily="49" charset="0"/>
+                <a:cs typeface="Courier New" pitchFamily="49" charset="0"/>
+              </a:rPr>
+              <a:t>github.user</a:t>
+            </a:r>
+            <a:r>
+              <a:rPr lang="en-US" sz="700" dirty="0">
+                <a:latin typeface="Courier New" pitchFamily="49" charset="0"/>
+                <a:cs typeface="Courier New" pitchFamily="49" charset="0"/>
+              </a:rPr>
+              <a:t> $user</a:t>
+            </a:r>
+          </a:p>
+          <a:p>
+            <a:r>
+              <a:rPr lang="en-US" sz="700" dirty="0" err="1">
+                <a:latin typeface="Courier New" pitchFamily="49" charset="0"/>
+                <a:cs typeface="Courier New" pitchFamily="49" charset="0"/>
+              </a:rPr>
+              <a:t>github.token</a:t>
+            </a:r>
+            <a:r>
+              <a:rPr lang="en-US" sz="700" dirty="0">
+                <a:latin typeface="Courier New" pitchFamily="49" charset="0"/>
+                <a:cs typeface="Courier New" pitchFamily="49" charset="0"/>
+              </a:rPr>
+              <a:t> $</a:t>
+            </a:r>
+            <a:r>
+              <a:rPr lang="en-US" sz="700" dirty="0" smtClean="0">
+                <a:latin typeface="Courier New" pitchFamily="49" charset="0"/>
+                <a:cs typeface="Courier New" pitchFamily="49" charset="0"/>
+              </a:rPr>
+              <a:t>token</a:t>
+            </a:r>
+          </a:p>
+          <a:p>
+            <a:r>
+              <a:rPr lang="en-US" sz="700" b="1" dirty="0" err="1" smtClean="0">
+                <a:latin typeface="+mj-lt"/>
+                <a:cs typeface="Courier New" pitchFamily="49" charset="0"/>
+              </a:rPr>
+              <a:t>optimisation</a:t>
+            </a:r>
+            <a:endParaRPr lang="en-US" sz="700" b="1" dirty="0">
+              <a:latin typeface="+mj-lt"/>
+              <a:cs typeface="Courier New" pitchFamily="49" charset="0"/>
+            </a:endParaRPr>
+          </a:p>
+          <a:p>
+            <a:r>
+              <a:rPr lang="en-US" sz="700" dirty="0" err="1">
+                <a:latin typeface="Courier New" pitchFamily="49" charset="0"/>
+                <a:cs typeface="Courier New" pitchFamily="49" charset="0"/>
+              </a:rPr>
+              <a:t>optimisation</a:t>
+            </a:r>
+            <a:r>
+              <a:rPr lang="en-US" sz="700" dirty="0">
+                <a:latin typeface="Courier New" pitchFamily="49" charset="0"/>
+                <a:cs typeface="Courier New" pitchFamily="49" charset="0"/>
+              </a:rPr>
+              <a:t> </a:t>
+            </a:r>
+            <a:r>
+              <a:rPr lang="en-US" sz="700" dirty="0" err="1">
+                <a:latin typeface="Courier New" pitchFamily="49" charset="0"/>
+                <a:cs typeface="Courier New" pitchFamily="49" charset="0"/>
+              </a:rPr>
+              <a:t>pack.threads</a:t>
+            </a:r>
+            <a:r>
+              <a:rPr lang="en-US" sz="700" dirty="0">
+                <a:latin typeface="Courier New" pitchFamily="49" charset="0"/>
+                <a:cs typeface="Courier New" pitchFamily="49" charset="0"/>
+              </a:rPr>
+              <a:t> 0</a:t>
+            </a:r>
+          </a:p>
+          <a:p>
+            <a:r>
+              <a:rPr lang="en-US" sz="700" dirty="0" err="1">
+                <a:latin typeface="Courier New" pitchFamily="49" charset="0"/>
+                <a:cs typeface="Courier New" pitchFamily="49" charset="0"/>
+              </a:rPr>
+              <a:t>diff.renamelimit</a:t>
+            </a:r>
+            <a:r>
+              <a:rPr lang="en-US" sz="700" dirty="0">
+                <a:latin typeface="Courier New" pitchFamily="49" charset="0"/>
+                <a:cs typeface="Courier New" pitchFamily="49" charset="0"/>
+              </a:rPr>
+              <a:t> 0</a:t>
+            </a:r>
+          </a:p>
+          <a:p>
+            <a:pPr algn="r"/>
+            <a:r>
+              <a:rPr lang="en-US" sz="700" b="1" dirty="0"/>
+              <a:t>do not use on low memory </a:t>
+            </a:r>
+            <a:r>
+              <a:rPr lang="en-US" sz="700" b="1" dirty="0"/>
+              <a:t>p</a:t>
+            </a:r>
+          </a:p>
+          <a:p>
+            <a:r>
+              <a:rPr lang="en-US" sz="700" b="1" dirty="0" smtClean="0">
+                <a:latin typeface="+mj-lt"/>
+                <a:cs typeface="Courier New" pitchFamily="49" charset="0"/>
+              </a:rPr>
+              <a:t>windows</a:t>
+            </a:r>
+          </a:p>
+          <a:p>
+            <a:r>
+              <a:rPr lang="en-US" sz="700" dirty="0" smtClean="0">
+                <a:latin typeface="Courier New" pitchFamily="49" charset="0"/>
+                <a:cs typeface="Courier New" pitchFamily="49" charset="0"/>
+              </a:rPr>
+              <a:t>windows </a:t>
+            </a:r>
+            <a:r>
+              <a:rPr lang="en-US" sz="700" dirty="0" err="1">
+                <a:latin typeface="Courier New" pitchFamily="49" charset="0"/>
+                <a:cs typeface="Courier New" pitchFamily="49" charset="0"/>
+              </a:rPr>
+              <a:t>core.autocrlf</a:t>
+            </a:r>
+            <a:r>
+              <a:rPr lang="en-US" sz="700" dirty="0">
+                <a:latin typeface="Courier New" pitchFamily="49" charset="0"/>
+                <a:cs typeface="Courier New" pitchFamily="49" charset="0"/>
+              </a:rPr>
+              <a:t> </a:t>
+            </a:r>
+            <a:r>
+              <a:rPr lang="en-US" sz="700" dirty="0" smtClean="0">
+                <a:latin typeface="Courier New" pitchFamily="49" charset="0"/>
+                <a:cs typeface="Courier New" pitchFamily="49" charset="0"/>
+              </a:rPr>
+              <a:t>true</a:t>
+            </a:r>
+            <a:endParaRPr lang="en-US" sz="700" dirty="0">
+              <a:latin typeface="Courier New" pitchFamily="49" charset="0"/>
+              <a:cs typeface="Courier New" pitchFamily="49" charset="0"/>
+            </a:endParaRPr>
+          </a:p>
+        </p:txBody>
+      </p:sp>
+      <p:sp>
+        <p:nvSpPr>
+          <p:cNvPr id="49" name="TextBox 48"/>
+          <p:cNvSpPr txBox="1"/>
+          <p:nvPr/>
+        </p:nvSpPr>
+        <p:spPr>
+          <a:xfrm>
+            <a:off x="744657" y="6515330"/>
+            <a:ext cx="2718271" cy="215444"/>
+          </a:xfrm>
+          <a:prstGeom prst="rect">
+            <a:avLst/>
+          </a:prstGeom>
+          <a:noFill/>
+        </p:spPr>
+        <p:txBody>
+          <a:bodyPr wrap="square" rtlCol="0">
+            <a:spAutoFit/>
+          </a:bodyPr>
+          <a:lstStyle/>
+          <a:p>
+            <a:r>
+              <a:rPr lang="en-US" sz="800" dirty="0" smtClean="0">
+                <a:solidFill>
+                  <a:schemeClr val="tx2"/>
+                </a:solidFill>
+                <a:hlinkClick r:id="rId5"/>
+              </a:rPr>
+              <a:t>http://github.com/AlexZeitler/gitcheatsheet</a:t>
+            </a:r>
+            <a:endParaRPr lang="de-DE" sz="800" dirty="0">
+              <a:solidFill>
+                <a:schemeClr val="tx2"/>
+              </a:solidFill>
+            </a:endParaRPr>
+          </a:p>
+        </p:txBody>
+      </p:sp>
     </p:spTree>
     <p:extLst>
       <p:ext uri="{BB962C8B-B14F-4D97-AF65-F5344CB8AC3E}">
@@ -5445,7 +6516,7 @@
 <file path=ppt/theme/theme1.xml><?xml version="1.0" encoding="utf-8"?>
 <a:theme xmlns:a="http://schemas.openxmlformats.org/drawingml/2006/main" name="Office Theme">
   <a:themeElements>
-    <a:clrScheme name="Office">
+    <a:clrScheme name="Custom 1">
       <a:dk1>
         <a:sysClr val="windowText" lastClr="000000"/>
       </a:dk1>
@@ -5477,10 +6548,10 @@
         <a:srgbClr val="F79646"/>
       </a:accent6>
       <a:hlink>
-        <a:srgbClr val="0000FF"/>
+        <a:srgbClr val="4F81BD"/>
       </a:hlink>
       <a:folHlink>
-        <a:srgbClr val="800080"/>
+        <a:srgbClr val="4F81BD"/>
       </a:folHlink>
     </a:clrScheme>
     <a:fontScheme name="Office">

</xml_diff>

<commit_message>
Fix error in branch creation command
</commit_message>
<xml_diff>
--- a/gitcheatsheet.pptx
+++ b/gitcheatsheet.pptx
@@ -11,7 +11,7 @@
     <p:sldId id="256" r:id="rId2"/>
   </p:sldIdLst>
   <p:sldSz cx="9144000" cy="6858000" type="screen4x3"/>
-  <p:notesSz cx="6645275" cy="9777413"/>
+  <p:notesSz cx="6834188" cy="9979025"/>
   <p:defaultTextStyle>
     <a:defPPr>
       <a:defRPr lang="de-DE"/>
@@ -144,15 +144,15 @@
         </p:nvSpPr>
         <p:spPr>
           <a:xfrm>
-            <a:off x="2" y="1"/>
-            <a:ext cx="2880137" cy="488249"/>
+            <a:off x="3" y="1"/>
+            <a:ext cx="2962014" cy="498317"/>
           </a:xfrm>
           <a:prstGeom prst="rect">
             <a:avLst/>
           </a:prstGeom>
         </p:spPr>
         <p:txBody>
-          <a:bodyPr vert="horz" lIns="89501" tIns="44751" rIns="89501" bIns="44751" rtlCol="0"/>
+          <a:bodyPr vert="horz" lIns="91622" tIns="45812" rIns="91622" bIns="45812" rtlCol="0"/>
           <a:lstStyle>
             <a:lvl1pPr algn="l">
               <a:defRPr sz="1200"/>
@@ -175,15 +175,15 @@
         </p:nvSpPr>
         <p:spPr>
           <a:xfrm>
-            <a:off x="3763587" y="1"/>
-            <a:ext cx="2880137" cy="488249"/>
+            <a:off x="3870579" y="1"/>
+            <a:ext cx="2962014" cy="498317"/>
           </a:xfrm>
           <a:prstGeom prst="rect">
             <a:avLst/>
           </a:prstGeom>
         </p:spPr>
         <p:txBody>
-          <a:bodyPr vert="horz" lIns="89501" tIns="44751" rIns="89501" bIns="44751" rtlCol="0"/>
+          <a:bodyPr vert="horz" lIns="91622" tIns="45812" rIns="91622" bIns="45812" rtlCol="0"/>
           <a:lstStyle>
             <a:lvl1pPr algn="r">
               <a:defRPr sz="1200"/>
@@ -192,7 +192,8 @@
           <a:p>
             <a:fld id="{216F1272-66CD-404A-9C2F-921E32EBB5BE}" type="datetimeFigureOut">
               <a:rPr lang="de-DE" smtClean="0"/>
-              <a:t>14.03.2011</a:t>
+              <a:pPr/>
+              <a:t>02.08.2011</a:t>
             </a:fld>
             <a:endParaRPr lang="de-DE"/>
           </a:p>
@@ -210,8 +211,8 @@
         </p:nvSpPr>
         <p:spPr>
           <a:xfrm>
-            <a:off x="877888" y="733425"/>
-            <a:ext cx="4889500" cy="3667125"/>
+            <a:off x="922338" y="749300"/>
+            <a:ext cx="4989512" cy="3741738"/>
           </a:xfrm>
           <a:prstGeom prst="rect">
             <a:avLst/>
@@ -224,7 +225,7 @@
           </a:ln>
         </p:spPr>
         <p:txBody>
-          <a:bodyPr vert="horz" lIns="89501" tIns="44751" rIns="89501" bIns="44751" rtlCol="0" anchor="ctr"/>
+          <a:bodyPr vert="horz" lIns="91622" tIns="45812" rIns="91622" bIns="45812" rtlCol="0" anchor="ctr"/>
           <a:lstStyle/>
           <a:p>
             <a:endParaRPr lang="de-DE"/>
@@ -243,15 +244,15 @@
         </p:nvSpPr>
         <p:spPr>
           <a:xfrm>
-            <a:off x="664528" y="4644583"/>
-            <a:ext cx="5316220" cy="4398902"/>
+            <a:off x="683420" y="4740355"/>
+            <a:ext cx="5467350" cy="4489608"/>
           </a:xfrm>
           <a:prstGeom prst="rect">
             <a:avLst/>
           </a:prstGeom>
         </p:spPr>
         <p:txBody>
-          <a:bodyPr vert="horz" lIns="89501" tIns="44751" rIns="89501" bIns="44751" rtlCol="0"/>
+          <a:bodyPr vert="horz" lIns="91622" tIns="45812" rIns="91622" bIns="45812" rtlCol="0"/>
           <a:lstStyle/>
           <a:p>
             <a:pPr lvl="0"/>
@@ -303,15 +304,15 @@
         </p:nvSpPr>
         <p:spPr>
           <a:xfrm>
-            <a:off x="2" y="9287611"/>
-            <a:ext cx="2880137" cy="488249"/>
+            <a:off x="3" y="9479124"/>
+            <a:ext cx="2962014" cy="498317"/>
           </a:xfrm>
           <a:prstGeom prst="rect">
             <a:avLst/>
           </a:prstGeom>
         </p:spPr>
         <p:txBody>
-          <a:bodyPr vert="horz" lIns="89501" tIns="44751" rIns="89501" bIns="44751" rtlCol="0" anchor="b"/>
+          <a:bodyPr vert="horz" lIns="91622" tIns="45812" rIns="91622" bIns="45812" rtlCol="0" anchor="b"/>
           <a:lstStyle>
             <a:lvl1pPr algn="l">
               <a:defRPr sz="1200"/>
@@ -334,15 +335,15 @@
         </p:nvSpPr>
         <p:spPr>
           <a:xfrm>
-            <a:off x="3763587" y="9287611"/>
-            <a:ext cx="2880137" cy="488249"/>
+            <a:off x="3870579" y="9479124"/>
+            <a:ext cx="2962014" cy="498317"/>
           </a:xfrm>
           <a:prstGeom prst="rect">
             <a:avLst/>
           </a:prstGeom>
         </p:spPr>
         <p:txBody>
-          <a:bodyPr vert="horz" lIns="89501" tIns="44751" rIns="89501" bIns="44751" rtlCol="0" anchor="b"/>
+          <a:bodyPr vert="horz" lIns="91622" tIns="45812" rIns="91622" bIns="45812" rtlCol="0" anchor="b"/>
           <a:lstStyle>
             <a:lvl1pPr algn="r">
               <a:defRPr sz="1200"/>
@@ -351,7 +352,8 @@
           <a:p>
             <a:fld id="{2510A3DD-B673-456D-BE18-21611B5D5ECD}" type="slidenum">
               <a:rPr lang="de-DE" smtClean="0"/>
-              <a:t>‹#›</a:t>
+              <a:pPr/>
+              <a:t>‹Nº›</a:t>
             </a:fld>
             <a:endParaRPr lang="de-DE"/>
           </a:p>
@@ -360,7 +362,7 @@
     </p:spTree>
     <p:extLst>
       <p:ext uri="{BB962C8B-B14F-4D97-AF65-F5344CB8AC3E}">
-        <p14:creationId xmlns:p14="http://schemas.microsoft.com/office/powerpoint/2010/main" val="1253691580"/>
+        <p14:creationId xmlns:p14="http://schemas.microsoft.com/office/powerpoint/2010/main" xmlns="" val="1253691580"/>
       </p:ext>
     </p:extLst>
   </p:cSld>
@@ -525,6 +527,7 @@
           <a:p>
             <a:fld id="{2510A3DD-B673-456D-BE18-21611B5D5ECD}" type="slidenum">
               <a:rPr lang="de-DE" smtClean="0"/>
+              <a:pPr/>
               <a:t>1</a:t>
             </a:fld>
             <a:endParaRPr lang="de-DE"/>
@@ -534,7 +537,7 @@
     </p:spTree>
     <p:extLst>
       <p:ext uri="{BB962C8B-B14F-4D97-AF65-F5344CB8AC3E}">
-        <p14:creationId xmlns:p14="http://schemas.microsoft.com/office/powerpoint/2010/main" val="611083205"/>
+        <p14:creationId xmlns:p14="http://schemas.microsoft.com/office/powerpoint/2010/main" xmlns="" val="611083205"/>
       </p:ext>
     </p:extLst>
   </p:cSld>
@@ -725,7 +728,8 @@
           <a:p>
             <a:fld id="{EC0D1C15-6F3D-4F60-9F92-19619CAB35D3}" type="datetimeFigureOut">
               <a:rPr lang="de-DE" smtClean="0"/>
-              <a:t>14.03.2011</a:t>
+              <a:pPr/>
+              <a:t>02.08.2011</a:t>
             </a:fld>
             <a:endParaRPr lang="de-DE"/>
           </a:p>
@@ -767,7 +771,8 @@
           <a:p>
             <a:fld id="{2CA26653-66A7-4D7E-B745-105FFB57C7DC}" type="slidenum">
               <a:rPr lang="de-DE" smtClean="0"/>
-              <a:t>‹#›</a:t>
+              <a:pPr/>
+              <a:t>‹Nº›</a:t>
             </a:fld>
             <a:endParaRPr lang="de-DE"/>
           </a:p>
@@ -776,7 +781,7 @@
     </p:spTree>
     <p:extLst>
       <p:ext uri="{BB962C8B-B14F-4D97-AF65-F5344CB8AC3E}">
-        <p14:creationId xmlns:p14="http://schemas.microsoft.com/office/powerpoint/2010/main" val="2518847904"/>
+        <p14:creationId xmlns:p14="http://schemas.microsoft.com/office/powerpoint/2010/main" xmlns="" val="2518847904"/>
       </p:ext>
     </p:extLst>
   </p:cSld>
@@ -895,7 +900,8 @@
           <a:p>
             <a:fld id="{EC0D1C15-6F3D-4F60-9F92-19619CAB35D3}" type="datetimeFigureOut">
               <a:rPr lang="de-DE" smtClean="0"/>
-              <a:t>14.03.2011</a:t>
+              <a:pPr/>
+              <a:t>02.08.2011</a:t>
             </a:fld>
             <a:endParaRPr lang="de-DE"/>
           </a:p>
@@ -937,7 +943,8 @@
           <a:p>
             <a:fld id="{2CA26653-66A7-4D7E-B745-105FFB57C7DC}" type="slidenum">
               <a:rPr lang="de-DE" smtClean="0"/>
-              <a:t>‹#›</a:t>
+              <a:pPr/>
+              <a:t>‹Nº›</a:t>
             </a:fld>
             <a:endParaRPr lang="de-DE"/>
           </a:p>
@@ -946,7 +953,7 @@
     </p:spTree>
     <p:extLst>
       <p:ext uri="{BB962C8B-B14F-4D97-AF65-F5344CB8AC3E}">
-        <p14:creationId xmlns:p14="http://schemas.microsoft.com/office/powerpoint/2010/main" val="2382128639"/>
+        <p14:creationId xmlns:p14="http://schemas.microsoft.com/office/powerpoint/2010/main" xmlns="" val="2382128639"/>
       </p:ext>
     </p:extLst>
   </p:cSld>
@@ -1075,7 +1082,8 @@
           <a:p>
             <a:fld id="{EC0D1C15-6F3D-4F60-9F92-19619CAB35D3}" type="datetimeFigureOut">
               <a:rPr lang="de-DE" smtClean="0"/>
-              <a:t>14.03.2011</a:t>
+              <a:pPr/>
+              <a:t>02.08.2011</a:t>
             </a:fld>
             <a:endParaRPr lang="de-DE"/>
           </a:p>
@@ -1117,7 +1125,8 @@
           <a:p>
             <a:fld id="{2CA26653-66A7-4D7E-B745-105FFB57C7DC}" type="slidenum">
               <a:rPr lang="de-DE" smtClean="0"/>
-              <a:t>‹#›</a:t>
+              <a:pPr/>
+              <a:t>‹Nº›</a:t>
             </a:fld>
             <a:endParaRPr lang="de-DE"/>
           </a:p>
@@ -1126,7 +1135,7 @@
     </p:spTree>
     <p:extLst>
       <p:ext uri="{BB962C8B-B14F-4D97-AF65-F5344CB8AC3E}">
-        <p14:creationId xmlns:p14="http://schemas.microsoft.com/office/powerpoint/2010/main" val="2186212659"/>
+        <p14:creationId xmlns:p14="http://schemas.microsoft.com/office/powerpoint/2010/main" xmlns="" val="2186212659"/>
       </p:ext>
     </p:extLst>
   </p:cSld>
@@ -1245,7 +1254,8 @@
           <a:p>
             <a:fld id="{EC0D1C15-6F3D-4F60-9F92-19619CAB35D3}" type="datetimeFigureOut">
               <a:rPr lang="de-DE" smtClean="0"/>
-              <a:t>14.03.2011</a:t>
+              <a:pPr/>
+              <a:t>02.08.2011</a:t>
             </a:fld>
             <a:endParaRPr lang="de-DE"/>
           </a:p>
@@ -1287,7 +1297,8 @@
           <a:p>
             <a:fld id="{2CA26653-66A7-4D7E-B745-105FFB57C7DC}" type="slidenum">
               <a:rPr lang="de-DE" smtClean="0"/>
-              <a:t>‹#›</a:t>
+              <a:pPr/>
+              <a:t>‹Nº›</a:t>
             </a:fld>
             <a:endParaRPr lang="de-DE"/>
           </a:p>
@@ -1296,7 +1307,7 @@
     </p:spTree>
     <p:extLst>
       <p:ext uri="{BB962C8B-B14F-4D97-AF65-F5344CB8AC3E}">
-        <p14:creationId xmlns:p14="http://schemas.microsoft.com/office/powerpoint/2010/main" val="3598186428"/>
+        <p14:creationId xmlns:p14="http://schemas.microsoft.com/office/powerpoint/2010/main" xmlns="" val="3598186428"/>
       </p:ext>
     </p:extLst>
   </p:cSld>
@@ -1491,7 +1502,8 @@
           <a:p>
             <a:fld id="{EC0D1C15-6F3D-4F60-9F92-19619CAB35D3}" type="datetimeFigureOut">
               <a:rPr lang="de-DE" smtClean="0"/>
-              <a:t>14.03.2011</a:t>
+              <a:pPr/>
+              <a:t>02.08.2011</a:t>
             </a:fld>
             <a:endParaRPr lang="de-DE"/>
           </a:p>
@@ -1533,7 +1545,8 @@
           <a:p>
             <a:fld id="{2CA26653-66A7-4D7E-B745-105FFB57C7DC}" type="slidenum">
               <a:rPr lang="de-DE" smtClean="0"/>
-              <a:t>‹#›</a:t>
+              <a:pPr/>
+              <a:t>‹Nº›</a:t>
             </a:fld>
             <a:endParaRPr lang="de-DE"/>
           </a:p>
@@ -1542,7 +1555,7 @@
     </p:spTree>
     <p:extLst>
       <p:ext uri="{BB962C8B-B14F-4D97-AF65-F5344CB8AC3E}">
-        <p14:creationId xmlns:p14="http://schemas.microsoft.com/office/powerpoint/2010/main" val="812672732"/>
+        <p14:creationId xmlns:p14="http://schemas.microsoft.com/office/powerpoint/2010/main" xmlns="" val="812672732"/>
       </p:ext>
     </p:extLst>
   </p:cSld>
@@ -1779,7 +1792,8 @@
           <a:p>
             <a:fld id="{EC0D1C15-6F3D-4F60-9F92-19619CAB35D3}" type="datetimeFigureOut">
               <a:rPr lang="de-DE" smtClean="0"/>
-              <a:t>14.03.2011</a:t>
+              <a:pPr/>
+              <a:t>02.08.2011</a:t>
             </a:fld>
             <a:endParaRPr lang="de-DE"/>
           </a:p>
@@ -1821,7 +1835,8 @@
           <a:p>
             <a:fld id="{2CA26653-66A7-4D7E-B745-105FFB57C7DC}" type="slidenum">
               <a:rPr lang="de-DE" smtClean="0"/>
-              <a:t>‹#›</a:t>
+              <a:pPr/>
+              <a:t>‹Nº›</a:t>
             </a:fld>
             <a:endParaRPr lang="de-DE"/>
           </a:p>
@@ -1830,7 +1845,7 @@
     </p:spTree>
     <p:extLst>
       <p:ext uri="{BB962C8B-B14F-4D97-AF65-F5344CB8AC3E}">
-        <p14:creationId xmlns:p14="http://schemas.microsoft.com/office/powerpoint/2010/main" val="2148723115"/>
+        <p14:creationId xmlns:p14="http://schemas.microsoft.com/office/powerpoint/2010/main" xmlns="" val="2148723115"/>
       </p:ext>
     </p:extLst>
   </p:cSld>
@@ -2201,7 +2216,8 @@
           <a:p>
             <a:fld id="{EC0D1C15-6F3D-4F60-9F92-19619CAB35D3}" type="datetimeFigureOut">
               <a:rPr lang="de-DE" smtClean="0"/>
-              <a:t>14.03.2011</a:t>
+              <a:pPr/>
+              <a:t>02.08.2011</a:t>
             </a:fld>
             <a:endParaRPr lang="de-DE"/>
           </a:p>
@@ -2243,7 +2259,8 @@
           <a:p>
             <a:fld id="{2CA26653-66A7-4D7E-B745-105FFB57C7DC}" type="slidenum">
               <a:rPr lang="de-DE" smtClean="0"/>
-              <a:t>‹#›</a:t>
+              <a:pPr/>
+              <a:t>‹Nº›</a:t>
             </a:fld>
             <a:endParaRPr lang="de-DE"/>
           </a:p>
@@ -2252,7 +2269,7 @@
     </p:spTree>
     <p:extLst>
       <p:ext uri="{BB962C8B-B14F-4D97-AF65-F5344CB8AC3E}">
-        <p14:creationId xmlns:p14="http://schemas.microsoft.com/office/powerpoint/2010/main" val="1087614445"/>
+        <p14:creationId xmlns:p14="http://schemas.microsoft.com/office/powerpoint/2010/main" xmlns="" val="1087614445"/>
       </p:ext>
     </p:extLst>
   </p:cSld>
@@ -2319,7 +2336,8 @@
           <a:p>
             <a:fld id="{EC0D1C15-6F3D-4F60-9F92-19619CAB35D3}" type="datetimeFigureOut">
               <a:rPr lang="de-DE" smtClean="0"/>
-              <a:t>14.03.2011</a:t>
+              <a:pPr/>
+              <a:t>02.08.2011</a:t>
             </a:fld>
             <a:endParaRPr lang="de-DE"/>
           </a:p>
@@ -2361,7 +2379,8 @@
           <a:p>
             <a:fld id="{2CA26653-66A7-4D7E-B745-105FFB57C7DC}" type="slidenum">
               <a:rPr lang="de-DE" smtClean="0"/>
-              <a:t>‹#›</a:t>
+              <a:pPr/>
+              <a:t>‹Nº›</a:t>
             </a:fld>
             <a:endParaRPr lang="de-DE"/>
           </a:p>
@@ -2370,7 +2389,7 @@
     </p:spTree>
     <p:extLst>
       <p:ext uri="{BB962C8B-B14F-4D97-AF65-F5344CB8AC3E}">
-        <p14:creationId xmlns:p14="http://schemas.microsoft.com/office/powerpoint/2010/main" val="2204385288"/>
+        <p14:creationId xmlns:p14="http://schemas.microsoft.com/office/powerpoint/2010/main" xmlns="" val="2204385288"/>
       </p:ext>
     </p:extLst>
   </p:cSld>
@@ -2414,7 +2433,8 @@
           <a:p>
             <a:fld id="{EC0D1C15-6F3D-4F60-9F92-19619CAB35D3}" type="datetimeFigureOut">
               <a:rPr lang="de-DE" smtClean="0"/>
-              <a:t>14.03.2011</a:t>
+              <a:pPr/>
+              <a:t>02.08.2011</a:t>
             </a:fld>
             <a:endParaRPr lang="de-DE"/>
           </a:p>
@@ -2456,7 +2476,8 @@
           <a:p>
             <a:fld id="{2CA26653-66A7-4D7E-B745-105FFB57C7DC}" type="slidenum">
               <a:rPr lang="de-DE" smtClean="0"/>
-              <a:t>‹#›</a:t>
+              <a:pPr/>
+              <a:t>‹Nº›</a:t>
             </a:fld>
             <a:endParaRPr lang="de-DE"/>
           </a:p>
@@ -2465,7 +2486,7 @@
     </p:spTree>
     <p:extLst>
       <p:ext uri="{BB962C8B-B14F-4D97-AF65-F5344CB8AC3E}">
-        <p14:creationId xmlns:p14="http://schemas.microsoft.com/office/powerpoint/2010/main" val="4148503892"/>
+        <p14:creationId xmlns:p14="http://schemas.microsoft.com/office/powerpoint/2010/main" xmlns="" val="4148503892"/>
       </p:ext>
     </p:extLst>
   </p:cSld>
@@ -2691,7 +2712,8 @@
           <a:p>
             <a:fld id="{EC0D1C15-6F3D-4F60-9F92-19619CAB35D3}" type="datetimeFigureOut">
               <a:rPr lang="de-DE" smtClean="0"/>
-              <a:t>14.03.2011</a:t>
+              <a:pPr/>
+              <a:t>02.08.2011</a:t>
             </a:fld>
             <a:endParaRPr lang="de-DE"/>
           </a:p>
@@ -2733,7 +2755,8 @@
           <a:p>
             <a:fld id="{2CA26653-66A7-4D7E-B745-105FFB57C7DC}" type="slidenum">
               <a:rPr lang="de-DE" smtClean="0"/>
-              <a:t>‹#›</a:t>
+              <a:pPr/>
+              <a:t>‹Nº›</a:t>
             </a:fld>
             <a:endParaRPr lang="de-DE"/>
           </a:p>
@@ -2742,7 +2765,7 @@
     </p:spTree>
     <p:extLst>
       <p:ext uri="{BB962C8B-B14F-4D97-AF65-F5344CB8AC3E}">
-        <p14:creationId xmlns:p14="http://schemas.microsoft.com/office/powerpoint/2010/main" val="736351156"/>
+        <p14:creationId xmlns:p14="http://schemas.microsoft.com/office/powerpoint/2010/main" xmlns="" val="736351156"/>
       </p:ext>
     </p:extLst>
   </p:cSld>
@@ -2944,7 +2967,8 @@
           <a:p>
             <a:fld id="{EC0D1C15-6F3D-4F60-9F92-19619CAB35D3}" type="datetimeFigureOut">
               <a:rPr lang="de-DE" smtClean="0"/>
-              <a:t>14.03.2011</a:t>
+              <a:pPr/>
+              <a:t>02.08.2011</a:t>
             </a:fld>
             <a:endParaRPr lang="de-DE"/>
           </a:p>
@@ -2986,7 +3010,8 @@
           <a:p>
             <a:fld id="{2CA26653-66A7-4D7E-B745-105FFB57C7DC}" type="slidenum">
               <a:rPr lang="de-DE" smtClean="0"/>
-              <a:t>‹#›</a:t>
+              <a:pPr/>
+              <a:t>‹Nº›</a:t>
             </a:fld>
             <a:endParaRPr lang="de-DE"/>
           </a:p>
@@ -2995,7 +3020,7 @@
     </p:spTree>
     <p:extLst>
       <p:ext uri="{BB962C8B-B14F-4D97-AF65-F5344CB8AC3E}">
-        <p14:creationId xmlns:p14="http://schemas.microsoft.com/office/powerpoint/2010/main" val="2245416855"/>
+        <p14:creationId xmlns:p14="http://schemas.microsoft.com/office/powerpoint/2010/main" xmlns="" val="2245416855"/>
       </p:ext>
     </p:extLst>
   </p:cSld>
@@ -3157,7 +3182,8 @@
           <a:p>
             <a:fld id="{EC0D1C15-6F3D-4F60-9F92-19619CAB35D3}" type="datetimeFigureOut">
               <a:rPr lang="de-DE" smtClean="0"/>
-              <a:t>14.03.2011</a:t>
+              <a:pPr/>
+              <a:t>02.08.2011</a:t>
             </a:fld>
             <a:endParaRPr lang="de-DE"/>
           </a:p>
@@ -3235,7 +3261,8 @@
           <a:p>
             <a:fld id="{2CA26653-66A7-4D7E-B745-105FFB57C7DC}" type="slidenum">
               <a:rPr lang="de-DE" smtClean="0"/>
-              <a:t>‹#›</a:t>
+              <a:pPr/>
+              <a:t>‹Nº›</a:t>
             </a:fld>
             <a:endParaRPr lang="de-DE"/>
           </a:p>
@@ -3244,7 +3271,7 @@
     </p:spTree>
     <p:extLst>
       <p:ext uri="{BB962C8B-B14F-4D97-AF65-F5344CB8AC3E}">
-        <p14:creationId xmlns:p14="http://schemas.microsoft.com/office/powerpoint/2010/main" val="1149920150"/>
+        <p14:creationId xmlns:p14="http://schemas.microsoft.com/office/powerpoint/2010/main" xmlns="" val="1149920150"/>
       </p:ext>
     </p:extLst>
   </p:cSld>
@@ -5255,7 +5282,28 @@
                 <a:latin typeface="Courier New" pitchFamily="49" charset="0"/>
                 <a:cs typeface="Courier New" pitchFamily="49" charset="0"/>
               </a:rPr>
-              <a:t>git checkout &lt;new&gt; &lt;base&gt;</a:t>
+              <a:t>git </a:t>
+            </a:r>
+            <a:r>
+              <a:rPr lang="de-DE" sz="700" dirty="0" smtClean="0">
+                <a:latin typeface="Courier New" pitchFamily="49" charset="0"/>
+                <a:cs typeface="Courier New" pitchFamily="49" charset="0"/>
+              </a:rPr>
+              <a:t>branch</a:t>
+            </a:r>
+            <a:r>
+              <a:rPr lang="de-DE" sz="700" dirty="0" smtClean="0">
+                <a:latin typeface="Courier New" pitchFamily="49" charset="0"/>
+                <a:cs typeface="Courier New" pitchFamily="49" charset="0"/>
+              </a:rPr>
+              <a:t> </a:t>
+            </a:r>
+            <a:r>
+              <a:rPr lang="de-DE" sz="700" dirty="0" smtClean="0">
+                <a:latin typeface="Courier New" pitchFamily="49" charset="0"/>
+                <a:cs typeface="Courier New" pitchFamily="49" charset="0"/>
+              </a:rPr>
+              <a:t>&lt;new&gt; &lt;base&gt;</a:t>
             </a:r>
           </a:p>
           <a:p>
@@ -5479,7 +5527,7 @@
             <a:blip r:embed="rId3" cstate="print">
               <a:extLst>
                 <a:ext uri="{28A0092B-C50C-407E-A947-70E740481C1C}">
-                  <a14:useLocalDpi xmlns:a14="http://schemas.microsoft.com/office/drawing/2010/main" val="0"/>
+                  <a14:useLocalDpi xmlns:a14="http://schemas.microsoft.com/office/drawing/2010/main" xmlns="" val="0"/>
                 </a:ext>
               </a:extLst>
             </a:blip>
@@ -5503,14 +5551,14 @@
             <a:effectLst/>
             <a:extLst>
               <a:ext uri="{909E8E84-426E-40DD-AFC4-6F175D3DCCD1}">
-                <a14:hiddenFill xmlns:a14="http://schemas.microsoft.com/office/drawing/2010/main">
+                <a14:hiddenFill xmlns:a14="http://schemas.microsoft.com/office/drawing/2010/main" xmlns="">
                   <a:solidFill>
                     <a:schemeClr val="accent1"/>
                   </a:solidFill>
                 </a14:hiddenFill>
               </a:ext>
               <a:ext uri="{91240B29-F687-4F45-9708-019B960494DF}">
-                <a14:hiddenLine xmlns:a14="http://schemas.microsoft.com/office/drawing/2010/main" w="9525">
+                <a14:hiddenLine xmlns:a14="http://schemas.microsoft.com/office/drawing/2010/main" xmlns="" w="9525">
                   <a:solidFill>
                     <a:schemeClr val="tx1"/>
                   </a:solidFill>
@@ -5520,7 +5568,7 @@
                 </a14:hiddenLine>
               </a:ext>
               <a:ext uri="{AF507438-7753-43E0-B8FC-AC1667EBCBE1}">
-                <a14:hiddenEffects xmlns:a14="http://schemas.microsoft.com/office/drawing/2010/main">
+                <a14:hiddenEffects xmlns:a14="http://schemas.microsoft.com/office/drawing/2010/main" xmlns="">
                   <a:effectLst>
                     <a:outerShdw dist="35921" dir="2700000" algn="ctr" rotWithShape="0">
                       <a:schemeClr val="bg2"/>
@@ -6259,14 +6307,7 @@
                 <a:latin typeface="Courier New" pitchFamily="49" charset="0"/>
                 <a:cs typeface="Courier New" pitchFamily="49" charset="0"/>
               </a:rPr>
-              <a:t> </a:t>
-            </a:r>
-            <a:r>
-              <a:rPr lang="en-US" sz="700" dirty="0" smtClean="0">
-                <a:latin typeface="Courier New" pitchFamily="49" charset="0"/>
-                <a:cs typeface="Courier New" pitchFamily="49" charset="0"/>
-              </a:rPr>
-              <a:t>auto</a:t>
+              <a:t> auto</a:t>
             </a:r>
           </a:p>
           <a:p>
@@ -6409,14 +6450,7 @@
                 <a:latin typeface="Courier New" pitchFamily="49" charset="0"/>
                 <a:cs typeface="Courier New" pitchFamily="49" charset="0"/>
               </a:rPr>
-              <a:t> </a:t>
-            </a:r>
-            <a:r>
-              <a:rPr lang="en-US" sz="700" dirty="0" smtClean="0">
-                <a:latin typeface="Courier New" pitchFamily="49" charset="0"/>
-                <a:cs typeface="Courier New" pitchFamily="49" charset="0"/>
-              </a:rPr>
-              <a:t>true</a:t>
+              <a:t> true</a:t>
             </a:r>
             <a:endParaRPr lang="en-US" sz="700" dirty="0">
               <a:latin typeface="Courier New" pitchFamily="49" charset="0"/>
@@ -6467,7 +6501,7 @@
     </p:spTree>
     <p:extLst>
       <p:ext uri="{BB962C8B-B14F-4D97-AF65-F5344CB8AC3E}">
-        <p14:creationId xmlns:p14="http://schemas.microsoft.com/office/powerpoint/2010/main" val="1693637382"/>
+        <p14:creationId xmlns:p14="http://schemas.microsoft.com/office/powerpoint/2010/main" xmlns="" val="1693637382"/>
       </p:ext>
     </p:extLst>
   </p:cSld>

</xml_diff>

<commit_message>
Add some extra hints, and remove some unnecessary grey tips
Browse:
Add --decorate --graph to git log, and add gitk

Useful tips:
Add some starter pages to git help
Remove "Create empty branch" section
Replace "Graphical log" section with "Short log"
Update git push delete command
Add git remote

Resolve merge conflicts:
Remove sections about different diff commands and rebase, replace with git
mergetool

Commit:
Add git add/rm suggestion
Add -v to commit

Publish:
Add -a to git tag

Publish:
Add note about -u to git push
</commit_message>
<xml_diff>
--- a/gitcheatsheet.pptx
+++ b/gitcheatsheet.pptx
@@ -11,7 +11,7 @@
     <p:sldId id="256" r:id="rId2"/>
   </p:sldIdLst>
   <p:sldSz cx="9144000" cy="6858000" type="screen4x3"/>
-  <p:notesSz cx="6834188" cy="9979025"/>
+  <p:notesSz cx="6858000" cy="9296400"/>
   <p:defaultTextStyle>
     <a:defPPr>
       <a:defRPr lang="de-DE"/>
@@ -145,7 +145,7 @@
         <p:spPr>
           <a:xfrm>
             <a:off x="3" y="1"/>
-            <a:ext cx="2962014" cy="498317"/>
+            <a:ext cx="2972334" cy="464229"/>
           </a:xfrm>
           <a:prstGeom prst="rect">
             <a:avLst/>
@@ -175,8 +175,8 @@
         </p:nvSpPr>
         <p:spPr>
           <a:xfrm>
-            <a:off x="3870579" y="1"/>
-            <a:ext cx="2962014" cy="498317"/>
+            <a:off x="3884065" y="1"/>
+            <a:ext cx="2972334" cy="464229"/>
           </a:xfrm>
           <a:prstGeom prst="rect">
             <a:avLst/>
@@ -193,7 +193,7 @@
             <a:fld id="{216F1272-66CD-404A-9C2F-921E32EBB5BE}" type="datetimeFigureOut">
               <a:rPr lang="de-DE" smtClean="0"/>
               <a:pPr/>
-              <a:t>02.08.2011</a:t>
+              <a:t>08.03.2012</a:t>
             </a:fld>
             <a:endParaRPr lang="de-DE"/>
           </a:p>
@@ -211,8 +211,8 @@
         </p:nvSpPr>
         <p:spPr>
           <a:xfrm>
-            <a:off x="922338" y="749300"/>
-            <a:ext cx="4989512" cy="3741738"/>
+            <a:off x="1106488" y="698500"/>
+            <a:ext cx="4645025" cy="3484563"/>
           </a:xfrm>
           <a:prstGeom prst="rect">
             <a:avLst/>
@@ -244,8 +244,8 @@
         </p:nvSpPr>
         <p:spPr>
           <a:xfrm>
-            <a:off x="683420" y="4740355"/>
-            <a:ext cx="5467350" cy="4489608"/>
+            <a:off x="685801" y="4416086"/>
+            <a:ext cx="5486400" cy="4182492"/>
           </a:xfrm>
           <a:prstGeom prst="rect">
             <a:avLst/>
@@ -304,8 +304,8 @@
         </p:nvSpPr>
         <p:spPr>
           <a:xfrm>
-            <a:off x="3" y="9479124"/>
-            <a:ext cx="2962014" cy="498317"/>
+            <a:off x="3" y="8830696"/>
+            <a:ext cx="2972334" cy="464229"/>
           </a:xfrm>
           <a:prstGeom prst="rect">
             <a:avLst/>
@@ -335,8 +335,8 @@
         </p:nvSpPr>
         <p:spPr>
           <a:xfrm>
-            <a:off x="3870579" y="9479124"/>
-            <a:ext cx="2962014" cy="498317"/>
+            <a:off x="3884065" y="8830696"/>
+            <a:ext cx="2972334" cy="464229"/>
           </a:xfrm>
           <a:prstGeom prst="rect">
             <a:avLst/>
@@ -353,7 +353,7 @@
             <a:fld id="{2510A3DD-B673-456D-BE18-21611B5D5ECD}" type="slidenum">
               <a:rPr lang="de-DE" smtClean="0"/>
               <a:pPr/>
-              <a:t>‹Nº›</a:t>
+              <a:t>‹#›</a:t>
             </a:fld>
             <a:endParaRPr lang="de-DE"/>
           </a:p>
@@ -729,7 +729,7 @@
             <a:fld id="{EC0D1C15-6F3D-4F60-9F92-19619CAB35D3}" type="datetimeFigureOut">
               <a:rPr lang="de-DE" smtClean="0"/>
               <a:pPr/>
-              <a:t>02.08.2011</a:t>
+              <a:t>08.03.2012</a:t>
             </a:fld>
             <a:endParaRPr lang="de-DE"/>
           </a:p>
@@ -772,7 +772,7 @@
             <a:fld id="{2CA26653-66A7-4D7E-B745-105FFB57C7DC}" type="slidenum">
               <a:rPr lang="de-DE" smtClean="0"/>
               <a:pPr/>
-              <a:t>‹Nº›</a:t>
+              <a:t>‹#›</a:t>
             </a:fld>
             <a:endParaRPr lang="de-DE"/>
           </a:p>
@@ -901,7 +901,7 @@
             <a:fld id="{EC0D1C15-6F3D-4F60-9F92-19619CAB35D3}" type="datetimeFigureOut">
               <a:rPr lang="de-DE" smtClean="0"/>
               <a:pPr/>
-              <a:t>02.08.2011</a:t>
+              <a:t>08.03.2012</a:t>
             </a:fld>
             <a:endParaRPr lang="de-DE"/>
           </a:p>
@@ -944,7 +944,7 @@
             <a:fld id="{2CA26653-66A7-4D7E-B745-105FFB57C7DC}" type="slidenum">
               <a:rPr lang="de-DE" smtClean="0"/>
               <a:pPr/>
-              <a:t>‹Nº›</a:t>
+              <a:t>‹#›</a:t>
             </a:fld>
             <a:endParaRPr lang="de-DE"/>
           </a:p>
@@ -1083,7 +1083,7 @@
             <a:fld id="{EC0D1C15-6F3D-4F60-9F92-19619CAB35D3}" type="datetimeFigureOut">
               <a:rPr lang="de-DE" smtClean="0"/>
               <a:pPr/>
-              <a:t>02.08.2011</a:t>
+              <a:t>08.03.2012</a:t>
             </a:fld>
             <a:endParaRPr lang="de-DE"/>
           </a:p>
@@ -1126,7 +1126,7 @@
             <a:fld id="{2CA26653-66A7-4D7E-B745-105FFB57C7DC}" type="slidenum">
               <a:rPr lang="de-DE" smtClean="0"/>
               <a:pPr/>
-              <a:t>‹Nº›</a:t>
+              <a:t>‹#›</a:t>
             </a:fld>
             <a:endParaRPr lang="de-DE"/>
           </a:p>
@@ -1255,7 +1255,7 @@
             <a:fld id="{EC0D1C15-6F3D-4F60-9F92-19619CAB35D3}" type="datetimeFigureOut">
               <a:rPr lang="de-DE" smtClean="0"/>
               <a:pPr/>
-              <a:t>02.08.2011</a:t>
+              <a:t>08.03.2012</a:t>
             </a:fld>
             <a:endParaRPr lang="de-DE"/>
           </a:p>
@@ -1298,7 +1298,7 @@
             <a:fld id="{2CA26653-66A7-4D7E-B745-105FFB57C7DC}" type="slidenum">
               <a:rPr lang="de-DE" smtClean="0"/>
               <a:pPr/>
-              <a:t>‹Nº›</a:t>
+              <a:t>‹#›</a:t>
             </a:fld>
             <a:endParaRPr lang="de-DE"/>
           </a:p>
@@ -1503,7 +1503,7 @@
             <a:fld id="{EC0D1C15-6F3D-4F60-9F92-19619CAB35D3}" type="datetimeFigureOut">
               <a:rPr lang="de-DE" smtClean="0"/>
               <a:pPr/>
-              <a:t>02.08.2011</a:t>
+              <a:t>08.03.2012</a:t>
             </a:fld>
             <a:endParaRPr lang="de-DE"/>
           </a:p>
@@ -1546,7 +1546,7 @@
             <a:fld id="{2CA26653-66A7-4D7E-B745-105FFB57C7DC}" type="slidenum">
               <a:rPr lang="de-DE" smtClean="0"/>
               <a:pPr/>
-              <a:t>‹Nº›</a:t>
+              <a:t>‹#›</a:t>
             </a:fld>
             <a:endParaRPr lang="de-DE"/>
           </a:p>
@@ -1793,7 +1793,7 @@
             <a:fld id="{EC0D1C15-6F3D-4F60-9F92-19619CAB35D3}" type="datetimeFigureOut">
               <a:rPr lang="de-DE" smtClean="0"/>
               <a:pPr/>
-              <a:t>02.08.2011</a:t>
+              <a:t>08.03.2012</a:t>
             </a:fld>
             <a:endParaRPr lang="de-DE"/>
           </a:p>
@@ -1836,7 +1836,7 @@
             <a:fld id="{2CA26653-66A7-4D7E-B745-105FFB57C7DC}" type="slidenum">
               <a:rPr lang="de-DE" smtClean="0"/>
               <a:pPr/>
-              <a:t>‹Nº›</a:t>
+              <a:t>‹#›</a:t>
             </a:fld>
             <a:endParaRPr lang="de-DE"/>
           </a:p>
@@ -2217,7 +2217,7 @@
             <a:fld id="{EC0D1C15-6F3D-4F60-9F92-19619CAB35D3}" type="datetimeFigureOut">
               <a:rPr lang="de-DE" smtClean="0"/>
               <a:pPr/>
-              <a:t>02.08.2011</a:t>
+              <a:t>08.03.2012</a:t>
             </a:fld>
             <a:endParaRPr lang="de-DE"/>
           </a:p>
@@ -2260,7 +2260,7 @@
             <a:fld id="{2CA26653-66A7-4D7E-B745-105FFB57C7DC}" type="slidenum">
               <a:rPr lang="de-DE" smtClean="0"/>
               <a:pPr/>
-              <a:t>‹Nº›</a:t>
+              <a:t>‹#›</a:t>
             </a:fld>
             <a:endParaRPr lang="de-DE"/>
           </a:p>
@@ -2337,7 +2337,7 @@
             <a:fld id="{EC0D1C15-6F3D-4F60-9F92-19619CAB35D3}" type="datetimeFigureOut">
               <a:rPr lang="de-DE" smtClean="0"/>
               <a:pPr/>
-              <a:t>02.08.2011</a:t>
+              <a:t>08.03.2012</a:t>
             </a:fld>
             <a:endParaRPr lang="de-DE"/>
           </a:p>
@@ -2380,7 +2380,7 @@
             <a:fld id="{2CA26653-66A7-4D7E-B745-105FFB57C7DC}" type="slidenum">
               <a:rPr lang="de-DE" smtClean="0"/>
               <a:pPr/>
-              <a:t>‹Nº›</a:t>
+              <a:t>‹#›</a:t>
             </a:fld>
             <a:endParaRPr lang="de-DE"/>
           </a:p>
@@ -2434,7 +2434,7 @@
             <a:fld id="{EC0D1C15-6F3D-4F60-9F92-19619CAB35D3}" type="datetimeFigureOut">
               <a:rPr lang="de-DE" smtClean="0"/>
               <a:pPr/>
-              <a:t>02.08.2011</a:t>
+              <a:t>08.03.2012</a:t>
             </a:fld>
             <a:endParaRPr lang="de-DE"/>
           </a:p>
@@ -2477,7 +2477,7 @@
             <a:fld id="{2CA26653-66A7-4D7E-B745-105FFB57C7DC}" type="slidenum">
               <a:rPr lang="de-DE" smtClean="0"/>
               <a:pPr/>
-              <a:t>‹Nº›</a:t>
+              <a:t>‹#›</a:t>
             </a:fld>
             <a:endParaRPr lang="de-DE"/>
           </a:p>
@@ -2713,7 +2713,7 @@
             <a:fld id="{EC0D1C15-6F3D-4F60-9F92-19619CAB35D3}" type="datetimeFigureOut">
               <a:rPr lang="de-DE" smtClean="0"/>
               <a:pPr/>
-              <a:t>02.08.2011</a:t>
+              <a:t>08.03.2012</a:t>
             </a:fld>
             <a:endParaRPr lang="de-DE"/>
           </a:p>
@@ -2756,7 +2756,7 @@
             <a:fld id="{2CA26653-66A7-4D7E-B745-105FFB57C7DC}" type="slidenum">
               <a:rPr lang="de-DE" smtClean="0"/>
               <a:pPr/>
-              <a:t>‹Nº›</a:t>
+              <a:t>‹#›</a:t>
             </a:fld>
             <a:endParaRPr lang="de-DE"/>
           </a:p>
@@ -2968,7 +2968,7 @@
             <a:fld id="{EC0D1C15-6F3D-4F60-9F92-19619CAB35D3}" type="datetimeFigureOut">
               <a:rPr lang="de-DE" smtClean="0"/>
               <a:pPr/>
-              <a:t>02.08.2011</a:t>
+              <a:t>08.03.2012</a:t>
             </a:fld>
             <a:endParaRPr lang="de-DE"/>
           </a:p>
@@ -3011,7 +3011,7 @@
             <a:fld id="{2CA26653-66A7-4D7E-B745-105FFB57C7DC}" type="slidenum">
               <a:rPr lang="de-DE" smtClean="0"/>
               <a:pPr/>
-              <a:t>‹Nº›</a:t>
+              <a:t>‹#›</a:t>
             </a:fld>
             <a:endParaRPr lang="de-DE"/>
           </a:p>
@@ -3183,7 +3183,7 @@
             <a:fld id="{EC0D1C15-6F3D-4F60-9F92-19619CAB35D3}" type="datetimeFigureOut">
               <a:rPr lang="de-DE" smtClean="0"/>
               <a:pPr/>
-              <a:t>02.08.2011</a:t>
+              <a:t>08.03.2012</a:t>
             </a:fld>
             <a:endParaRPr lang="de-DE"/>
           </a:p>
@@ -3262,7 +3262,7 @@
             <a:fld id="{2CA26653-66A7-4D7E-B745-105FFB57C7DC}" type="slidenum">
               <a:rPr lang="de-DE" smtClean="0"/>
               <a:pPr/>
-              <a:t>‹Nº›</a:t>
+              <a:t>‹#›</a:t>
             </a:fld>
             <a:endParaRPr lang="de-DE"/>
           </a:p>
@@ -4218,7 +4218,7 @@
         <p:spPr>
           <a:xfrm>
             <a:off x="847840" y="1741445"/>
-            <a:ext cx="2270288" cy="2031592"/>
+            <a:ext cx="2270288" cy="2259059"/>
           </a:xfrm>
           <a:prstGeom prst="rect">
             <a:avLst/>
@@ -4354,8 +4354,28 @@
                 <a:latin typeface="Courier New" pitchFamily="49" charset="0"/>
                 <a:cs typeface="Courier New" pitchFamily="49" charset="0"/>
               </a:rPr>
-              <a:t> log</a:t>
-            </a:r>
+              <a:t> </a:t>
+            </a:r>
+            <a:r>
+              <a:rPr lang="en-US" sz="700" dirty="0" smtClean="0">
+                <a:latin typeface="Courier New" pitchFamily="49" charset="0"/>
+                <a:cs typeface="Courier New" pitchFamily="49" charset="0"/>
+              </a:rPr>
+              <a:t>log --decorate --graph</a:t>
+            </a:r>
+          </a:p>
+          <a:p>
+            <a:r>
+              <a:rPr lang="en-US" sz="700" dirty="0" err="1" smtClean="0">
+                <a:latin typeface="Courier New" pitchFamily="49" charset="0"/>
+                <a:cs typeface="Courier New" pitchFamily="49" charset="0"/>
+              </a:rPr>
+              <a:t>gitk</a:t>
+            </a:r>
+            <a:endParaRPr lang="en-US" sz="700" dirty="0" smtClean="0">
+              <a:latin typeface="Courier New" pitchFamily="49" charset="0"/>
+              <a:cs typeface="Courier New" pitchFamily="49" charset="0"/>
+            </a:endParaRPr>
           </a:p>
           <a:p>
             <a:r>
@@ -4382,8 +4402,13 @@
           <a:p>
             <a:r>
               <a:rPr lang="en-US" sz="700" b="1" dirty="0" smtClean="0"/>
-              <a:t>A commit identified by ID</a:t>
-            </a:r>
+              <a:t>A commit identified by </a:t>
+            </a:r>
+            <a:r>
+              <a:rPr lang="en-US" sz="700" b="1" dirty="0" smtClean="0"/>
+              <a:t>ID (commit hash)</a:t>
+            </a:r>
+            <a:endParaRPr lang="en-US" sz="700" b="1" dirty="0" smtClean="0"/>
           </a:p>
           <a:p>
             <a:r>
@@ -4736,8 +4761,27 @@
                   </a:schemeClr>
                 </a:solidFill>
               </a:rPr>
-              <a:t>after editing the broken files</a:t>
-            </a:r>
+              <a:t>after editing the broken </a:t>
+            </a:r>
+            <a:r>
+              <a:rPr lang="en-US" sz="700" dirty="0" smtClean="0">
+                <a:solidFill>
+                  <a:schemeClr val="tx1">
+                    <a:lumMod val="50000"/>
+                    <a:lumOff val="50000"/>
+                  </a:schemeClr>
+                </a:solidFill>
+              </a:rPr>
+              <a:t>files (if you haven’t  pushed)</a:t>
+            </a:r>
+            <a:endParaRPr lang="en-US" sz="700" dirty="0" smtClean="0">
+              <a:solidFill>
+                <a:schemeClr val="tx1">
+                  <a:lumMod val="50000"/>
+                  <a:lumOff val="50000"/>
+                </a:schemeClr>
+              </a:solidFill>
+            </a:endParaRPr>
           </a:p>
           <a:p>
             <a:r>
@@ -5041,12 +5085,64 @@
           </a:p>
           <a:p>
             <a:pPr algn="ctr"/>
-            <a:endParaRPr lang="de-DE" sz="800" b="1" dirty="0"/>
-          </a:p>
-          <a:p>
+            <a:endParaRPr lang="de-DE" sz="800" b="1" dirty="0" smtClean="0"/>
+          </a:p>
+          <a:p>
+            <a:r>
+              <a:rPr lang="en-US" sz="700" dirty="0" err="1" smtClean="0">
+                <a:latin typeface="Courier New" pitchFamily="49" charset="0"/>
+                <a:cs typeface="Courier New" pitchFamily="49" charset="0"/>
+              </a:rPr>
+              <a:t>git</a:t>
+            </a:r>
+            <a:r>
+              <a:rPr lang="en-US" sz="700" dirty="0" smtClean="0">
+                <a:latin typeface="Courier New" pitchFamily="49" charset="0"/>
+                <a:cs typeface="Courier New" pitchFamily="49" charset="0"/>
+              </a:rPr>
+              <a:t> (</a:t>
+            </a:r>
+            <a:r>
+              <a:rPr lang="en-US" sz="700" dirty="0" err="1" smtClean="0">
+                <a:latin typeface="Courier New" pitchFamily="49" charset="0"/>
+                <a:cs typeface="Courier New" pitchFamily="49" charset="0"/>
+              </a:rPr>
+              <a:t>add|rm</a:t>
+            </a:r>
+            <a:r>
+              <a:rPr lang="en-US" sz="700" dirty="0" smtClean="0">
+                <a:latin typeface="Courier New" pitchFamily="49" charset="0"/>
+                <a:cs typeface="Courier New" pitchFamily="49" charset="0"/>
+              </a:rPr>
+              <a:t>) &lt;files&gt;; </a:t>
+            </a:r>
+            <a:r>
+              <a:rPr lang="en-US" sz="700" dirty="0" err="1" smtClean="0">
+                <a:latin typeface="Courier New" pitchFamily="49" charset="0"/>
+                <a:cs typeface="Courier New" pitchFamily="49" charset="0"/>
+              </a:rPr>
+              <a:t>git</a:t>
+            </a:r>
+            <a:r>
+              <a:rPr lang="en-US" sz="700" dirty="0" smtClean="0">
+                <a:latin typeface="Courier New" pitchFamily="49" charset="0"/>
+                <a:cs typeface="Courier New" pitchFamily="49" charset="0"/>
+              </a:rPr>
+              <a:t> commit -v</a:t>
+            </a:r>
+            <a:endParaRPr lang="en-US" sz="700" dirty="0" smtClean="0">
+              <a:latin typeface="Courier New" pitchFamily="49" charset="0"/>
+              <a:cs typeface="Courier New" pitchFamily="49" charset="0"/>
+            </a:endParaRPr>
+          </a:p>
+          <a:p>
+            <a:r>
+              <a:rPr lang="en-US" sz="700" b="1" dirty="0" smtClean="0"/>
+              <a:t>Commit </a:t>
+            </a:r>
             <a:r>
               <a:rPr lang="en-US" sz="700" b="1" dirty="0"/>
-              <a:t>Commit all local changes</a:t>
+              <a:t>all local changes</a:t>
             </a:r>
           </a:p>
           <a:p>
@@ -5062,14 +5158,14 @@
                 <a:latin typeface="Courier New" pitchFamily="49" charset="0"/>
                 <a:cs typeface="Courier New" pitchFamily="49" charset="0"/>
               </a:rPr>
-              <a:t> commit -</a:t>
+              <a:t> commit </a:t>
             </a:r>
             <a:r>
               <a:rPr lang="en-US" sz="700" dirty="0" smtClean="0">
                 <a:latin typeface="Courier New" pitchFamily="49" charset="0"/>
                 <a:cs typeface="Courier New" pitchFamily="49" charset="0"/>
               </a:rPr>
-              <a:t>a</a:t>
+              <a:t>–a -v</a:t>
             </a:r>
             <a:endParaRPr lang="en-US" sz="700" dirty="0">
               <a:latin typeface="Courier New" pitchFamily="49" charset="0"/>
@@ -5213,8 +5309,19 @@
                 <a:latin typeface="Courier New" pitchFamily="49" charset="0"/>
                 <a:cs typeface="Courier New" pitchFamily="49" charset="0"/>
               </a:rPr>
-              <a:t>git branch</a:t>
-            </a:r>
+              <a:t>git </a:t>
+            </a:r>
+            <a:r>
+              <a:rPr lang="de-DE" sz="700" dirty="0" smtClean="0">
+                <a:latin typeface="Courier New" pitchFamily="49" charset="0"/>
+                <a:cs typeface="Courier New" pitchFamily="49" charset="0"/>
+              </a:rPr>
+              <a:t>branch -vv [-r]</a:t>
+            </a:r>
+            <a:endParaRPr lang="de-DE" sz="700" dirty="0" smtClean="0">
+              <a:latin typeface="Courier New" pitchFamily="49" charset="0"/>
+              <a:cs typeface="Courier New" pitchFamily="49" charset="0"/>
+            </a:endParaRPr>
           </a:p>
           <a:p>
             <a:r>
@@ -5282,28 +5389,7 @@
                 <a:latin typeface="Courier New" pitchFamily="49" charset="0"/>
                 <a:cs typeface="Courier New" pitchFamily="49" charset="0"/>
               </a:rPr>
-              <a:t>git </a:t>
-            </a:r>
-            <a:r>
-              <a:rPr lang="de-DE" sz="700" dirty="0" smtClean="0">
-                <a:latin typeface="Courier New" pitchFamily="49" charset="0"/>
-                <a:cs typeface="Courier New" pitchFamily="49" charset="0"/>
-              </a:rPr>
-              <a:t>branch</a:t>
-            </a:r>
-            <a:r>
-              <a:rPr lang="de-DE" sz="700" dirty="0" smtClean="0">
-                <a:latin typeface="Courier New" pitchFamily="49" charset="0"/>
-                <a:cs typeface="Courier New" pitchFamily="49" charset="0"/>
-              </a:rPr>
-              <a:t> </a:t>
-            </a:r>
-            <a:r>
-              <a:rPr lang="de-DE" sz="700" dirty="0" smtClean="0">
-                <a:latin typeface="Courier New" pitchFamily="49" charset="0"/>
-                <a:cs typeface="Courier New" pitchFamily="49" charset="0"/>
-              </a:rPr>
-              <a:t>&lt;new&gt; &lt;base&gt;</a:t>
+              <a:t>git branch &lt;new&gt; &lt;base&gt;</a:t>
             </a:r>
           </a:p>
           <a:p>
@@ -5421,8 +5507,33 @@
                 <a:latin typeface="Courier New" pitchFamily="49" charset="0"/>
                 <a:cs typeface="Courier New" pitchFamily="49" charset="0"/>
               </a:rPr>
-              <a:t> push [origin] [branch]</a:t>
-            </a:r>
+              <a:t> push [origin] [branch</a:t>
+            </a:r>
+            <a:r>
+              <a:rPr lang="en-US" sz="700" dirty="0" smtClean="0">
+                <a:latin typeface="Courier New" pitchFamily="49" charset="0"/>
+                <a:cs typeface="Courier New" pitchFamily="49" charset="0"/>
+              </a:rPr>
+              <a:t>]</a:t>
+            </a:r>
+          </a:p>
+          <a:p>
+            <a:pPr algn="r"/>
+            <a:r>
+              <a:rPr lang="en-US" sz="700" dirty="0" smtClean="0">
+                <a:solidFill>
+                  <a:schemeClr val="tx1">
+                    <a:lumMod val="50000"/>
+                    <a:lumOff val="50000"/>
+                  </a:schemeClr>
+                </a:solidFill>
+              </a:rPr>
+              <a:t>add -u to set default source for future pulls/pushes</a:t>
+            </a:r>
+            <a:endParaRPr lang="en-US" sz="700" dirty="0">
+              <a:latin typeface="Courier New" pitchFamily="49" charset="0"/>
+              <a:cs typeface="Courier New" pitchFamily="49" charset="0"/>
+            </a:endParaRPr>
           </a:p>
           <a:p>
             <a:r>
@@ -5443,10 +5554,17 @@
                 <a:latin typeface="Courier New" pitchFamily="49" charset="0"/>
                 <a:cs typeface="Courier New" pitchFamily="49" charset="0"/>
               </a:rPr>
-              <a:t> tag &lt;</a:t>
-            </a:r>
-            <a:r>
-              <a:rPr lang="en-US" sz="700" dirty="0" err="1">
+              <a:t> tag </a:t>
+            </a:r>
+            <a:r>
+              <a:rPr lang="en-US" sz="700" dirty="0" smtClean="0">
+                <a:latin typeface="Courier New" pitchFamily="49" charset="0"/>
+                <a:cs typeface="Courier New" pitchFamily="49" charset="0"/>
+              </a:rPr>
+              <a:t>–a &lt;</a:t>
+            </a:r>
+            <a:r>
+              <a:rPr lang="en-US" sz="700" dirty="0" err="1" smtClean="0">
                 <a:latin typeface="Courier New" pitchFamily="49" charset="0"/>
                 <a:cs typeface="Courier New" pitchFamily="49" charset="0"/>
               </a:rPr>
@@ -5769,7 +5887,44 @@
                 <a:latin typeface="Courier New" pitchFamily="49" charset="0"/>
                 <a:cs typeface="Courier New" pitchFamily="49" charset="0"/>
               </a:rPr>
-              <a:t> help [command]</a:t>
+              <a:t> help [command</a:t>
+            </a:r>
+            <a:r>
+              <a:rPr lang="en-US" sz="700" dirty="0" smtClean="0">
+                <a:latin typeface="Courier New" pitchFamily="49" charset="0"/>
+                <a:cs typeface="Courier New" pitchFamily="49" charset="0"/>
+              </a:rPr>
+              <a:t>]</a:t>
+            </a:r>
+          </a:p>
+          <a:p>
+            <a:r>
+              <a:rPr lang="en-US" sz="700" dirty="0" err="1" smtClean="0">
+                <a:latin typeface="Courier New" pitchFamily="49" charset="0"/>
+                <a:cs typeface="Courier New" pitchFamily="49" charset="0"/>
+              </a:rPr>
+              <a:t>git</a:t>
+            </a:r>
+            <a:r>
+              <a:rPr lang="en-US" sz="700" dirty="0" smtClean="0">
+                <a:latin typeface="Courier New" pitchFamily="49" charset="0"/>
+                <a:cs typeface="Courier New" pitchFamily="49" charset="0"/>
+              </a:rPr>
+              <a:t> help (</a:t>
+            </a:r>
+            <a:r>
+              <a:rPr lang="en-US" sz="700" dirty="0" err="1" smtClean="0">
+                <a:latin typeface="Courier New" pitchFamily="49" charset="0"/>
+                <a:cs typeface="Courier New" pitchFamily="49" charset="0"/>
+              </a:rPr>
+              <a:t>git|tutorial|glossary</a:t>
+            </a:r>
+            <a:r>
+              <a:rPr lang="en-US" sz="700" dirty="0" smtClean="0">
+                <a:latin typeface="Courier New" pitchFamily="49" charset="0"/>
+                <a:cs typeface="Courier New" pitchFamily="49" charset="0"/>
+              </a:rPr>
+              <a:t>)</a:t>
             </a:r>
             <a:endParaRPr lang="de-DE" sz="700" dirty="0" smtClean="0">
               <a:latin typeface="Courier New" pitchFamily="49" charset="0"/>
@@ -5779,11 +5934,45 @@
           <a:p>
             <a:r>
               <a:rPr lang="de-DE" sz="700" b="1" dirty="0" smtClean="0"/>
-              <a:t>Create </a:t>
-            </a:r>
-            <a:r>
-              <a:rPr lang="de-DE" sz="700" b="1" dirty="0"/>
-              <a:t>empty branch</a:t>
+              <a:t>Short log</a:t>
+            </a:r>
+            <a:endParaRPr lang="de-DE" sz="700" b="1" dirty="0"/>
+          </a:p>
+          <a:p>
+            <a:r>
+              <a:rPr lang="en-US" sz="700" dirty="0" err="1" smtClean="0">
+                <a:latin typeface="Courier New" pitchFamily="49" charset="0"/>
+                <a:cs typeface="Courier New" pitchFamily="49" charset="0"/>
+              </a:rPr>
+              <a:t>git</a:t>
+            </a:r>
+            <a:r>
+              <a:rPr lang="en-US" sz="700" dirty="0" smtClean="0">
+                <a:latin typeface="Courier New" pitchFamily="49" charset="0"/>
+                <a:cs typeface="Courier New" pitchFamily="49" charset="0"/>
+              </a:rPr>
+              <a:t> log --</a:t>
+            </a:r>
+            <a:r>
+              <a:rPr lang="en-US" sz="700" dirty="0" err="1" smtClean="0">
+                <a:latin typeface="Courier New" pitchFamily="49" charset="0"/>
+                <a:cs typeface="Courier New" pitchFamily="49" charset="0"/>
+              </a:rPr>
+              <a:t>oneline</a:t>
+            </a:r>
+            <a:endParaRPr lang="en-US" sz="700" dirty="0">
+              <a:latin typeface="Courier New" pitchFamily="49" charset="0"/>
+              <a:cs typeface="Courier New" pitchFamily="49" charset="0"/>
+            </a:endParaRPr>
+          </a:p>
+          <a:p>
+            <a:r>
+              <a:rPr lang="en-US" sz="700" b="1" dirty="0" smtClean="0"/>
+              <a:t>Delete </a:t>
+            </a:r>
+            <a:r>
+              <a:rPr lang="en-US" sz="700" b="1" dirty="0"/>
+              <a:t>remote branch and locally</a:t>
             </a:r>
           </a:p>
           <a:p>
@@ -5792,25 +5981,35 @@
                 <a:latin typeface="Courier New" pitchFamily="49" charset="0"/>
                 <a:cs typeface="Courier New" pitchFamily="49" charset="0"/>
               </a:rPr>
-              <a:t>git symbolic-ref HEAD refs/heads/newbranch</a:t>
-            </a:r>
-          </a:p>
-          <a:p>
+              <a:t>git push </a:t>
+            </a:r>
+            <a:r>
+              <a:rPr lang="de-DE" sz="700" dirty="0" smtClean="0">
+                <a:latin typeface="Courier New" pitchFamily="49" charset="0"/>
+                <a:cs typeface="Courier New" pitchFamily="49" charset="0"/>
+              </a:rPr>
+              <a:t>--delete &lt;origin</a:t>
+            </a:r>
             <a:r>
               <a:rPr lang="de-DE" sz="700" dirty="0">
                 <a:latin typeface="Courier New" pitchFamily="49" charset="0"/>
                 <a:cs typeface="Courier New" pitchFamily="49" charset="0"/>
               </a:rPr>
-              <a:t>rm .git/index</a:t>
-            </a:r>
-          </a:p>
-          <a:p>
+              <a:t>&gt; </a:t>
+            </a:r>
+            <a:r>
+              <a:rPr lang="de-DE" sz="700" dirty="0" smtClean="0">
+                <a:latin typeface="Courier New" pitchFamily="49" charset="0"/>
+                <a:cs typeface="Courier New" pitchFamily="49" charset="0"/>
+              </a:rPr>
+              <a:t>&lt;</a:t>
+            </a:r>
             <a:r>
               <a:rPr lang="de-DE" sz="700" dirty="0">
                 <a:latin typeface="Courier New" pitchFamily="49" charset="0"/>
                 <a:cs typeface="Courier New" pitchFamily="49" charset="0"/>
               </a:rPr>
-              <a:t>git clean -fdx</a:t>
+              <a:t>branch&gt;</a:t>
             </a:r>
           </a:p>
           <a:p>
@@ -5819,117 +6018,48 @@
                 <a:latin typeface="Courier New" pitchFamily="49" charset="0"/>
                 <a:cs typeface="Courier New" pitchFamily="49" charset="0"/>
               </a:rPr>
-              <a:t>&lt;do work&gt;</a:t>
-            </a:r>
-          </a:p>
-          <a:p>
-            <a:r>
-              <a:rPr lang="de-DE" sz="700" dirty="0">
-                <a:latin typeface="Courier New" pitchFamily="49" charset="0"/>
-                <a:cs typeface="Courier New" pitchFamily="49" charset="0"/>
-              </a:rPr>
-              <a:t>git add your files</a:t>
-            </a:r>
-          </a:p>
-          <a:p>
-            <a:r>
-              <a:rPr lang="en-US" sz="700" dirty="0" err="1">
+              <a:t>git branch -d &lt;branch</a:t>
+            </a:r>
+            <a:r>
+              <a:rPr lang="de-DE" sz="700" dirty="0" smtClean="0">
+                <a:latin typeface="Courier New" pitchFamily="49" charset="0"/>
+                <a:cs typeface="Courier New" pitchFamily="49" charset="0"/>
+              </a:rPr>
+              <a:t>&gt;</a:t>
+            </a:r>
+          </a:p>
+          <a:p>
+            <a:r>
+              <a:rPr lang="de-DE" sz="700" b="1" dirty="0" smtClean="0"/>
+              <a:t>Information about remotes</a:t>
+            </a:r>
+            <a:endParaRPr lang="de-DE" sz="700" b="1" dirty="0" smtClean="0"/>
+          </a:p>
+          <a:p>
+            <a:r>
+              <a:rPr lang="en-US" sz="700" dirty="0" err="1" smtClean="0">
                 <a:latin typeface="Courier New" pitchFamily="49" charset="0"/>
                 <a:cs typeface="Courier New" pitchFamily="49" charset="0"/>
               </a:rPr>
               <a:t>git</a:t>
             </a:r>
             <a:r>
-              <a:rPr lang="en-US" sz="700" dirty="0">
-                <a:latin typeface="Courier New" pitchFamily="49" charset="0"/>
-                <a:cs typeface="Courier New" pitchFamily="49" charset="0"/>
-              </a:rPr>
-              <a:t> commit -m 'Initial commit'</a:t>
-            </a:r>
-          </a:p>
-          <a:p>
-            <a:r>
-              <a:rPr lang="de-DE" sz="700" b="1" dirty="0"/>
-              <a:t>Graphical log</a:t>
-            </a:r>
-          </a:p>
-          <a:p>
-            <a:r>
-              <a:rPr lang="de-DE" sz="700" dirty="0">
-                <a:latin typeface="Courier New" pitchFamily="49" charset="0"/>
-                <a:cs typeface="Courier New" pitchFamily="49" charset="0"/>
-              </a:rPr>
-              <a:t>git log --graph</a:t>
-            </a:r>
-          </a:p>
-          <a:p>
-            <a:r>
-              <a:rPr lang="en-US" sz="700" dirty="0" err="1">
-                <a:latin typeface="Courier New" pitchFamily="49" charset="0"/>
-                <a:cs typeface="Courier New" pitchFamily="49" charset="0"/>
-              </a:rPr>
-              <a:t>git</a:t>
-            </a:r>
-            <a:r>
-              <a:rPr lang="en-US" sz="700" dirty="0">
-                <a:latin typeface="Courier New" pitchFamily="49" charset="0"/>
-                <a:cs typeface="Courier New" pitchFamily="49" charset="0"/>
-              </a:rPr>
-              <a:t> log --graph --pretty=</a:t>
-            </a:r>
-            <a:r>
-              <a:rPr lang="en-US" sz="700" dirty="0" err="1">
-                <a:latin typeface="Courier New" pitchFamily="49" charset="0"/>
-                <a:cs typeface="Courier New" pitchFamily="49" charset="0"/>
-              </a:rPr>
-              <a:t>oneline</a:t>
-            </a:r>
-            <a:r>
-              <a:rPr lang="en-US" sz="700" dirty="0">
-                <a:latin typeface="Courier New" pitchFamily="49" charset="0"/>
-                <a:cs typeface="Courier New" pitchFamily="49" charset="0"/>
-              </a:rPr>
-              <a:t> --abbrev-commit</a:t>
-            </a:r>
-          </a:p>
-          <a:p>
-            <a:r>
-              <a:rPr lang="de-DE" sz="700" b="1" dirty="0"/>
-              <a:t>Push branch to remote</a:t>
-            </a:r>
-          </a:p>
-          <a:p>
-            <a:r>
-              <a:rPr lang="de-DE" sz="700" dirty="0">
-                <a:latin typeface="Courier New" pitchFamily="49" charset="0"/>
-                <a:cs typeface="Courier New" pitchFamily="49" charset="0"/>
-              </a:rPr>
-              <a:t>git push &lt;origin&gt; &lt;branch&gt;</a:t>
-            </a:r>
-          </a:p>
-          <a:p>
-            <a:r>
-              <a:rPr lang="en-US" sz="700" b="1" dirty="0"/>
-              <a:t>Delete remote branch and locally</a:t>
-            </a:r>
-          </a:p>
-          <a:p>
-            <a:r>
-              <a:rPr lang="de-DE" sz="700" dirty="0">
-                <a:latin typeface="Courier New" pitchFamily="49" charset="0"/>
-                <a:cs typeface="Courier New" pitchFamily="49" charset="0"/>
-              </a:rPr>
-              <a:t>git push &lt;origin&gt; :&lt;branch&gt;</a:t>
-            </a:r>
-          </a:p>
-          <a:p>
-            <a:r>
-              <a:rPr lang="de-DE" sz="700" dirty="0">
-                <a:latin typeface="Courier New" pitchFamily="49" charset="0"/>
-                <a:cs typeface="Courier New" pitchFamily="49" charset="0"/>
-              </a:rPr>
-              <a:t>git branch -d &lt;branch&gt;</a:t>
-            </a:r>
+              <a:rPr lang="en-US" sz="700" dirty="0" smtClean="0">
+                <a:latin typeface="Courier New" pitchFamily="49" charset="0"/>
+                <a:cs typeface="Courier New" pitchFamily="49" charset="0"/>
+              </a:rPr>
+              <a:t> remote –v show [origin]</a:t>
+            </a:r>
+            <a:endParaRPr lang="en-US" sz="700" dirty="0" smtClean="0">
+              <a:latin typeface="Courier New" pitchFamily="49" charset="0"/>
+              <a:cs typeface="Courier New" pitchFamily="49" charset="0"/>
+            </a:endParaRPr>
+          </a:p>
+          <a:p>
+            <a:endParaRPr lang="de-DE" sz="700" dirty="0">
+              <a:latin typeface="Courier New" pitchFamily="49" charset="0"/>
+              <a:cs typeface="Courier New" pitchFamily="49" charset="0"/>
+            </a:endParaRPr>
           </a:p>
         </p:txBody>
       </p:sp>
@@ -6020,8 +6150,12 @@
           </a:p>
           <a:p>
             <a:r>
+              <a:rPr lang="en-US" sz="700" b="1" dirty="0" smtClean="0"/>
+              <a:t>After </a:t>
+            </a:r>
+            <a:r>
               <a:rPr lang="en-US" sz="700" b="1" dirty="0"/>
-              <a:t>View merge conflicts against base file</a:t>
+              <a:t>resolving conflicts, merge with</a:t>
             </a:r>
           </a:p>
           <a:p>
@@ -6037,91 +6171,73 @@
                 <a:latin typeface="Courier New" pitchFamily="49" charset="0"/>
                 <a:cs typeface="Courier New" pitchFamily="49" charset="0"/>
               </a:rPr>
-              <a:t> diff --base &lt;FILE&gt;</a:t>
-            </a:r>
-          </a:p>
-          <a:p>
-            <a:r>
-              <a:rPr lang="en-US" sz="700" b="1" dirty="0"/>
-              <a:t>View merge conflicts against other changes</a:t>
-            </a:r>
-          </a:p>
-          <a:p>
-            <a:r>
-              <a:rPr lang="en-US" sz="700" dirty="0" err="1">
+              <a:t> add &lt;CONFLICTING_FILE</a:t>
+            </a:r>
+            <a:r>
+              <a:rPr lang="en-US" sz="700" dirty="0" smtClean="0">
+                <a:latin typeface="Courier New" pitchFamily="49" charset="0"/>
+                <a:cs typeface="Courier New" pitchFamily="49" charset="0"/>
+              </a:rPr>
+              <a:t>&gt;</a:t>
+            </a:r>
+          </a:p>
+          <a:p>
+            <a:r>
+              <a:rPr lang="en-US" sz="700" dirty="0" err="1" smtClean="0">
                 <a:latin typeface="Courier New" pitchFamily="49" charset="0"/>
                 <a:cs typeface="Courier New" pitchFamily="49" charset="0"/>
               </a:rPr>
               <a:t>git</a:t>
             </a:r>
             <a:r>
-              <a:rPr lang="en-US" sz="700" dirty="0">
-                <a:latin typeface="Courier New" pitchFamily="49" charset="0"/>
-                <a:cs typeface="Courier New" pitchFamily="49" charset="0"/>
-              </a:rPr>
-              <a:t> diff --theirs &lt;FILE&gt;</a:t>
-            </a:r>
-          </a:p>
-          <a:p>
-            <a:r>
-              <a:rPr lang="en-US" sz="700" b="1" dirty="0"/>
-              <a:t>View merge conflicts against your changes</a:t>
-            </a:r>
-          </a:p>
-          <a:p>
-            <a:r>
-              <a:rPr lang="en-US" sz="700" dirty="0" err="1">
+              <a:rPr lang="en-US" sz="700" dirty="0" smtClean="0">
+                <a:latin typeface="Courier New" pitchFamily="49" charset="0"/>
+                <a:cs typeface="Courier New" pitchFamily="49" charset="0"/>
+              </a:rPr>
+              <a:t> commit</a:t>
+            </a:r>
+            <a:endParaRPr lang="en-US" sz="700" dirty="0" smtClean="0">
+              <a:latin typeface="Courier New" pitchFamily="49" charset="0"/>
+              <a:cs typeface="Courier New" pitchFamily="49" charset="0"/>
+            </a:endParaRPr>
+          </a:p>
+          <a:p>
+            <a:r>
+              <a:rPr lang="en-US" sz="700" b="1" dirty="0" smtClean="0"/>
+              <a:t>Or use 3-way merge tool (like meld or </a:t>
+            </a:r>
+            <a:r>
+              <a:rPr lang="en-US" sz="700" b="1" dirty="0" err="1" smtClean="0"/>
+              <a:t>vimdiff</a:t>
+            </a:r>
+            <a:r>
+              <a:rPr lang="en-US" sz="700" b="1" dirty="0" smtClean="0"/>
+              <a:t>)</a:t>
+            </a:r>
+          </a:p>
+          <a:p>
+            <a:r>
+              <a:rPr lang="en-US" sz="700" dirty="0" err="1" smtClean="0">
                 <a:latin typeface="Courier New" pitchFamily="49" charset="0"/>
                 <a:cs typeface="Courier New" pitchFamily="49" charset="0"/>
               </a:rPr>
               <a:t>git</a:t>
             </a:r>
             <a:r>
-              <a:rPr lang="en-US" sz="700" dirty="0">
-                <a:latin typeface="Courier New" pitchFamily="49" charset="0"/>
-                <a:cs typeface="Courier New" pitchFamily="49" charset="0"/>
-              </a:rPr>
-              <a:t> diff --ours &lt;FILE&gt;</a:t>
-            </a:r>
-          </a:p>
-          <a:p>
-            <a:r>
-              <a:rPr lang="en-US" sz="700" b="1" dirty="0"/>
-              <a:t>After resolving conflicts, merge with</a:t>
-            </a:r>
-          </a:p>
-          <a:p>
-            <a:r>
-              <a:rPr lang="en-US" sz="700" dirty="0" err="1">
-                <a:latin typeface="Courier New" pitchFamily="49" charset="0"/>
-                <a:cs typeface="Courier New" pitchFamily="49" charset="0"/>
-              </a:rPr>
-              <a:t>git</a:t>
-            </a:r>
-            <a:r>
-              <a:rPr lang="en-US" sz="700" dirty="0">
-                <a:latin typeface="Courier New" pitchFamily="49" charset="0"/>
-                <a:cs typeface="Courier New" pitchFamily="49" charset="0"/>
-              </a:rPr>
-              <a:t> add &lt;CONFLICTING_FILE&gt;</a:t>
-            </a:r>
-          </a:p>
-          <a:p>
-            <a:r>
-              <a:rPr lang="en-US" sz="700" dirty="0" err="1">
-                <a:latin typeface="Courier New" pitchFamily="49" charset="0"/>
-                <a:cs typeface="Courier New" pitchFamily="49" charset="0"/>
-              </a:rPr>
-              <a:t>git</a:t>
-            </a:r>
-            <a:r>
-              <a:rPr lang="en-US" sz="700" dirty="0">
-                <a:latin typeface="Courier New" pitchFamily="49" charset="0"/>
-                <a:cs typeface="Courier New" pitchFamily="49" charset="0"/>
-              </a:rPr>
-              <a:t> rebase --continue</a:t>
-            </a:r>
-            <a:endParaRPr lang="de-DE" sz="700" dirty="0">
+              <a:rPr lang="en-US" sz="700" dirty="0" smtClean="0">
+                <a:latin typeface="Courier New" pitchFamily="49" charset="0"/>
+                <a:cs typeface="Courier New" pitchFamily="49" charset="0"/>
+              </a:rPr>
+              <a:t> </a:t>
+            </a:r>
+            <a:r>
+              <a:rPr lang="en-US" sz="700" dirty="0" err="1" smtClean="0">
+                <a:latin typeface="Courier New" pitchFamily="49" charset="0"/>
+                <a:cs typeface="Courier New" pitchFamily="49" charset="0"/>
+              </a:rPr>
+              <a:t>mergetool</a:t>
+            </a:r>
+            <a:endParaRPr lang="en-US" sz="700" dirty="0">
               <a:latin typeface="Courier New" pitchFamily="49" charset="0"/>
               <a:cs typeface="Courier New" pitchFamily="49" charset="0"/>
             </a:endParaRPr>
@@ -6312,6 +6428,42 @@
           </a:p>
           <a:p>
             <a:r>
+              <a:rPr lang="en-US" sz="700" b="1" dirty="0" smtClean="0">
+                <a:cs typeface="Courier New" pitchFamily="49" charset="0"/>
+              </a:rPr>
+              <a:t>add  branch names to output of </a:t>
+            </a:r>
+            <a:r>
+              <a:rPr lang="en-US" sz="700" b="1" dirty="0" err="1" smtClean="0">
+                <a:cs typeface="Courier New" pitchFamily="49" charset="0"/>
+              </a:rPr>
+              <a:t>git</a:t>
+            </a:r>
+            <a:r>
+              <a:rPr lang="en-US" sz="700" b="1" dirty="0" smtClean="0">
+                <a:cs typeface="Courier New" pitchFamily="49" charset="0"/>
+              </a:rPr>
+              <a:t> log</a:t>
+            </a:r>
+          </a:p>
+          <a:p>
+            <a:r>
+              <a:rPr lang="en-US" sz="700" dirty="0" err="1" smtClean="0">
+                <a:latin typeface="Courier New" pitchFamily="49" charset="0"/>
+                <a:cs typeface="Courier New" pitchFamily="49" charset="0"/>
+              </a:rPr>
+              <a:t>log.decorate</a:t>
+            </a:r>
+            <a:r>
+              <a:rPr lang="en-US" sz="700" dirty="0" smtClean="0">
+                <a:latin typeface="Courier New" pitchFamily="49" charset="0"/>
+                <a:cs typeface="Courier New" pitchFamily="49" charset="0"/>
+              </a:rPr>
+              <a:t> short</a:t>
+            </a:r>
+          </a:p>
+          <a:p>
+            <a:r>
               <a:rPr lang="en-US" sz="700" b="1" dirty="0" err="1" smtClean="0">
                 <a:latin typeface="+mj-lt"/>
                 <a:cs typeface="Courier New" pitchFamily="49" charset="0"/>
@@ -6370,63 +6522,7 @@
             </a:r>
           </a:p>
           <a:p>
-            <a:r>
-              <a:rPr lang="en-US" sz="700" b="1" dirty="0" err="1" smtClean="0">
-                <a:latin typeface="+mj-lt"/>
-                <a:cs typeface="Courier New" pitchFamily="49" charset="0"/>
-              </a:rPr>
-              <a:t>optimisation</a:t>
-            </a:r>
-            <a:endParaRPr lang="en-US" sz="700" b="1" dirty="0">
-              <a:latin typeface="+mj-lt"/>
-              <a:cs typeface="Courier New" pitchFamily="49" charset="0"/>
-            </a:endParaRPr>
-          </a:p>
-          <a:p>
-            <a:r>
-              <a:rPr lang="en-US" sz="700" dirty="0" err="1" smtClean="0">
-                <a:latin typeface="Courier New" pitchFamily="49" charset="0"/>
-                <a:cs typeface="Courier New" pitchFamily="49" charset="0"/>
-              </a:rPr>
-              <a:t>pack.threads</a:t>
-            </a:r>
-            <a:r>
-              <a:rPr lang="en-US" sz="700" dirty="0" smtClean="0">
-                <a:latin typeface="Courier New" pitchFamily="49" charset="0"/>
-                <a:cs typeface="Courier New" pitchFamily="49" charset="0"/>
-              </a:rPr>
-              <a:t> </a:t>
-            </a:r>
-            <a:r>
-              <a:rPr lang="en-US" sz="700" dirty="0">
-                <a:latin typeface="Courier New" pitchFamily="49" charset="0"/>
-                <a:cs typeface="Courier New" pitchFamily="49" charset="0"/>
-              </a:rPr>
-              <a:t>0</a:t>
-            </a:r>
-          </a:p>
-          <a:p>
-            <a:r>
-              <a:rPr lang="en-US" sz="700" dirty="0" err="1">
-                <a:latin typeface="Courier New" pitchFamily="49" charset="0"/>
-                <a:cs typeface="Courier New" pitchFamily="49" charset="0"/>
-              </a:rPr>
-              <a:t>diff.renamelimit</a:t>
-            </a:r>
-            <a:r>
-              <a:rPr lang="en-US" sz="700" dirty="0">
-                <a:latin typeface="Courier New" pitchFamily="49" charset="0"/>
-                <a:cs typeface="Courier New" pitchFamily="49" charset="0"/>
-              </a:rPr>
-              <a:t> 0</a:t>
-            </a:r>
-          </a:p>
-          <a:p>
-            <a:pPr algn="r"/>
-            <a:r>
-              <a:rPr lang="en-US" sz="700" b="1" dirty="0"/>
-              <a:t>do not use on low memory p</a:t>
-            </a:r>
+            <a:endParaRPr lang="en-US" sz="700" b="1" dirty="0"/>
           </a:p>
           <a:p>
             <a:r>
@@ -6439,7 +6535,7 @@
           </a:p>
           <a:p>
             <a:r>
-              <a:rPr lang="en-US" sz="700" smtClean="0">
+              <a:rPr lang="en-US" sz="700" dirty="0" err="1" smtClean="0">
                 <a:latin typeface="Courier New" pitchFamily="49" charset="0"/>
                 <a:cs typeface="Courier New" pitchFamily="49" charset="0"/>
               </a:rPr>

</xml_diff>

<commit_message>
Fix #8 / Add windows options for long path support.
</commit_message>
<xml_diff>
--- a/gitcheatsheet.pptx
+++ b/gitcheatsheet.pptx
@@ -107,6 +107,22 @@
       </a:defRPr>
     </a:lvl9pPr>
   </p:defaultTextStyle>
+  <p:extLst>
+    <p:ext uri="{EFAFB233-063F-42B5-8137-9DF3F51BA10A}">
+      <p15:sldGuideLst xmlns:p15="http://schemas.microsoft.com/office/powerpoint/2012/main">
+        <p15:guide id="1" orient="horz" pos="2160">
+          <p15:clr>
+            <a:srgbClr val="A4A3A4"/>
+          </p15:clr>
+        </p15:guide>
+        <p15:guide id="2" pos="2880">
+          <p15:clr>
+            <a:srgbClr val="A4A3A4"/>
+          </p15:clr>
+        </p15:guide>
+      </p15:sldGuideLst>
+    </p:ext>
+  </p:extLst>
 </p:presentation>
 </file>
 
@@ -193,7 +209,7 @@
             <a:fld id="{216F1272-66CD-404A-9C2F-921E32EBB5BE}" type="datetimeFigureOut">
               <a:rPr lang="de-DE" smtClean="0"/>
               <a:pPr/>
-              <a:t>02.08.2011</a:t>
+              <a:t>07.09.2015</a:t>
             </a:fld>
             <a:endParaRPr lang="de-DE"/>
           </a:p>
@@ -353,7 +369,7 @@
             <a:fld id="{2510A3DD-B673-456D-BE18-21611B5D5ECD}" type="slidenum">
               <a:rPr lang="de-DE" smtClean="0"/>
               <a:pPr/>
-              <a:t>‹Nº›</a:t>
+              <a:t>‹#›</a:t>
             </a:fld>
             <a:endParaRPr lang="de-DE"/>
           </a:p>
@@ -362,7 +378,7 @@
     </p:spTree>
     <p:extLst>
       <p:ext uri="{BB962C8B-B14F-4D97-AF65-F5344CB8AC3E}">
-        <p14:creationId xmlns:p14="http://schemas.microsoft.com/office/powerpoint/2010/main" xmlns="" val="1253691580"/>
+        <p14:creationId xmlns:p14="http://schemas.microsoft.com/office/powerpoint/2010/main" val="1253691580"/>
       </p:ext>
     </p:extLst>
   </p:cSld>
@@ -537,7 +553,7 @@
     </p:spTree>
     <p:extLst>
       <p:ext uri="{BB962C8B-B14F-4D97-AF65-F5344CB8AC3E}">
-        <p14:creationId xmlns:p14="http://schemas.microsoft.com/office/powerpoint/2010/main" xmlns="" val="611083205"/>
+        <p14:creationId xmlns:p14="http://schemas.microsoft.com/office/powerpoint/2010/main" val="611083205"/>
       </p:ext>
     </p:extLst>
   </p:cSld>
@@ -729,7 +745,7 @@
             <a:fld id="{EC0D1C15-6F3D-4F60-9F92-19619CAB35D3}" type="datetimeFigureOut">
               <a:rPr lang="de-DE" smtClean="0"/>
               <a:pPr/>
-              <a:t>02.08.2011</a:t>
+              <a:t>07.09.2015</a:t>
             </a:fld>
             <a:endParaRPr lang="de-DE"/>
           </a:p>
@@ -772,7 +788,7 @@
             <a:fld id="{2CA26653-66A7-4D7E-B745-105FFB57C7DC}" type="slidenum">
               <a:rPr lang="de-DE" smtClean="0"/>
               <a:pPr/>
-              <a:t>‹Nº›</a:t>
+              <a:t>‹#›</a:t>
             </a:fld>
             <a:endParaRPr lang="de-DE"/>
           </a:p>
@@ -781,7 +797,7 @@
     </p:spTree>
     <p:extLst>
       <p:ext uri="{BB962C8B-B14F-4D97-AF65-F5344CB8AC3E}">
-        <p14:creationId xmlns:p14="http://schemas.microsoft.com/office/powerpoint/2010/main" xmlns="" val="2518847904"/>
+        <p14:creationId xmlns:p14="http://schemas.microsoft.com/office/powerpoint/2010/main" val="2518847904"/>
       </p:ext>
     </p:extLst>
   </p:cSld>
@@ -901,7 +917,7 @@
             <a:fld id="{EC0D1C15-6F3D-4F60-9F92-19619CAB35D3}" type="datetimeFigureOut">
               <a:rPr lang="de-DE" smtClean="0"/>
               <a:pPr/>
-              <a:t>02.08.2011</a:t>
+              <a:t>07.09.2015</a:t>
             </a:fld>
             <a:endParaRPr lang="de-DE"/>
           </a:p>
@@ -944,7 +960,7 @@
             <a:fld id="{2CA26653-66A7-4D7E-B745-105FFB57C7DC}" type="slidenum">
               <a:rPr lang="de-DE" smtClean="0"/>
               <a:pPr/>
-              <a:t>‹Nº›</a:t>
+              <a:t>‹#›</a:t>
             </a:fld>
             <a:endParaRPr lang="de-DE"/>
           </a:p>
@@ -953,7 +969,7 @@
     </p:spTree>
     <p:extLst>
       <p:ext uri="{BB962C8B-B14F-4D97-AF65-F5344CB8AC3E}">
-        <p14:creationId xmlns:p14="http://schemas.microsoft.com/office/powerpoint/2010/main" xmlns="" val="2382128639"/>
+        <p14:creationId xmlns:p14="http://schemas.microsoft.com/office/powerpoint/2010/main" val="2382128639"/>
       </p:ext>
     </p:extLst>
   </p:cSld>
@@ -1083,7 +1099,7 @@
             <a:fld id="{EC0D1C15-6F3D-4F60-9F92-19619CAB35D3}" type="datetimeFigureOut">
               <a:rPr lang="de-DE" smtClean="0"/>
               <a:pPr/>
-              <a:t>02.08.2011</a:t>
+              <a:t>07.09.2015</a:t>
             </a:fld>
             <a:endParaRPr lang="de-DE"/>
           </a:p>
@@ -1126,7 +1142,7 @@
             <a:fld id="{2CA26653-66A7-4D7E-B745-105FFB57C7DC}" type="slidenum">
               <a:rPr lang="de-DE" smtClean="0"/>
               <a:pPr/>
-              <a:t>‹Nº›</a:t>
+              <a:t>‹#›</a:t>
             </a:fld>
             <a:endParaRPr lang="de-DE"/>
           </a:p>
@@ -1135,7 +1151,7 @@
     </p:spTree>
     <p:extLst>
       <p:ext uri="{BB962C8B-B14F-4D97-AF65-F5344CB8AC3E}">
-        <p14:creationId xmlns:p14="http://schemas.microsoft.com/office/powerpoint/2010/main" xmlns="" val="2186212659"/>
+        <p14:creationId xmlns:p14="http://schemas.microsoft.com/office/powerpoint/2010/main" val="2186212659"/>
       </p:ext>
     </p:extLst>
   </p:cSld>
@@ -1255,7 +1271,7 @@
             <a:fld id="{EC0D1C15-6F3D-4F60-9F92-19619CAB35D3}" type="datetimeFigureOut">
               <a:rPr lang="de-DE" smtClean="0"/>
               <a:pPr/>
-              <a:t>02.08.2011</a:t>
+              <a:t>07.09.2015</a:t>
             </a:fld>
             <a:endParaRPr lang="de-DE"/>
           </a:p>
@@ -1298,7 +1314,7 @@
             <a:fld id="{2CA26653-66A7-4D7E-B745-105FFB57C7DC}" type="slidenum">
               <a:rPr lang="de-DE" smtClean="0"/>
               <a:pPr/>
-              <a:t>‹Nº›</a:t>
+              <a:t>‹#›</a:t>
             </a:fld>
             <a:endParaRPr lang="de-DE"/>
           </a:p>
@@ -1307,7 +1323,7 @@
     </p:spTree>
     <p:extLst>
       <p:ext uri="{BB962C8B-B14F-4D97-AF65-F5344CB8AC3E}">
-        <p14:creationId xmlns:p14="http://schemas.microsoft.com/office/powerpoint/2010/main" xmlns="" val="3598186428"/>
+        <p14:creationId xmlns:p14="http://schemas.microsoft.com/office/powerpoint/2010/main" val="3598186428"/>
       </p:ext>
     </p:extLst>
   </p:cSld>
@@ -1503,7 +1519,7 @@
             <a:fld id="{EC0D1C15-6F3D-4F60-9F92-19619CAB35D3}" type="datetimeFigureOut">
               <a:rPr lang="de-DE" smtClean="0"/>
               <a:pPr/>
-              <a:t>02.08.2011</a:t>
+              <a:t>07.09.2015</a:t>
             </a:fld>
             <a:endParaRPr lang="de-DE"/>
           </a:p>
@@ -1546,7 +1562,7 @@
             <a:fld id="{2CA26653-66A7-4D7E-B745-105FFB57C7DC}" type="slidenum">
               <a:rPr lang="de-DE" smtClean="0"/>
               <a:pPr/>
-              <a:t>‹Nº›</a:t>
+              <a:t>‹#›</a:t>
             </a:fld>
             <a:endParaRPr lang="de-DE"/>
           </a:p>
@@ -1555,7 +1571,7 @@
     </p:spTree>
     <p:extLst>
       <p:ext uri="{BB962C8B-B14F-4D97-AF65-F5344CB8AC3E}">
-        <p14:creationId xmlns:p14="http://schemas.microsoft.com/office/powerpoint/2010/main" xmlns="" val="812672732"/>
+        <p14:creationId xmlns:p14="http://schemas.microsoft.com/office/powerpoint/2010/main" val="812672732"/>
       </p:ext>
     </p:extLst>
   </p:cSld>
@@ -1793,7 +1809,7 @@
             <a:fld id="{EC0D1C15-6F3D-4F60-9F92-19619CAB35D3}" type="datetimeFigureOut">
               <a:rPr lang="de-DE" smtClean="0"/>
               <a:pPr/>
-              <a:t>02.08.2011</a:t>
+              <a:t>07.09.2015</a:t>
             </a:fld>
             <a:endParaRPr lang="de-DE"/>
           </a:p>
@@ -1836,7 +1852,7 @@
             <a:fld id="{2CA26653-66A7-4D7E-B745-105FFB57C7DC}" type="slidenum">
               <a:rPr lang="de-DE" smtClean="0"/>
               <a:pPr/>
-              <a:t>‹Nº›</a:t>
+              <a:t>‹#›</a:t>
             </a:fld>
             <a:endParaRPr lang="de-DE"/>
           </a:p>
@@ -1845,7 +1861,7 @@
     </p:spTree>
     <p:extLst>
       <p:ext uri="{BB962C8B-B14F-4D97-AF65-F5344CB8AC3E}">
-        <p14:creationId xmlns:p14="http://schemas.microsoft.com/office/powerpoint/2010/main" xmlns="" val="2148723115"/>
+        <p14:creationId xmlns:p14="http://schemas.microsoft.com/office/powerpoint/2010/main" val="2148723115"/>
       </p:ext>
     </p:extLst>
   </p:cSld>
@@ -2217,7 +2233,7 @@
             <a:fld id="{EC0D1C15-6F3D-4F60-9F92-19619CAB35D3}" type="datetimeFigureOut">
               <a:rPr lang="de-DE" smtClean="0"/>
               <a:pPr/>
-              <a:t>02.08.2011</a:t>
+              <a:t>07.09.2015</a:t>
             </a:fld>
             <a:endParaRPr lang="de-DE"/>
           </a:p>
@@ -2260,7 +2276,7 @@
             <a:fld id="{2CA26653-66A7-4D7E-B745-105FFB57C7DC}" type="slidenum">
               <a:rPr lang="de-DE" smtClean="0"/>
               <a:pPr/>
-              <a:t>‹Nº›</a:t>
+              <a:t>‹#›</a:t>
             </a:fld>
             <a:endParaRPr lang="de-DE"/>
           </a:p>
@@ -2269,7 +2285,7 @@
     </p:spTree>
     <p:extLst>
       <p:ext uri="{BB962C8B-B14F-4D97-AF65-F5344CB8AC3E}">
-        <p14:creationId xmlns:p14="http://schemas.microsoft.com/office/powerpoint/2010/main" xmlns="" val="1087614445"/>
+        <p14:creationId xmlns:p14="http://schemas.microsoft.com/office/powerpoint/2010/main" val="1087614445"/>
       </p:ext>
     </p:extLst>
   </p:cSld>
@@ -2337,7 +2353,7 @@
             <a:fld id="{EC0D1C15-6F3D-4F60-9F92-19619CAB35D3}" type="datetimeFigureOut">
               <a:rPr lang="de-DE" smtClean="0"/>
               <a:pPr/>
-              <a:t>02.08.2011</a:t>
+              <a:t>07.09.2015</a:t>
             </a:fld>
             <a:endParaRPr lang="de-DE"/>
           </a:p>
@@ -2380,7 +2396,7 @@
             <a:fld id="{2CA26653-66A7-4D7E-B745-105FFB57C7DC}" type="slidenum">
               <a:rPr lang="de-DE" smtClean="0"/>
               <a:pPr/>
-              <a:t>‹Nº›</a:t>
+              <a:t>‹#›</a:t>
             </a:fld>
             <a:endParaRPr lang="de-DE"/>
           </a:p>
@@ -2389,7 +2405,7 @@
     </p:spTree>
     <p:extLst>
       <p:ext uri="{BB962C8B-B14F-4D97-AF65-F5344CB8AC3E}">
-        <p14:creationId xmlns:p14="http://schemas.microsoft.com/office/powerpoint/2010/main" xmlns="" val="2204385288"/>
+        <p14:creationId xmlns:p14="http://schemas.microsoft.com/office/powerpoint/2010/main" val="2204385288"/>
       </p:ext>
     </p:extLst>
   </p:cSld>
@@ -2434,7 +2450,7 @@
             <a:fld id="{EC0D1C15-6F3D-4F60-9F92-19619CAB35D3}" type="datetimeFigureOut">
               <a:rPr lang="de-DE" smtClean="0"/>
               <a:pPr/>
-              <a:t>02.08.2011</a:t>
+              <a:t>07.09.2015</a:t>
             </a:fld>
             <a:endParaRPr lang="de-DE"/>
           </a:p>
@@ -2477,7 +2493,7 @@
             <a:fld id="{2CA26653-66A7-4D7E-B745-105FFB57C7DC}" type="slidenum">
               <a:rPr lang="de-DE" smtClean="0"/>
               <a:pPr/>
-              <a:t>‹Nº›</a:t>
+              <a:t>‹#›</a:t>
             </a:fld>
             <a:endParaRPr lang="de-DE"/>
           </a:p>
@@ -2486,7 +2502,7 @@
     </p:spTree>
     <p:extLst>
       <p:ext uri="{BB962C8B-B14F-4D97-AF65-F5344CB8AC3E}">
-        <p14:creationId xmlns:p14="http://schemas.microsoft.com/office/powerpoint/2010/main" xmlns="" val="4148503892"/>
+        <p14:creationId xmlns:p14="http://schemas.microsoft.com/office/powerpoint/2010/main" val="4148503892"/>
       </p:ext>
     </p:extLst>
   </p:cSld>
@@ -2713,7 +2729,7 @@
             <a:fld id="{EC0D1C15-6F3D-4F60-9F92-19619CAB35D3}" type="datetimeFigureOut">
               <a:rPr lang="de-DE" smtClean="0"/>
               <a:pPr/>
-              <a:t>02.08.2011</a:t>
+              <a:t>07.09.2015</a:t>
             </a:fld>
             <a:endParaRPr lang="de-DE"/>
           </a:p>
@@ -2756,7 +2772,7 @@
             <a:fld id="{2CA26653-66A7-4D7E-B745-105FFB57C7DC}" type="slidenum">
               <a:rPr lang="de-DE" smtClean="0"/>
               <a:pPr/>
-              <a:t>‹Nº›</a:t>
+              <a:t>‹#›</a:t>
             </a:fld>
             <a:endParaRPr lang="de-DE"/>
           </a:p>
@@ -2765,7 +2781,7 @@
     </p:spTree>
     <p:extLst>
       <p:ext uri="{BB962C8B-B14F-4D97-AF65-F5344CB8AC3E}">
-        <p14:creationId xmlns:p14="http://schemas.microsoft.com/office/powerpoint/2010/main" xmlns="" val="736351156"/>
+        <p14:creationId xmlns:p14="http://schemas.microsoft.com/office/powerpoint/2010/main" val="736351156"/>
       </p:ext>
     </p:extLst>
   </p:cSld>
@@ -2968,7 +2984,7 @@
             <a:fld id="{EC0D1C15-6F3D-4F60-9F92-19619CAB35D3}" type="datetimeFigureOut">
               <a:rPr lang="de-DE" smtClean="0"/>
               <a:pPr/>
-              <a:t>02.08.2011</a:t>
+              <a:t>07.09.2015</a:t>
             </a:fld>
             <a:endParaRPr lang="de-DE"/>
           </a:p>
@@ -3011,7 +3027,7 @@
             <a:fld id="{2CA26653-66A7-4D7E-B745-105FFB57C7DC}" type="slidenum">
               <a:rPr lang="de-DE" smtClean="0"/>
               <a:pPr/>
-              <a:t>‹Nº›</a:t>
+              <a:t>‹#›</a:t>
             </a:fld>
             <a:endParaRPr lang="de-DE"/>
           </a:p>
@@ -3020,7 +3036,7 @@
     </p:spTree>
     <p:extLst>
       <p:ext uri="{BB962C8B-B14F-4D97-AF65-F5344CB8AC3E}">
-        <p14:creationId xmlns:p14="http://schemas.microsoft.com/office/powerpoint/2010/main" xmlns="" val="2245416855"/>
+        <p14:creationId xmlns:p14="http://schemas.microsoft.com/office/powerpoint/2010/main" val="2245416855"/>
       </p:ext>
     </p:extLst>
   </p:cSld>
@@ -3183,7 +3199,7 @@
             <a:fld id="{EC0D1C15-6F3D-4F60-9F92-19619CAB35D3}" type="datetimeFigureOut">
               <a:rPr lang="de-DE" smtClean="0"/>
               <a:pPr/>
-              <a:t>02.08.2011</a:t>
+              <a:t>07.09.2015</a:t>
             </a:fld>
             <a:endParaRPr lang="de-DE"/>
           </a:p>
@@ -3262,7 +3278,7 @@
             <a:fld id="{2CA26653-66A7-4D7E-B745-105FFB57C7DC}" type="slidenum">
               <a:rPr lang="de-DE" smtClean="0"/>
               <a:pPr/>
-              <a:t>‹Nº›</a:t>
+              <a:t>‹#›</a:t>
             </a:fld>
             <a:endParaRPr lang="de-DE"/>
           </a:p>
@@ -3271,7 +3287,7 @@
     </p:spTree>
     <p:extLst>
       <p:ext uri="{BB962C8B-B14F-4D97-AF65-F5344CB8AC3E}">
-        <p14:creationId xmlns:p14="http://schemas.microsoft.com/office/powerpoint/2010/main" xmlns="" val="1149920150"/>
+        <p14:creationId xmlns:p14="http://schemas.microsoft.com/office/powerpoint/2010/main" val="1149920150"/>
       </p:ext>
     </p:extLst>
   </p:cSld>
@@ -5282,28 +5298,7 @@
                 <a:latin typeface="Courier New" pitchFamily="49" charset="0"/>
                 <a:cs typeface="Courier New" pitchFamily="49" charset="0"/>
               </a:rPr>
-              <a:t>git </a:t>
-            </a:r>
-            <a:r>
-              <a:rPr lang="de-DE" sz="700" dirty="0" smtClean="0">
-                <a:latin typeface="Courier New" pitchFamily="49" charset="0"/>
-                <a:cs typeface="Courier New" pitchFamily="49" charset="0"/>
-              </a:rPr>
-              <a:t>branch</a:t>
-            </a:r>
-            <a:r>
-              <a:rPr lang="de-DE" sz="700" dirty="0" smtClean="0">
-                <a:latin typeface="Courier New" pitchFamily="49" charset="0"/>
-                <a:cs typeface="Courier New" pitchFamily="49" charset="0"/>
-              </a:rPr>
-              <a:t> </a:t>
-            </a:r>
-            <a:r>
-              <a:rPr lang="de-DE" sz="700" dirty="0" smtClean="0">
-                <a:latin typeface="Courier New" pitchFamily="49" charset="0"/>
-                <a:cs typeface="Courier New" pitchFamily="49" charset="0"/>
-              </a:rPr>
-              <a:t>&lt;new&gt; &lt;base&gt;</a:t>
+              <a:t>git branch &lt;new&gt; &lt;base&gt;</a:t>
             </a:r>
           </a:p>
           <a:p>
@@ -5527,7 +5522,7 @@
             <a:blip r:embed="rId3" cstate="print">
               <a:extLst>
                 <a:ext uri="{28A0092B-C50C-407E-A947-70E740481C1C}">
-                  <a14:useLocalDpi xmlns:a14="http://schemas.microsoft.com/office/drawing/2010/main" xmlns="" val="0"/>
+                  <a14:useLocalDpi xmlns:a14="http://schemas.microsoft.com/office/drawing/2010/main" val="0"/>
                 </a:ext>
               </a:extLst>
             </a:blip>
@@ -5551,14 +5546,14 @@
             <a:effectLst/>
             <a:extLst>
               <a:ext uri="{909E8E84-426E-40DD-AFC4-6F175D3DCCD1}">
-                <a14:hiddenFill xmlns:a14="http://schemas.microsoft.com/office/drawing/2010/main" xmlns="">
+                <a14:hiddenFill xmlns:a14="http://schemas.microsoft.com/office/drawing/2010/main">
                   <a:solidFill>
                     <a:schemeClr val="accent1"/>
                   </a:solidFill>
                 </a14:hiddenFill>
               </a:ext>
               <a:ext uri="{91240B29-F687-4F45-9708-019B960494DF}">
-                <a14:hiddenLine xmlns:a14="http://schemas.microsoft.com/office/drawing/2010/main" xmlns="" w="9525">
+                <a14:hiddenLine xmlns:a14="http://schemas.microsoft.com/office/drawing/2010/main" w="9525">
                   <a:solidFill>
                     <a:schemeClr val="tx1"/>
                   </a:solidFill>
@@ -5568,7 +5563,7 @@
                 </a14:hiddenLine>
               </a:ext>
               <a:ext uri="{AF507438-7753-43E0-B8FC-AC1667EBCBE1}">
-                <a14:hiddenEffects xmlns:a14="http://schemas.microsoft.com/office/drawing/2010/main" xmlns="">
+                <a14:hiddenEffects xmlns:a14="http://schemas.microsoft.com/office/drawing/2010/main">
                   <a:effectLst>
                     <a:outerShdw dist="35921" dir="2700000" algn="ctr" rotWithShape="0">
                       <a:schemeClr val="bg2"/>
@@ -6316,7 +6311,7 @@
                 <a:latin typeface="+mj-lt"/>
                 <a:cs typeface="Courier New" pitchFamily="49" charset="0"/>
               </a:rPr>
-              <a:t>github</a:t>
+              <a:t>optimisation</a:t>
             </a:r>
             <a:endParaRPr lang="en-US" sz="700" b="1" dirty="0">
               <a:latin typeface="+mj-lt"/>
@@ -6329,65 +6324,6 @@
                 <a:latin typeface="Courier New" pitchFamily="49" charset="0"/>
                 <a:cs typeface="Courier New" pitchFamily="49" charset="0"/>
               </a:rPr>
-              <a:t>github.user</a:t>
-            </a:r>
-            <a:r>
-              <a:rPr lang="en-US" sz="700" dirty="0" smtClean="0">
-                <a:latin typeface="Courier New" pitchFamily="49" charset="0"/>
-                <a:cs typeface="Courier New" pitchFamily="49" charset="0"/>
-              </a:rPr>
-              <a:t> </a:t>
-            </a:r>
-            <a:r>
-              <a:rPr lang="en-US" sz="700" dirty="0">
-                <a:latin typeface="Courier New" pitchFamily="49" charset="0"/>
-                <a:cs typeface="Courier New" pitchFamily="49" charset="0"/>
-              </a:rPr>
-              <a:t>$user</a:t>
-            </a:r>
-          </a:p>
-          <a:p>
-            <a:r>
-              <a:rPr lang="en-US" sz="700" dirty="0" err="1">
-                <a:latin typeface="Courier New" pitchFamily="49" charset="0"/>
-                <a:cs typeface="Courier New" pitchFamily="49" charset="0"/>
-              </a:rPr>
-              <a:t>github.token</a:t>
-            </a:r>
-            <a:r>
-              <a:rPr lang="en-US" sz="700" dirty="0">
-                <a:latin typeface="Courier New" pitchFamily="49" charset="0"/>
-                <a:cs typeface="Courier New" pitchFamily="49" charset="0"/>
-              </a:rPr>
-              <a:t> $</a:t>
-            </a:r>
-            <a:r>
-              <a:rPr lang="en-US" sz="700" dirty="0" smtClean="0">
-                <a:latin typeface="Courier New" pitchFamily="49" charset="0"/>
-                <a:cs typeface="Courier New" pitchFamily="49" charset="0"/>
-              </a:rPr>
-              <a:t>token</a:t>
-            </a:r>
-          </a:p>
-          <a:p>
-            <a:r>
-              <a:rPr lang="en-US" sz="700" b="1" dirty="0" err="1" smtClean="0">
-                <a:latin typeface="+mj-lt"/>
-                <a:cs typeface="Courier New" pitchFamily="49" charset="0"/>
-              </a:rPr>
-              <a:t>optimisation</a:t>
-            </a:r>
-            <a:endParaRPr lang="en-US" sz="700" b="1" dirty="0">
-              <a:latin typeface="+mj-lt"/>
-              <a:cs typeface="Courier New" pitchFamily="49" charset="0"/>
-            </a:endParaRPr>
-          </a:p>
-          <a:p>
-            <a:r>
-              <a:rPr lang="en-US" sz="700" dirty="0" err="1" smtClean="0">
-                <a:latin typeface="Courier New" pitchFamily="49" charset="0"/>
-                <a:cs typeface="Courier New" pitchFamily="49" charset="0"/>
-              </a:rPr>
               <a:t>pack.threads</a:t>
             </a:r>
             <a:r>
@@ -6439,7 +6375,7 @@
           </a:p>
           <a:p>
             <a:r>
-              <a:rPr lang="en-US" sz="700" smtClean="0">
+              <a:rPr lang="en-US" sz="700" dirty="0" err="1" smtClean="0">
                 <a:latin typeface="Courier New" pitchFamily="49" charset="0"/>
                 <a:cs typeface="Courier New" pitchFamily="49" charset="0"/>
               </a:rPr>
@@ -6450,12 +6386,50 @@
                 <a:latin typeface="Courier New" pitchFamily="49" charset="0"/>
                 <a:cs typeface="Courier New" pitchFamily="49" charset="0"/>
               </a:rPr>
-              <a:t> true</a:t>
-            </a:r>
-            <a:endParaRPr lang="en-US" sz="700" dirty="0">
-              <a:latin typeface="Courier New" pitchFamily="49" charset="0"/>
-              <a:cs typeface="Courier New" pitchFamily="49" charset="0"/>
-            </a:endParaRPr>
+              <a:t> </a:t>
+            </a:r>
+            <a:r>
+              <a:rPr lang="en-US" sz="700" dirty="0" smtClean="0">
+                <a:latin typeface="Courier New" pitchFamily="49" charset="0"/>
+                <a:cs typeface="Courier New" pitchFamily="49" charset="0"/>
+              </a:rPr>
+              <a:t>true</a:t>
+            </a:r>
+          </a:p>
+          <a:p>
+            <a:r>
+              <a:rPr lang="en-US" sz="700" dirty="0" err="1">
+                <a:latin typeface="Courier New" pitchFamily="49" charset="0"/>
+                <a:cs typeface="Courier New" pitchFamily="49" charset="0"/>
+              </a:rPr>
+              <a:t>core.longpaths</a:t>
+            </a:r>
+            <a:r>
+              <a:rPr lang="en-US" sz="700" dirty="0">
+                <a:latin typeface="Courier New" pitchFamily="49" charset="0"/>
+                <a:cs typeface="Courier New" pitchFamily="49" charset="0"/>
+              </a:rPr>
+              <a:t> </a:t>
+            </a:r>
+            <a:r>
+              <a:rPr lang="en-US" sz="700" dirty="0" smtClean="0">
+                <a:latin typeface="Courier New" pitchFamily="49" charset="0"/>
+                <a:cs typeface="Courier New" pitchFamily="49" charset="0"/>
+              </a:rPr>
+              <a:t>true</a:t>
+            </a:r>
+          </a:p>
+          <a:p>
+            <a:pPr algn="r"/>
+            <a:r>
+              <a:rPr lang="en-US" sz="700" b="1" dirty="0" smtClean="0"/>
+              <a:t>Support path </a:t>
+            </a:r>
+            <a:r>
+              <a:rPr lang="en-US" sz="700" b="1" smtClean="0"/>
+              <a:t>&gt; 260 chars on Windows</a:t>
+            </a:r>
+            <a:endParaRPr lang="en-US" sz="700" b="1" dirty="0"/>
           </a:p>
         </p:txBody>
       </p:sp>
@@ -6501,7 +6475,7 @@
     </p:spTree>
     <p:extLst>
       <p:ext uri="{BB962C8B-B14F-4D97-AF65-F5344CB8AC3E}">
-        <p14:creationId xmlns:p14="http://schemas.microsoft.com/office/powerpoint/2010/main" xmlns="" val="1693637382"/>
+        <p14:creationId xmlns:p14="http://schemas.microsoft.com/office/powerpoint/2010/main" val="1693637382"/>
       </p:ext>
     </p:extLst>
   </p:cSld>

</xml_diff>